<commit_message>
Digital Zoom presentation - v4.0
Signed-off-by: idowein <ido.weinstock@gmail.com>
</commit_message>
<xml_diff>
--- a/datasheets/Digital Zoom presentation.pptx
+++ b/datasheets/Digital Zoom presentation.pptx
@@ -5,10 +5,10 @@
     <p:sldMasterId id="2147483648" r:id="rId1"/>
   </p:sldMasterIdLst>
   <p:notesMasterIdLst>
-    <p:notesMasterId r:id="rId24"/>
+    <p:notesMasterId r:id="rId25"/>
   </p:notesMasterIdLst>
   <p:handoutMasterIdLst>
-    <p:handoutMasterId r:id="rId25"/>
+    <p:handoutMasterId r:id="rId26"/>
   </p:handoutMasterIdLst>
   <p:sldIdLst>
     <p:sldId id="256" r:id="rId2"/>
@@ -16,23 +16,24 @@
     <p:sldId id="287" r:id="rId4"/>
     <p:sldId id="266" r:id="rId5"/>
     <p:sldId id="277" r:id="rId6"/>
-    <p:sldId id="278" r:id="rId7"/>
-    <p:sldId id="279" r:id="rId8"/>
-    <p:sldId id="283" r:id="rId9"/>
-    <p:sldId id="285" r:id="rId10"/>
-    <p:sldId id="280" r:id="rId11"/>
-    <p:sldId id="281" r:id="rId12"/>
-    <p:sldId id="284" r:id="rId13"/>
-    <p:sldId id="286" r:id="rId14"/>
-    <p:sldId id="267" r:id="rId15"/>
-    <p:sldId id="288" r:id="rId16"/>
-    <p:sldId id="269" r:id="rId17"/>
-    <p:sldId id="270" r:id="rId18"/>
-    <p:sldId id="271" r:id="rId19"/>
-    <p:sldId id="272" r:id="rId20"/>
-    <p:sldId id="273" r:id="rId21"/>
-    <p:sldId id="274" r:id="rId22"/>
-    <p:sldId id="275" r:id="rId23"/>
+    <p:sldId id="289" r:id="rId7"/>
+    <p:sldId id="278" r:id="rId8"/>
+    <p:sldId id="290" r:id="rId9"/>
+    <p:sldId id="283" r:id="rId10"/>
+    <p:sldId id="285" r:id="rId11"/>
+    <p:sldId id="280" r:id="rId12"/>
+    <p:sldId id="281" r:id="rId13"/>
+    <p:sldId id="284" r:id="rId14"/>
+    <p:sldId id="286" r:id="rId15"/>
+    <p:sldId id="267" r:id="rId16"/>
+    <p:sldId id="288" r:id="rId17"/>
+    <p:sldId id="269" r:id="rId18"/>
+    <p:sldId id="270" r:id="rId19"/>
+    <p:sldId id="271" r:id="rId20"/>
+    <p:sldId id="272" r:id="rId21"/>
+    <p:sldId id="273" r:id="rId22"/>
+    <p:sldId id="274" r:id="rId23"/>
+    <p:sldId id="275" r:id="rId24"/>
   </p:sldIdLst>
   <p:sldSz cx="12192000" cy="6858000"/>
   <p:notesSz cx="6858000" cy="9144000"/>
@@ -6732,186 +6733,7 @@
           <a:bodyPr/>
           <a:lstStyle/>
           <a:p>
-            <a:pPr algn="r" rtl="1"/>
-            <a:r>
-              <a:rPr lang="he-IL" dirty="0"/>
-              <a:t>המודול הראשון </a:t>
-            </a:r>
-            <a:r>
-              <a:rPr lang="en-US" dirty="0"/>
-              <a:t>Controller</a:t>
-            </a:r>
-            <a:endParaRPr lang="he-IL" dirty="0"/>
-          </a:p>
-          <a:p>
-            <a:pPr algn="r" rtl="1"/>
-            <a:r>
-              <a:rPr lang="he-IL" dirty="0"/>
-              <a:t>תפקידו להתממשק עם המצלמה ולספק לה:</a:t>
-            </a:r>
-          </a:p>
-          <a:p>
-            <a:pPr marL="228600" indent="-228600" algn="r" rtl="1">
-              <a:buFont typeface="+mj-lt"/>
-              <a:buAutoNum type="arabicPeriod"/>
-            </a:pPr>
-            <a:r>
-              <a:rPr lang="he-IL" dirty="0"/>
-              <a:t>שעון וריסט</a:t>
-            </a:r>
-          </a:p>
-          <a:p>
-            <a:pPr marL="228600" indent="-228600" algn="r" rtl="1">
-              <a:buFont typeface="+mj-lt"/>
-              <a:buAutoNum type="arabicPeriod"/>
-            </a:pPr>
-            <a:r>
-              <a:rPr lang="he-IL" dirty="0"/>
-              <a:t>לקנפג את הרגיסטרים של המצלמה באמצעות פרוטוקול דומה </a:t>
-            </a:r>
-          </a:p>
-          <a:p>
-            <a:pPr algn="r" rtl="1"/>
-            <a:r>
-              <a:rPr lang="he-IL" dirty="0"/>
-              <a:t>ל</a:t>
-            </a:r>
-            <a:r>
-              <a:rPr lang="en-US" dirty="0"/>
-              <a:t> I2C</a:t>
-            </a:r>
-            <a:r>
-              <a:rPr lang="he-IL" dirty="0"/>
-              <a:t> (=</a:t>
-            </a:r>
-            <a:r>
-              <a:rPr lang="en-US" dirty="0"/>
-              <a:t>Inter-Integrated Circuit</a:t>
-            </a:r>
-            <a:r>
-              <a:rPr lang="he-IL" dirty="0"/>
-              <a:t>) בשם </a:t>
-            </a:r>
-            <a:r>
-              <a:rPr lang="en-US" dirty="0"/>
-              <a:t>SCCB</a:t>
-            </a:r>
-            <a:r>
-              <a:rPr lang="he-IL" dirty="0"/>
-              <a:t> (=</a:t>
-            </a:r>
-            <a:r>
-              <a:rPr lang="en-US" dirty="0"/>
-              <a:t>Serial Camera Control Bus</a:t>
-            </a:r>
-            <a:r>
-              <a:rPr lang="he-IL" dirty="0"/>
-              <a:t>):</a:t>
-            </a:r>
-          </a:p>
-          <a:p>
-            <a:pPr algn="r" rtl="1"/>
-            <a:r>
-              <a:rPr lang="he-IL" dirty="0"/>
-              <a:t>&lt;קליק&gt;</a:t>
-            </a:r>
-          </a:p>
-          <a:p>
-            <a:pPr algn="r" rtl="1"/>
-            <a:r>
-              <a:rPr lang="he-IL" dirty="0"/>
-              <a:t>ניתן לראות בסימולציה שיצרנו דוגמה לכתיבה לרגיסטר:</a:t>
-            </a:r>
-          </a:p>
-          <a:p>
-            <a:pPr algn="r" rtl="1"/>
-            <a:r>
-              <a:rPr lang="he-IL" dirty="0"/>
-              <a:t>בהתחלה נרצה לכתוב </a:t>
-            </a:r>
-            <a:r>
-              <a:rPr lang="en-US" dirty="0"/>
-              <a:t>x”42”</a:t>
-            </a:r>
-            <a:r>
-              <a:rPr lang="he-IL" dirty="0"/>
-              <a:t> שזהו ה</a:t>
-            </a:r>
-            <a:r>
-              <a:rPr lang="en-US" dirty="0"/>
-              <a:t>ID</a:t>
-            </a:r>
-            <a:r>
-              <a:rPr lang="he-IL" dirty="0"/>
-              <a:t> של המצלמה שלנו</a:t>
-            </a:r>
-          </a:p>
-          <a:p>
-            <a:pPr algn="r" rtl="1"/>
-            <a:r>
-              <a:rPr lang="he-IL" dirty="0"/>
-              <a:t>ניתן לראות את השעון דוגם 0 ואז 1 ו0 ו0 – שזה 4</a:t>
-            </a:r>
-          </a:p>
-          <a:p>
-            <a:pPr algn="r" rtl="1"/>
-            <a:r>
-              <a:rPr lang="he-IL" dirty="0"/>
-              <a:t>ו0 0 1 ו0 – זהו 2</a:t>
-            </a:r>
-          </a:p>
-          <a:p>
-            <a:pPr algn="r" rtl="1"/>
-            <a:r>
-              <a:rPr lang="he-IL" dirty="0"/>
-              <a:t>&lt;קליק&gt;</a:t>
-            </a:r>
-          </a:p>
-          <a:p>
-            <a:pPr algn="r" rtl="1"/>
-            <a:r>
-              <a:rPr lang="he-IL" dirty="0"/>
-              <a:t>ואז את כתובת הרגיסטר </a:t>
-            </a:r>
-            <a:r>
-              <a:rPr lang="en-US" dirty="0"/>
-              <a:t>X”12”</a:t>
-            </a:r>
-            <a:endParaRPr lang="he-IL" dirty="0"/>
-          </a:p>
-          <a:p>
-            <a:pPr algn="r" rtl="1"/>
-            <a:r>
-              <a:rPr lang="he-IL" dirty="0"/>
-              <a:t>&lt;קליק&gt;</a:t>
-            </a:r>
-          </a:p>
-          <a:p>
-            <a:pPr algn="r" rtl="1"/>
-            <a:r>
-              <a:rPr lang="he-IL" dirty="0"/>
-              <a:t>ולבסוף את ה</a:t>
-            </a:r>
-            <a:r>
-              <a:rPr lang="en-US" dirty="0"/>
-              <a:t>DATA</a:t>
-            </a:r>
-            <a:r>
-              <a:rPr lang="he-IL" dirty="0"/>
-              <a:t> </a:t>
-            </a:r>
-            <a:r>
-              <a:rPr lang="en-US" dirty="0"/>
-              <a:t>X”80”</a:t>
-            </a:r>
-            <a:r>
-              <a:rPr lang="he-IL" dirty="0"/>
-              <a:t> באופן דומה ל</a:t>
-            </a:r>
-            <a:r>
-              <a:rPr lang="en-US" dirty="0"/>
-              <a:t>X”42”</a:t>
-            </a:r>
+            <a:endParaRPr lang="en-US"/>
           </a:p>
         </p:txBody>
       </p:sp>
@@ -6932,91 +6754,7 @@
           <a:p>
             <a:fld id="{5EE2CF44-2B13-41B4-A334-1CDF534EEBBF}" type="slidenum">
               <a:rPr lang="en-US" smtClean="0"/>
-              <a:t>10</a:t>
-            </a:fld>
-            <a:endParaRPr lang="en-US"/>
-          </a:p>
-        </p:txBody>
-      </p:sp>
-    </p:spTree>
-    <p:extLst>
-      <p:ext uri="{BB962C8B-B14F-4D97-AF65-F5344CB8AC3E}">
-        <p14:creationId xmlns:p14="http://schemas.microsoft.com/office/powerpoint/2010/main" val="831199167"/>
-      </p:ext>
-    </p:extLst>
-  </p:cSld>
-  <p:clrMapOvr>
-    <a:masterClrMapping/>
-  </p:clrMapOvr>
-</p:notes>
-</file>
-
-<file path=ppt/notesSlides/notesSlide11.xml><?xml version="1.0" encoding="utf-8"?>
-<p:notes xmlns:a="http://schemas.openxmlformats.org/drawingml/2006/main" xmlns:r="http://schemas.openxmlformats.org/officeDocument/2006/relationships" xmlns:p="http://schemas.openxmlformats.org/presentationml/2006/main">
-  <p:cSld>
-    <p:spTree>
-      <p:nvGrpSpPr>
-        <p:cNvPr id="1" name=""/>
-        <p:cNvGrpSpPr/>
-        <p:nvPr/>
-      </p:nvGrpSpPr>
-      <p:grpSpPr>
-        <a:xfrm>
-          <a:off x="0" y="0"/>
-          <a:ext cx="0" cy="0"/>
-          <a:chOff x="0" y="0"/>
-          <a:chExt cx="0" cy="0"/>
-        </a:xfrm>
-      </p:grpSpPr>
-      <p:sp>
-        <p:nvSpPr>
-          <p:cNvPr id="2" name="Slide Image Placeholder 1"/>
-          <p:cNvSpPr>
-            <a:spLocks noGrp="1" noRot="1" noChangeAspect="1"/>
-          </p:cNvSpPr>
-          <p:nvPr>
-            <p:ph type="sldImg"/>
-          </p:nvPr>
-        </p:nvSpPr>
-        <p:spPr/>
-      </p:sp>
-      <p:sp>
-        <p:nvSpPr>
-          <p:cNvPr id="3" name="Notes Placeholder 2"/>
-          <p:cNvSpPr>
-            <a:spLocks noGrp="1"/>
-          </p:cNvSpPr>
-          <p:nvPr>
-            <p:ph type="body" idx="1"/>
-          </p:nvPr>
-        </p:nvSpPr>
-        <p:spPr/>
-        <p:txBody>
-          <a:bodyPr/>
-          <a:lstStyle/>
-          <a:p>
-            <a:endParaRPr lang="en-US"/>
-          </a:p>
-        </p:txBody>
-      </p:sp>
-      <p:sp>
-        <p:nvSpPr>
-          <p:cNvPr id="4" name="Slide Number Placeholder 3"/>
-          <p:cNvSpPr>
-            <a:spLocks noGrp="1"/>
-          </p:cNvSpPr>
-          <p:nvPr>
-            <p:ph type="sldNum" sz="quarter" idx="5"/>
-          </p:nvPr>
-        </p:nvSpPr>
-        <p:spPr/>
-        <p:txBody>
-          <a:bodyPr/>
-          <a:lstStyle/>
-          <a:p>
-            <a:fld id="{5EE2CF44-2B13-41B4-A334-1CDF534EEBBF}" type="slidenum">
-              <a:rPr lang="en-US" smtClean="0"/>
-              <a:t>11</a:t>
+              <a:t>12</a:t>
             </a:fld>
             <a:endParaRPr lang="en-US"/>
           </a:p>
@@ -7080,6 +6818,17 @@
           <a:lstStyle/>
           <a:p>
             <a:pPr algn="r" rtl="1"/>
+            <a:r>
+              <a:rPr lang="he-IL" dirty="0"/>
+              <a:t>בהצגה נתמקד ב:</a:t>
+            </a:r>
+          </a:p>
+          <a:p>
+            <a:pPr algn="r" rtl="1"/>
+            <a:r>
+              <a:rPr lang="he-IL" dirty="0"/>
+              <a:t>1. </a:t>
+            </a:r>
             <a:endParaRPr lang="en-US" dirty="0"/>
           </a:p>
         </p:txBody>
@@ -7779,7 +7528,7 @@
           <a:p>
             <a:fld id="{5EE2CF44-2B13-41B4-A334-1CDF534EEBBF}" type="slidenum">
               <a:rPr lang="en-US" smtClean="0"/>
-              <a:t>6</a:t>
+              <a:t>7</a:t>
             </a:fld>
             <a:endParaRPr lang="en-US"/>
           </a:p>
@@ -7842,8 +7591,7 @@
           <a:bodyPr/>
           <a:lstStyle/>
           <a:p>
-            <a:pPr algn="r" rtl="1"/>
-            <a:endParaRPr lang="en-US" dirty="0"/>
+            <a:endParaRPr lang="en-US"/>
           </a:p>
         </p:txBody>
       </p:sp>
@@ -7864,7 +7612,7 @@
           <a:p>
             <a:fld id="{5EE2CF44-2B13-41B4-A334-1CDF534EEBBF}" type="slidenum">
               <a:rPr lang="en-US" smtClean="0"/>
-              <a:t>7</a:t>
+              <a:t>9</a:t>
             </a:fld>
             <a:endParaRPr lang="en-US"/>
           </a:p>
@@ -7873,7 +7621,7 @@
     </p:spTree>
     <p:extLst>
       <p:ext uri="{BB962C8B-B14F-4D97-AF65-F5344CB8AC3E}">
-        <p14:creationId xmlns:p14="http://schemas.microsoft.com/office/powerpoint/2010/main" val="4035054388"/>
+        <p14:creationId xmlns:p14="http://schemas.microsoft.com/office/powerpoint/2010/main" val="1039069473"/>
       </p:ext>
     </p:extLst>
   </p:cSld>
@@ -7927,7 +7675,107 @@
           <a:bodyPr/>
           <a:lstStyle/>
           <a:p>
-            <a:endParaRPr lang="en-US"/>
+            <a:pPr algn="r" rtl="1"/>
+            <a:r>
+              <a:rPr lang="he-IL" dirty="0"/>
+              <a:t>המשתמש יוכל להפעיל את המצלמה ולשנות את הזום והרזולציה באמצעות הסוויצ’ים</a:t>
+            </a:r>
+            <a:r>
+              <a:rPr lang="en-US" dirty="0"/>
+              <a:t>:</a:t>
+            </a:r>
+          </a:p>
+          <a:p>
+            <a:pPr algn="r" rtl="1"/>
+            <a:endParaRPr lang="en-US" dirty="0"/>
+          </a:p>
+          <a:p>
+            <a:pPr marL="228600" indent="-228600" algn="r" rtl="1">
+              <a:buAutoNum type="arabicPeriod"/>
+            </a:pPr>
+            <a:r>
+              <a:rPr lang="en-US" dirty="0"/>
+              <a:t>SW15</a:t>
+            </a:r>
+            <a:r>
+              <a:rPr lang="he-IL" dirty="0"/>
+              <a:t> – השמאלי ביותר</a:t>
+            </a:r>
+          </a:p>
+          <a:p>
+            <a:pPr marL="685800" lvl="1" indent="-228600" algn="r" rtl="1">
+              <a:buAutoNum type="arabicPeriod"/>
+            </a:pPr>
+            <a:r>
+              <a:rPr lang="he-IL" dirty="0"/>
+              <a:t>ירסט את המערכת ונוכל לראות על מסך ה</a:t>
+            </a:r>
+            <a:r>
+              <a:rPr lang="en-US" dirty="0"/>
+              <a:t>VGA</a:t>
+            </a:r>
+            <a:r>
+              <a:rPr lang="he-IL" dirty="0"/>
+              <a:t> פסים צבעוניים (מעין בדיקת שפיות)</a:t>
+            </a:r>
+          </a:p>
+          <a:p>
+            <a:pPr marL="228600" indent="-228600" algn="r" rtl="1">
+              <a:buAutoNum type="arabicPeriod"/>
+            </a:pPr>
+            <a:r>
+              <a:rPr lang="en-US" dirty="0"/>
+              <a:t>SW14</a:t>
+            </a:r>
+            <a:r>
+              <a:rPr lang="he-IL" dirty="0"/>
+              <a:t> – מימינו יפעיל את המצלמה – המשתמש יראה את הוידאו מוקרן על המסך</a:t>
+            </a:r>
+          </a:p>
+          <a:p>
+            <a:pPr marL="228600" indent="-228600" algn="r" rtl="1">
+              <a:buAutoNum type="arabicPeriod"/>
+            </a:pPr>
+            <a:r>
+              <a:rPr lang="en-US" dirty="0"/>
+              <a:t>SW13</a:t>
+            </a:r>
+            <a:r>
+              <a:rPr lang="he-IL" dirty="0"/>
+              <a:t> – המצלמה תקונפג והצבעים יהיו ריאלסטיים יותר</a:t>
+            </a:r>
+          </a:p>
+          <a:p>
+            <a:pPr marL="228600" indent="-228600" algn="r" rtl="1">
+              <a:buAutoNum type="arabicPeriod"/>
+            </a:pPr>
+            <a:r>
+              <a:rPr lang="en-US" dirty="0"/>
+              <a:t>SW12</a:t>
+            </a:r>
+            <a:r>
+              <a:rPr lang="he-IL" dirty="0"/>
+              <a:t> – זום -&gt; רק מרכז התמונה יוקרן על המסך כולו.</a:t>
+            </a:r>
+          </a:p>
+          <a:p>
+            <a:pPr marL="228600" indent="-228600" algn="r" rtl="1">
+              <a:buAutoNum type="arabicPeriod"/>
+            </a:pPr>
+            <a:r>
+              <a:rPr lang="en-US" dirty="0"/>
+              <a:t>SW11</a:t>
+            </a:r>
+            <a:r>
+              <a:rPr lang="he-IL" dirty="0"/>
+              <a:t> – אינטרפולציה – התמונה עם הזום תראה טוב יותר עם מעט פיקסול</a:t>
+            </a:r>
+          </a:p>
+          <a:p>
+            <a:pPr marL="228600" indent="-228600" algn="r" rtl="1">
+              <a:buAutoNum type="arabicPeriod"/>
+            </a:pPr>
+            <a:endParaRPr lang="he-IL" dirty="0"/>
           </a:p>
         </p:txBody>
       </p:sp>
@@ -7948,7 +7796,7 @@
           <a:p>
             <a:fld id="{5EE2CF44-2B13-41B4-A334-1CDF534EEBBF}" type="slidenum">
               <a:rPr lang="en-US" smtClean="0"/>
-              <a:t>8</a:t>
+              <a:t>10</a:t>
             </a:fld>
             <a:endParaRPr lang="en-US"/>
           </a:p>
@@ -7957,7 +7805,7 @@
     </p:spTree>
     <p:extLst>
       <p:ext uri="{BB962C8B-B14F-4D97-AF65-F5344CB8AC3E}">
-        <p14:creationId xmlns:p14="http://schemas.microsoft.com/office/powerpoint/2010/main" val="1039069473"/>
+        <p14:creationId xmlns:p14="http://schemas.microsoft.com/office/powerpoint/2010/main" val="3312437063"/>
       </p:ext>
     </p:extLst>
   </p:cSld>
@@ -8014,104 +7862,183 @@
             <a:pPr algn="r" rtl="1"/>
             <a:r>
               <a:rPr lang="he-IL" dirty="0"/>
-              <a:t>המשתמש יוכל להפעיל את המצלמה ולשנות את הזום והרזולציה באמצעות הסוויצ’ים</a:t>
+              <a:t>המודול הראשון </a:t>
             </a:r>
             <a:r>
               <a:rPr lang="en-US" dirty="0"/>
-              <a:t>:</a:t>
-            </a:r>
+              <a:t>Controller</a:t>
+            </a:r>
+            <a:endParaRPr lang="he-IL" dirty="0"/>
           </a:p>
           <a:p>
             <a:pPr algn="r" rtl="1"/>
-            <a:endParaRPr lang="en-US" dirty="0"/>
+            <a:r>
+              <a:rPr lang="he-IL" dirty="0"/>
+              <a:t>תפקידו להתממשק עם המצלמה ולספק לה:</a:t>
+            </a:r>
           </a:p>
           <a:p>
             <a:pPr marL="228600" indent="-228600" algn="r" rtl="1">
+              <a:buFont typeface="+mj-lt"/>
               <a:buAutoNum type="arabicPeriod"/>
             </a:pPr>
             <a:r>
-              <a:rPr lang="en-US" dirty="0"/>
-              <a:t>SW15</a:t>
-            </a:r>
-            <a:r>
               <a:rPr lang="he-IL" dirty="0"/>
-              <a:t> – השמאלי ביותר</a:t>
-            </a:r>
-          </a:p>
-          <a:p>
-            <a:pPr marL="685800" lvl="1" indent="-228600" algn="r" rtl="1">
+              <a:t>שעון וריסט</a:t>
+            </a:r>
+          </a:p>
+          <a:p>
+            <a:pPr marL="228600" indent="-228600" algn="r" rtl="1">
+              <a:buFont typeface="+mj-lt"/>
               <a:buAutoNum type="arabicPeriod"/>
             </a:pPr>
             <a:r>
               <a:rPr lang="he-IL" dirty="0"/>
-              <a:t>ירסט את המערכת ונוכל לראות על מסך ה</a:t>
+              <a:t>לקנפג את הרגיסטרים של המצלמה באמצעות פרוטוקול דומה </a:t>
+            </a:r>
+          </a:p>
+          <a:p>
+            <a:pPr algn="r" rtl="1"/>
+            <a:r>
+              <a:rPr lang="he-IL" dirty="0"/>
+              <a:t>ל</a:t>
             </a:r>
             <a:r>
               <a:rPr lang="en-US" dirty="0"/>
-              <a:t>VGA</a:t>
+              <a:t> I2C</a:t>
             </a:r>
             <a:r>
               <a:rPr lang="he-IL" dirty="0"/>
-              <a:t> פסים צבעוניים (מעין בדיקת שפיות)</a:t>
-            </a:r>
-          </a:p>
-          <a:p>
-            <a:pPr marL="228600" indent="-228600" algn="r" rtl="1">
-              <a:buAutoNum type="arabicPeriod"/>
-            </a:pPr>
+              <a:t> (=</a:t>
+            </a:r>
             <a:r>
               <a:rPr lang="en-US" dirty="0"/>
-              <a:t>SW14</a:t>
+              <a:t>Inter-Integrated Circuit</a:t>
             </a:r>
             <a:r>
               <a:rPr lang="he-IL" dirty="0"/>
-              <a:t> – מימינו יפעיל את המצלמה – המשתמש יראה את הוידאו מוקרן על המסך</a:t>
-            </a:r>
-          </a:p>
-          <a:p>
-            <a:pPr marL="228600" indent="-228600" algn="r" rtl="1">
-              <a:buAutoNum type="arabicPeriod"/>
-            </a:pPr>
+              <a:t>) בשם </a:t>
+            </a:r>
             <a:r>
               <a:rPr lang="en-US" dirty="0"/>
-              <a:t>SW13</a:t>
+              <a:t>SCCB</a:t>
             </a:r>
             <a:r>
               <a:rPr lang="he-IL" dirty="0"/>
-              <a:t> – המצלמה תקונפג והצבעים יהיו ריאלסטיים יותר</a:t>
-            </a:r>
-          </a:p>
-          <a:p>
-            <a:pPr marL="228600" indent="-228600" algn="r" rtl="1">
-              <a:buAutoNum type="arabicPeriod"/>
-            </a:pPr>
+              <a:t> (=</a:t>
+            </a:r>
             <a:r>
               <a:rPr lang="en-US" dirty="0"/>
-              <a:t>SW12</a:t>
+              <a:t>Serial Camera Control Bus</a:t>
             </a:r>
             <a:r>
               <a:rPr lang="he-IL" dirty="0"/>
-              <a:t> – זום -&gt; רק מרכז התמונה יוקרן על המסך כולו.</a:t>
-            </a:r>
-          </a:p>
-          <a:p>
-            <a:pPr marL="228600" indent="-228600" algn="r" rtl="1">
-              <a:buAutoNum type="arabicPeriod"/>
-            </a:pPr>
+              <a:t>):</a:t>
+            </a:r>
+          </a:p>
+          <a:p>
+            <a:pPr algn="r" rtl="1"/>
+            <a:r>
+              <a:rPr lang="he-IL" dirty="0"/>
+              <a:t>&lt;קליק&gt;</a:t>
+            </a:r>
+          </a:p>
+          <a:p>
+            <a:pPr algn="r" rtl="1"/>
+            <a:r>
+              <a:rPr lang="he-IL" dirty="0"/>
+              <a:t>ניתן לראות בסימולציה שיצרנו דוגמה לכתיבה לרגיסטר:</a:t>
+            </a:r>
+          </a:p>
+          <a:p>
+            <a:pPr algn="r" rtl="1"/>
+            <a:r>
+              <a:rPr lang="he-IL" dirty="0"/>
+              <a:t>בהתחלה נרצה לכתוב </a:t>
+            </a:r>
             <a:r>
               <a:rPr lang="en-US" dirty="0"/>
-              <a:t>SW11</a:t>
+              <a:t>x”42”</a:t>
             </a:r>
             <a:r>
               <a:rPr lang="he-IL" dirty="0"/>
-              <a:t> – אינטרפולציה – התמונה עם הזום תראה טוב יותר עם מעט פיקסול</a:t>
-            </a:r>
-          </a:p>
-          <a:p>
-            <a:pPr marL="228600" indent="-228600" algn="r" rtl="1">
-              <a:buAutoNum type="arabicPeriod"/>
-            </a:pPr>
+              <a:t> שזהו ה</a:t>
+            </a:r>
+            <a:r>
+              <a:rPr lang="en-US" dirty="0"/>
+              <a:t>ID</a:t>
+            </a:r>
+            <a:r>
+              <a:rPr lang="he-IL" dirty="0"/>
+              <a:t> של המצלמה שלנו</a:t>
+            </a:r>
+          </a:p>
+          <a:p>
+            <a:pPr algn="r" rtl="1"/>
+            <a:r>
+              <a:rPr lang="he-IL" dirty="0"/>
+              <a:t>ניתן לראות את השעון דוגם 0 ואז 1 ו0 ו0 – שזה 4</a:t>
+            </a:r>
+          </a:p>
+          <a:p>
+            <a:pPr algn="r" rtl="1"/>
+            <a:r>
+              <a:rPr lang="he-IL" dirty="0"/>
+              <a:t>ו0 0 1 ו0 – זהו 2</a:t>
+            </a:r>
+          </a:p>
+          <a:p>
+            <a:pPr algn="r" rtl="1"/>
+            <a:r>
+              <a:rPr lang="he-IL" dirty="0"/>
+              <a:t>&lt;קליק&gt;</a:t>
+            </a:r>
+          </a:p>
+          <a:p>
+            <a:pPr algn="r" rtl="1"/>
+            <a:r>
+              <a:rPr lang="he-IL" dirty="0"/>
+              <a:t>ואז את כתובת הרגיסטר </a:t>
+            </a:r>
+            <a:r>
+              <a:rPr lang="en-US" dirty="0"/>
+              <a:t>X”12”</a:t>
+            </a:r>
             <a:endParaRPr lang="he-IL" dirty="0"/>
+          </a:p>
+          <a:p>
+            <a:pPr algn="r" rtl="1"/>
+            <a:r>
+              <a:rPr lang="he-IL" dirty="0"/>
+              <a:t>&lt;קליק&gt;</a:t>
+            </a:r>
+          </a:p>
+          <a:p>
+            <a:pPr algn="r" rtl="1"/>
+            <a:r>
+              <a:rPr lang="he-IL" dirty="0"/>
+              <a:t>ולבסוף את ה</a:t>
+            </a:r>
+            <a:r>
+              <a:rPr lang="en-US" dirty="0"/>
+              <a:t>DATA</a:t>
+            </a:r>
+            <a:r>
+              <a:rPr lang="he-IL" dirty="0"/>
+              <a:t> </a:t>
+            </a:r>
+            <a:r>
+              <a:rPr lang="en-US" dirty="0"/>
+              <a:t>X”80”</a:t>
+            </a:r>
+            <a:r>
+              <a:rPr lang="he-IL" dirty="0"/>
+              <a:t> באופן דומה ל</a:t>
+            </a:r>
+            <a:r>
+              <a:rPr lang="en-US" dirty="0"/>
+              <a:t>X”42”</a:t>
+            </a:r>
           </a:p>
         </p:txBody>
       </p:sp>
@@ -8132,7 +8059,7 @@
           <a:p>
             <a:fld id="{5EE2CF44-2B13-41B4-A334-1CDF534EEBBF}" type="slidenum">
               <a:rPr lang="en-US" smtClean="0"/>
-              <a:t>9</a:t>
+              <a:t>11</a:t>
             </a:fld>
             <a:endParaRPr lang="en-US"/>
           </a:p>
@@ -8141,7 +8068,7 @@
     </p:spTree>
     <p:extLst>
       <p:ext uri="{BB962C8B-B14F-4D97-AF65-F5344CB8AC3E}">
-        <p14:creationId xmlns:p14="http://schemas.microsoft.com/office/powerpoint/2010/main" val="3312437063"/>
+        <p14:creationId xmlns:p14="http://schemas.microsoft.com/office/powerpoint/2010/main" val="831199167"/>
       </p:ext>
     </p:extLst>
   </p:cSld>
@@ -8410,6 +8337,11 @@
 <file path=ppt/slideLayouts/slideLayout10.xml><?xml version="1.0" encoding="utf-8"?>
 <p:sldLayout xmlns:a="http://schemas.openxmlformats.org/drawingml/2006/main" xmlns:r="http://schemas.openxmlformats.org/officeDocument/2006/relationships" xmlns:p="http://schemas.openxmlformats.org/presentationml/2006/main" type="vertTx" preserve="1">
   <p:cSld name="Title and Vertical Text">
+    <p:bg>
+      <p:bgRef idx="1001">
+        <a:schemeClr val="bg1"/>
+      </p:bgRef>
+    </p:bg>
     <p:spTree>
       <p:nvGrpSpPr>
         <p:cNvPr id="1" name=""/>
@@ -8571,7 +8503,7 @@
     </p:extLst>
   </p:cSld>
   <p:clrMapOvr>
-    <a:masterClrMapping/>
+    <a:overrideClrMapping bg1="dk1" tx1="lt1" bg2="dk2" tx2="lt2" accent1="accent1" accent2="accent2" accent3="accent3" accent4="accent4" accent5="accent5" accent6="accent6" hlink="hlink" folHlink="folHlink"/>
   </p:clrMapOvr>
 </p:sldLayout>
 </file>
@@ -8579,6 +8511,11 @@
 <file path=ppt/slideLayouts/slideLayout11.xml><?xml version="1.0" encoding="utf-8"?>
 <p:sldLayout xmlns:a="http://schemas.openxmlformats.org/drawingml/2006/main" xmlns:r="http://schemas.openxmlformats.org/officeDocument/2006/relationships" xmlns:p="http://schemas.openxmlformats.org/presentationml/2006/main" type="vertTitleAndTx" preserve="1">
   <p:cSld name="Vertical Title and Text">
+    <p:bg>
+      <p:bgRef idx="1001">
+        <a:schemeClr val="bg1"/>
+      </p:bgRef>
+    </p:bg>
     <p:spTree>
       <p:nvGrpSpPr>
         <p:cNvPr id="1" name=""/>
@@ -8750,7 +8687,7 @@
     </p:extLst>
   </p:cSld>
   <p:clrMapOvr>
-    <a:masterClrMapping/>
+    <a:overrideClrMapping bg1="dk1" tx1="lt1" bg2="dk2" tx2="lt2" accent1="accent1" accent2="accent2" accent3="accent3" accent4="accent4" accent5="accent5" accent6="accent6" hlink="hlink" folHlink="folHlink"/>
   </p:clrMapOvr>
 </p:sldLayout>
 </file>
@@ -8758,6 +8695,11 @@
 <file path=ppt/slideLayouts/slideLayout2.xml><?xml version="1.0" encoding="utf-8"?>
 <p:sldLayout xmlns:a="http://schemas.openxmlformats.org/drawingml/2006/main" xmlns:r="http://schemas.openxmlformats.org/officeDocument/2006/relationships" xmlns:p="http://schemas.openxmlformats.org/presentationml/2006/main" type="obj" preserve="1">
   <p:cSld name="Title and Content">
+    <p:bg>
+      <p:bgRef idx="1001">
+        <a:schemeClr val="bg1"/>
+      </p:bgRef>
+    </p:bg>
     <p:spTree>
       <p:nvGrpSpPr>
         <p:cNvPr id="1" name=""/>
@@ -8923,7 +8865,7 @@
     </p:extLst>
   </p:cSld>
   <p:clrMapOvr>
-    <a:masterClrMapping/>
+    <a:overrideClrMapping bg1="dk1" tx1="lt1" bg2="dk2" tx2="lt2" accent1="accent1" accent2="accent2" accent3="accent3" accent4="accent4" accent5="accent5" accent6="accent6" hlink="hlink" folHlink="folHlink"/>
   </p:clrMapOvr>
 </p:sldLayout>
 </file>
@@ -8931,6 +8873,11 @@
 <file path=ppt/slideLayouts/slideLayout3.xml><?xml version="1.0" encoding="utf-8"?>
 <p:sldLayout xmlns:a="http://schemas.openxmlformats.org/drawingml/2006/main" xmlns:r="http://schemas.openxmlformats.org/officeDocument/2006/relationships" xmlns:p="http://schemas.openxmlformats.org/presentationml/2006/main" type="secHead" preserve="1">
   <p:cSld name="Section Header">
+    <p:bg>
+      <p:bgRef idx="1001">
+        <a:schemeClr val="bg1"/>
+      </p:bgRef>
+    </p:bg>
     <p:spTree>
       <p:nvGrpSpPr>
         <p:cNvPr id="1" name=""/>
@@ -9065,7 +9012,7 @@
     </p:extLst>
   </p:cSld>
   <p:clrMapOvr>
-    <a:masterClrMapping/>
+    <a:overrideClrMapping bg1="dk1" tx1="lt1" bg2="dk2" tx2="lt2" accent1="accent1" accent2="accent2" accent3="accent3" accent4="accent4" accent5="accent5" accent6="accent6" hlink="hlink" folHlink="folHlink"/>
   </p:clrMapOvr>
 </p:sldLayout>
 </file>
@@ -9073,6 +9020,11 @@
 <file path=ppt/slideLayouts/slideLayout4.xml><?xml version="1.0" encoding="utf-8"?>
 <p:sldLayout xmlns:a="http://schemas.openxmlformats.org/drawingml/2006/main" xmlns:r="http://schemas.openxmlformats.org/officeDocument/2006/relationships" xmlns:p="http://schemas.openxmlformats.org/presentationml/2006/main" type="twoObj" preserve="1">
   <p:cSld name="Two Content">
+    <p:bg>
+      <p:bgRef idx="1001">
+        <a:schemeClr val="bg1"/>
+      </p:bgRef>
+    </p:bg>
     <p:spTree>
       <p:nvGrpSpPr>
         <p:cNvPr id="1" name=""/>
@@ -9356,7 +9308,7 @@
     </p:extLst>
   </p:cSld>
   <p:clrMapOvr>
-    <a:masterClrMapping/>
+    <a:overrideClrMapping bg1="dk1" tx1="lt1" bg2="dk2" tx2="lt2" accent1="accent1" accent2="accent2" accent3="accent3" accent4="accent4" accent5="accent5" accent6="accent6" hlink="hlink" folHlink="folHlink"/>
   </p:clrMapOvr>
 </p:sldLayout>
 </file>
@@ -9364,6 +9316,11 @@
 <file path=ppt/slideLayouts/slideLayout5.xml><?xml version="1.0" encoding="utf-8"?>
 <p:sldLayout xmlns:a="http://schemas.openxmlformats.org/drawingml/2006/main" xmlns:r="http://schemas.openxmlformats.org/officeDocument/2006/relationships" xmlns:p="http://schemas.openxmlformats.org/presentationml/2006/main" type="twoTxTwoObj" preserve="1">
   <p:cSld name="Comparison">
+    <p:bg>
+      <p:bgRef idx="1001">
+        <a:schemeClr val="bg1"/>
+      </p:bgRef>
+    </p:bg>
     <p:spTree>
       <p:nvGrpSpPr>
         <p:cNvPr id="1" name=""/>
@@ -9795,7 +9752,7 @@
     </p:extLst>
   </p:cSld>
   <p:clrMapOvr>
-    <a:masterClrMapping/>
+    <a:overrideClrMapping bg1="dk1" tx1="lt1" bg2="dk2" tx2="lt2" accent1="accent1" accent2="accent2" accent3="accent3" accent4="accent4" accent5="accent5" accent6="accent6" hlink="hlink" folHlink="folHlink"/>
   </p:clrMapOvr>
 </p:sldLayout>
 </file>
@@ -9803,6 +9760,11 @@
 <file path=ppt/slideLayouts/slideLayout6.xml><?xml version="1.0" encoding="utf-8"?>
 <p:sldLayout xmlns:a="http://schemas.openxmlformats.org/drawingml/2006/main" xmlns:r="http://schemas.openxmlformats.org/officeDocument/2006/relationships" xmlns:p="http://schemas.openxmlformats.org/presentationml/2006/main" type="titleOnly" preserve="1">
   <p:cSld name="Title Only">
+    <p:bg>
+      <p:bgRef idx="1001">
+        <a:schemeClr val="bg1"/>
+      </p:bgRef>
+    </p:bg>
     <p:spTree>
       <p:nvGrpSpPr>
         <p:cNvPr id="1" name=""/>
@@ -9912,7 +9874,7 @@
     </p:extLst>
   </p:cSld>
   <p:clrMapOvr>
-    <a:masterClrMapping/>
+    <a:overrideClrMapping bg1="dk1" tx1="lt1" bg2="dk2" tx2="lt2" accent1="accent1" accent2="accent2" accent3="accent3" accent4="accent4" accent5="accent5" accent6="accent6" hlink="hlink" folHlink="folHlink"/>
   </p:clrMapOvr>
 </p:sldLayout>
 </file>
@@ -9920,6 +9882,11 @@
 <file path=ppt/slideLayouts/slideLayout7.xml><?xml version="1.0" encoding="utf-8"?>
 <p:sldLayout xmlns:a="http://schemas.openxmlformats.org/drawingml/2006/main" xmlns:r="http://schemas.openxmlformats.org/officeDocument/2006/relationships" xmlns:p="http://schemas.openxmlformats.org/presentationml/2006/main" type="blank" preserve="1">
   <p:cSld name="Blank">
+    <p:bg>
+      <p:bgRef idx="1001">
+        <a:schemeClr val="bg1"/>
+      </p:bgRef>
+    </p:bg>
     <p:spTree>
       <p:nvGrpSpPr>
         <p:cNvPr id="1" name=""/>
@@ -10007,7 +9974,7 @@
     </p:extLst>
   </p:cSld>
   <p:clrMapOvr>
-    <a:masterClrMapping/>
+    <a:overrideClrMapping bg1="dk1" tx1="lt1" bg2="dk2" tx2="lt2" accent1="accent1" accent2="accent2" accent3="accent3" accent4="accent4" accent5="accent5" accent6="accent6" hlink="hlink" folHlink="folHlink"/>
   </p:clrMapOvr>
 </p:sldLayout>
 </file>
@@ -10015,6 +9982,11 @@
 <file path=ppt/slideLayouts/slideLayout8.xml><?xml version="1.0" encoding="utf-8"?>
 <p:sldLayout xmlns:a="http://schemas.openxmlformats.org/drawingml/2006/main" xmlns:r="http://schemas.openxmlformats.org/officeDocument/2006/relationships" xmlns:p="http://schemas.openxmlformats.org/presentationml/2006/main" preserve="1" userDrawn="1">
   <p:cSld name="Content with Caption">
+    <p:bg>
+      <p:bgRef idx="1001">
+        <a:schemeClr val="bg1"/>
+      </p:bgRef>
+    </p:bg>
     <p:spTree>
       <p:nvGrpSpPr>
         <p:cNvPr id="1" name=""/>
@@ -10291,7 +10263,7 @@
     </p:extLst>
   </p:cSld>
   <p:clrMapOvr>
-    <a:masterClrMapping/>
+    <a:overrideClrMapping bg1="dk1" tx1="lt1" bg2="dk2" tx2="lt2" accent1="accent1" accent2="accent2" accent3="accent3" accent4="accent4" accent5="accent5" accent6="accent6" hlink="hlink" folHlink="folHlink"/>
   </p:clrMapOvr>
 </p:sldLayout>
 </file>
@@ -10299,6 +10271,11 @@
 <file path=ppt/slideLayouts/slideLayout9.xml><?xml version="1.0" encoding="utf-8"?>
 <p:sldLayout xmlns:a="http://schemas.openxmlformats.org/drawingml/2006/main" xmlns:r="http://schemas.openxmlformats.org/officeDocument/2006/relationships" xmlns:p="http://schemas.openxmlformats.org/presentationml/2006/main" type="picTx" preserve="1">
   <p:cSld name="Picture with Caption">
+    <p:bg>
+      <p:bgRef idx="1001">
+        <a:schemeClr val="bg1"/>
+      </p:bgRef>
+    </p:bg>
     <p:spTree>
       <p:nvGrpSpPr>
         <p:cNvPr id="1" name=""/>
@@ -10602,7 +10579,7 @@
     </p:extLst>
   </p:cSld>
   <p:clrMapOvr>
-    <a:masterClrMapping/>
+    <a:overrideClrMapping bg1="dk1" tx1="lt1" bg2="dk2" tx2="lt2" accent1="accent1" accent2="accent2" accent3="accent3" accent4="accent4" accent5="accent5" accent6="accent6" hlink="hlink" folHlink="folHlink"/>
   </p:clrMapOvr>
 </p:sldLayout>
 </file>
@@ -11271,6 +11248,89 @@
           </a:p>
         </p:txBody>
       </p:sp>
+      <p:pic>
+        <p:nvPicPr>
+          <p:cNvPr id="1026" name="Picture 2" descr="Logtel לוגטל | LinkedIn">
+            <a:extLst>
+              <a:ext uri="{FF2B5EF4-FFF2-40B4-BE49-F238E27FC236}">
+                <a16:creationId xmlns:a16="http://schemas.microsoft.com/office/drawing/2014/main" id="{FB46A8E9-20F4-8904-3268-4A97E849C38B}"/>
+              </a:ext>
+            </a:extLst>
+          </p:cNvPr>
+          <p:cNvPicPr>
+            <a:picLocks noChangeAspect="1" noChangeArrowheads="1"/>
+          </p:cNvPicPr>
+          <p:nvPr/>
+        </p:nvPicPr>
+        <p:blipFill>
+          <a:blip r:embed="rId3" cstate="print">
+            <a:extLst>
+              <a:ext uri="{28A0092B-C50C-407E-A947-70E740481C1C}">
+                <a14:useLocalDpi xmlns:a14="http://schemas.microsoft.com/office/drawing/2010/main" val="0"/>
+              </a:ext>
+            </a:extLst>
+          </a:blip>
+          <a:srcRect/>
+          <a:stretch>
+            <a:fillRect/>
+          </a:stretch>
+        </p:blipFill>
+        <p:spPr bwMode="auto">
+          <a:xfrm>
+            <a:off x="9677400" y="328610"/>
+            <a:ext cx="609600" cy="609600"/>
+          </a:xfrm>
+          <a:prstGeom prst="rect">
+            <a:avLst/>
+          </a:prstGeom>
+          <a:noFill/>
+          <a:extLst>
+            <a:ext uri="{909E8E84-426E-40DD-AFC4-6F175D3DCCD1}">
+              <a14:hiddenFill xmlns:a14="http://schemas.microsoft.com/office/drawing/2010/main">
+                <a:solidFill>
+                  <a:srgbClr val="FFFFFF"/>
+                </a:solidFill>
+              </a14:hiddenFill>
+            </a:ext>
+          </a:extLst>
+        </p:spPr>
+      </p:pic>
+      <p:pic>
+        <p:nvPicPr>
+          <p:cNvPr id="5" name="Graphic 4">
+            <a:extLst>
+              <a:ext uri="{FF2B5EF4-FFF2-40B4-BE49-F238E27FC236}">
+                <a16:creationId xmlns:a16="http://schemas.microsoft.com/office/drawing/2014/main" id="{C4DD85A6-1F0A-3CD8-8251-25DFC6E73CE5}"/>
+              </a:ext>
+            </a:extLst>
+          </p:cNvPr>
+          <p:cNvPicPr>
+            <a:picLocks noChangeAspect="1"/>
+          </p:cNvPicPr>
+          <p:nvPr/>
+        </p:nvPicPr>
+        <p:blipFill>
+          <a:blip r:embed="rId4">
+            <a:extLst>
+              <a:ext uri="{96DAC541-7B7A-43D3-8B79-37D633B846F1}">
+                <asvg:svgBlip xmlns:asvg="http://schemas.microsoft.com/office/drawing/2016/SVG/main" r:embed="rId5"/>
+              </a:ext>
+            </a:extLst>
+          </a:blip>
+          <a:stretch>
+            <a:fillRect/>
+          </a:stretch>
+        </p:blipFill>
+        <p:spPr>
+          <a:xfrm>
+            <a:off x="10534650" y="466722"/>
+            <a:ext cx="1647825" cy="333375"/>
+          </a:xfrm>
+          <a:prstGeom prst="rect">
+            <a:avLst/>
+          </a:prstGeom>
+        </p:spPr>
+      </p:pic>
     </p:spTree>
     <p:extLst>
       <p:ext uri="{BB962C8B-B14F-4D97-AF65-F5344CB8AC3E}">
@@ -11285,6 +11345,135 @@
 </file>
 
 <file path=ppt/slides/slide10.xml><?xml version="1.0" encoding="utf-8"?>
+<p:sld xmlns:a="http://schemas.openxmlformats.org/drawingml/2006/main" xmlns:r="http://schemas.openxmlformats.org/officeDocument/2006/relationships" xmlns:p="http://schemas.openxmlformats.org/presentationml/2006/main">
+  <p:cSld>
+    <p:spTree>
+      <p:nvGrpSpPr>
+        <p:cNvPr id="1" name="">
+          <a:extLst>
+            <a:ext uri="{FF2B5EF4-FFF2-40B4-BE49-F238E27FC236}">
+              <a16:creationId xmlns:a16="http://schemas.microsoft.com/office/drawing/2014/main" id="{B852AF45-8B4E-EADA-A7B5-B3ABAFFA86B2}"/>
+            </a:ext>
+          </a:extLst>
+        </p:cNvPr>
+        <p:cNvGrpSpPr/>
+        <p:nvPr/>
+      </p:nvGrpSpPr>
+      <p:grpSpPr>
+        <a:xfrm>
+          <a:off x="0" y="0"/>
+          <a:ext cx="0" cy="0"/>
+          <a:chOff x="0" y="0"/>
+          <a:chExt cx="0" cy="0"/>
+        </a:xfrm>
+      </p:grpSpPr>
+      <p:pic>
+        <p:nvPicPr>
+          <p:cNvPr id="27" name="Picture 26" descr="A screen with many colors&#10;&#10;AI-generated content may be incorrect.">
+            <a:extLst>
+              <a:ext uri="{FF2B5EF4-FFF2-40B4-BE49-F238E27FC236}">
+                <a16:creationId xmlns:a16="http://schemas.microsoft.com/office/drawing/2014/main" id="{35C4AAE8-28BD-9AFA-CECF-401852188E87}"/>
+              </a:ext>
+            </a:extLst>
+          </p:cNvPr>
+          <p:cNvPicPr>
+            <a:picLocks noChangeAspect="1"/>
+          </p:cNvPicPr>
+          <p:nvPr/>
+        </p:nvPicPr>
+        <p:blipFill>
+          <a:blip r:embed="rId3"/>
+          <a:stretch>
+            <a:fillRect/>
+          </a:stretch>
+        </p:blipFill>
+        <p:spPr>
+          <a:xfrm>
+            <a:off x="1371600" y="4343400"/>
+            <a:ext cx="1791883" cy="1066800"/>
+          </a:xfrm>
+          <a:prstGeom prst="rect">
+            <a:avLst/>
+          </a:prstGeom>
+        </p:spPr>
+      </p:pic>
+      <p:pic>
+        <p:nvPicPr>
+          <p:cNvPr id="29" name="Picture 28">
+            <a:extLst>
+              <a:ext uri="{FF2B5EF4-FFF2-40B4-BE49-F238E27FC236}">
+                <a16:creationId xmlns:a16="http://schemas.microsoft.com/office/drawing/2014/main" id="{6F245036-97D1-C14E-285C-580A8C743717}"/>
+              </a:ext>
+            </a:extLst>
+          </p:cNvPr>
+          <p:cNvPicPr>
+            <a:picLocks noChangeAspect="1"/>
+          </p:cNvPicPr>
+          <p:nvPr/>
+        </p:nvPicPr>
+        <p:blipFill>
+          <a:blip r:embed="rId4"/>
+          <a:stretch>
+            <a:fillRect/>
+          </a:stretch>
+        </p:blipFill>
+        <p:spPr>
+          <a:xfrm>
+            <a:off x="0" y="3206525"/>
+            <a:ext cx="12192000" cy="1136875"/>
+          </a:xfrm>
+          <a:prstGeom prst="rect">
+            <a:avLst/>
+          </a:prstGeom>
+        </p:spPr>
+      </p:pic>
+      <p:sp>
+        <p:nvSpPr>
+          <p:cNvPr id="4" name="Title 1">
+            <a:extLst>
+              <a:ext uri="{FF2B5EF4-FFF2-40B4-BE49-F238E27FC236}">
+                <a16:creationId xmlns:a16="http://schemas.microsoft.com/office/drawing/2014/main" id="{83FB57A5-C562-292C-DCB8-DED9956E2946}"/>
+              </a:ext>
+            </a:extLst>
+          </p:cNvPr>
+          <p:cNvSpPr>
+            <a:spLocks noGrp="1"/>
+          </p:cNvSpPr>
+          <p:nvPr>
+            <p:ph type="title"/>
+          </p:nvPr>
+        </p:nvSpPr>
+        <p:spPr>
+          <a:xfrm>
+            <a:off x="1219200" y="457200"/>
+            <a:ext cx="9448800" cy="1143000"/>
+          </a:xfrm>
+        </p:spPr>
+        <p:txBody>
+          <a:bodyPr/>
+          <a:lstStyle/>
+          <a:p>
+            <a:r>
+              <a:rPr lang="en-US" dirty="0"/>
+              <a:t>User interface</a:t>
+            </a:r>
+          </a:p>
+        </p:txBody>
+      </p:sp>
+    </p:spTree>
+    <p:extLst>
+      <p:ext uri="{BB962C8B-B14F-4D97-AF65-F5344CB8AC3E}">
+        <p14:creationId xmlns:p14="http://schemas.microsoft.com/office/powerpoint/2010/main" val="3500706204"/>
+      </p:ext>
+    </p:extLst>
+  </p:cSld>
+  <p:clrMapOvr>
+    <a:masterClrMapping/>
+  </p:clrMapOvr>
+</p:sld>
+</file>
+
+<file path=ppt/slides/slide11.xml><?xml version="1.0" encoding="utf-8"?>
 <p:sld xmlns:a="http://schemas.openxmlformats.org/drawingml/2006/main" xmlns:r="http://schemas.openxmlformats.org/officeDocument/2006/relationships" xmlns:p="http://schemas.openxmlformats.org/presentationml/2006/main">
   <p:cSld>
     <p:spTree>
@@ -11496,8 +11685,8 @@
           </a:p>
         </p:txBody>
       </p:sp>
-      <mc:AlternateContent xmlns:mc="http://schemas.openxmlformats.org/markup-compatibility/2006">
-        <mc:Choice xmlns:a14="http://schemas.microsoft.com/office/drawing/2010/main" Requires="a14">
+      <mc:AlternateContent xmlns:mc="http://schemas.openxmlformats.org/markup-compatibility/2006" xmlns:a14="http://schemas.microsoft.com/office/drawing/2010/main">
+        <mc:Choice Requires="a14">
           <p:sp>
             <p:nvSpPr>
               <p:cNvPr id="10" name="Content Placeholder 2">
@@ -11799,7 +11988,19 @@
                           <a:rPr lang="en-US" b="0" i="1" smtClean="0">
                             <a:latin typeface="Cambria Math" panose="02040503050406030204" pitchFamily="18" charset="0"/>
                           </a:rPr>
-                          <m:t>𝑀h𝑧</m:t>
+                          <m:t>𝑀</m:t>
+                        </m:r>
+                        <m:r>
+                          <a:rPr lang="en-US" b="0" i="1" smtClean="0">
+                            <a:latin typeface="Cambria Math" panose="02040503050406030204" pitchFamily="18" charset="0"/>
+                          </a:rPr>
+                          <m:t>h</m:t>
+                        </m:r>
+                        <m:r>
+                          <a:rPr lang="en-US" b="0" i="1" smtClean="0">
+                            <a:latin typeface="Cambria Math" panose="02040503050406030204" pitchFamily="18" charset="0"/>
+                          </a:rPr>
+                          <m:t>𝑧</m:t>
                         </m:r>
                       </m:num>
                       <m:den>
@@ -11816,7 +12017,14 @@
                         <a:latin typeface="Cambria Math" panose="02040503050406030204" pitchFamily="18" charset="0"/>
                         <a:ea typeface="Cambria Math" panose="02040503050406030204" pitchFamily="18" charset="0"/>
                       </a:rPr>
-                      <m:t>≈100</m:t>
+                      <m:t>≈</m:t>
+                    </m:r>
+                    <m:r>
+                      <a:rPr lang="en-US" b="0" i="1" smtClean="0">
+                        <a:latin typeface="Cambria Math" panose="02040503050406030204" pitchFamily="18" charset="0"/>
+                        <a:ea typeface="Cambria Math" panose="02040503050406030204" pitchFamily="18" charset="0"/>
+                      </a:rPr>
+                      <m:t>100</m:t>
                     </m:r>
                     <m:r>
                       <a:rPr lang="en-US" b="0" i="1" smtClean="0">
@@ -11835,7 +12043,7 @@
             </p:txBody>
           </p:sp>
         </mc:Choice>
-        <mc:Fallback>
+        <mc:Fallback xmlns="">
           <p:sp>
             <p:nvSpPr>
               <p:cNvPr id="10" name="Content Placeholder 2">
@@ -13217,7 +13425,7 @@
 </p:sld>
 </file>
 
-<file path=ppt/slides/slide11.xml><?xml version="1.0" encoding="utf-8"?>
+<file path=ppt/slides/slide12.xml><?xml version="1.0" encoding="utf-8"?>
 <p:sld xmlns:a="http://schemas.openxmlformats.org/drawingml/2006/main" xmlns:r="http://schemas.openxmlformats.org/officeDocument/2006/relationships" xmlns:p="http://schemas.openxmlformats.org/presentationml/2006/main">
   <p:cSld>
     <p:spTree>
@@ -14930,7 +15138,7 @@
 </p:sld>
 </file>
 
-<file path=ppt/slides/slide12.xml><?xml version="1.0" encoding="utf-8"?>
+<file path=ppt/slides/slide13.xml><?xml version="1.0" encoding="utf-8"?>
 <p:sld xmlns:a="http://schemas.openxmlformats.org/drawingml/2006/main" xmlns:r="http://schemas.openxmlformats.org/officeDocument/2006/relationships" xmlns:p="http://schemas.openxmlformats.org/presentationml/2006/main">
   <p:cSld>
     <p:spTree>
@@ -15726,7 +15934,7 @@
 </p:sld>
 </file>
 
-<file path=ppt/slides/slide13.xml><?xml version="1.0" encoding="utf-8"?>
+<file path=ppt/slides/slide14.xml><?xml version="1.0" encoding="utf-8"?>
 <p:sld xmlns:a="http://schemas.openxmlformats.org/drawingml/2006/main" xmlns:r="http://schemas.openxmlformats.org/officeDocument/2006/relationships" xmlns:p="http://schemas.openxmlformats.org/presentationml/2006/main">
   <p:cSld>
     <p:spTree>
@@ -18411,7 +18619,7 @@
 </p:sld>
 </file>
 
-<file path=ppt/slides/slide14.xml><?xml version="1.0" encoding="utf-8"?>
+<file path=ppt/slides/slide15.xml><?xml version="1.0" encoding="utf-8"?>
 <p:sld xmlns:a="http://schemas.openxmlformats.org/drawingml/2006/main" xmlns:r="http://schemas.openxmlformats.org/officeDocument/2006/relationships" xmlns:p="http://schemas.openxmlformats.org/presentationml/2006/main">
   <p:cSld>
     <p:spTree>
@@ -18554,7 +18762,7 @@
 </p:sld>
 </file>
 
-<file path=ppt/slides/slide15.xml><?xml version="1.0" encoding="utf-8"?>
+<file path=ppt/slides/slide16.xml><?xml version="1.0" encoding="utf-8"?>
 <p:sld xmlns:a="http://schemas.openxmlformats.org/drawingml/2006/main" xmlns:r="http://schemas.openxmlformats.org/officeDocument/2006/relationships" xmlns:p="http://schemas.openxmlformats.org/presentationml/2006/main">
   <p:cSld>
     <p:spTree>
@@ -18718,98 +18926,6 @@
 </p:sld>
 </file>
 
-<file path=ppt/slides/slide16.xml><?xml version="1.0" encoding="utf-8"?>
-<p:sld xmlns:a="http://schemas.openxmlformats.org/drawingml/2006/main" xmlns:r="http://schemas.openxmlformats.org/officeDocument/2006/relationships" xmlns:p="http://schemas.openxmlformats.org/presentationml/2006/main">
-  <p:cSld>
-    <p:spTree>
-      <p:nvGrpSpPr>
-        <p:cNvPr id="1" name=""/>
-        <p:cNvGrpSpPr/>
-        <p:nvPr/>
-      </p:nvGrpSpPr>
-      <p:grpSpPr>
-        <a:xfrm>
-          <a:off x="0" y="0"/>
-          <a:ext cx="0" cy="0"/>
-          <a:chOff x="0" y="0"/>
-          <a:chExt cx="0" cy="0"/>
-        </a:xfrm>
-      </p:grpSpPr>
-      <p:sp>
-        <p:nvSpPr>
-          <p:cNvPr id="2" name="Title 1"/>
-          <p:cNvSpPr>
-            <a:spLocks noGrp="1"/>
-          </p:cNvSpPr>
-          <p:nvPr>
-            <p:ph type="title"/>
-          </p:nvPr>
-        </p:nvSpPr>
-        <p:spPr/>
-        <p:txBody>
-          <a:bodyPr/>
-          <a:lstStyle/>
-          <a:p>
-            <a:r>
-              <a:rPr lang="en-US" dirty="0"/>
-              <a:t>WIP, Future features / improvements</a:t>
-            </a:r>
-            <a:endParaRPr dirty="0"/>
-          </a:p>
-        </p:txBody>
-      </p:sp>
-      <p:sp>
-        <p:nvSpPr>
-          <p:cNvPr id="4" name="Content Placeholder 3">
-            <a:extLst>
-              <a:ext uri="{FF2B5EF4-FFF2-40B4-BE49-F238E27FC236}">
-                <a16:creationId xmlns:a16="http://schemas.microsoft.com/office/drawing/2014/main" id="{EF49BA9A-B574-A112-8B33-7056735E53D0}"/>
-              </a:ext>
-            </a:extLst>
-          </p:cNvPr>
-          <p:cNvSpPr>
-            <a:spLocks noGrp="1"/>
-          </p:cNvSpPr>
-          <p:nvPr>
-            <p:ph idx="1"/>
-          </p:nvPr>
-        </p:nvSpPr>
-        <p:spPr/>
-        <p:txBody>
-          <a:bodyPr/>
-          <a:lstStyle/>
-          <a:p>
-            <a:pPr marL="457200" indent="-457200">
-              <a:buFont typeface="+mj-lt"/>
-              <a:buAutoNum type="arabicPeriod"/>
-            </a:pPr>
-            <a:r>
-              <a:rPr lang="en-US" dirty="0"/>
-              <a:t>DSP utilize..</a:t>
-            </a:r>
-          </a:p>
-          <a:p>
-            <a:pPr marL="457200" indent="-457200">
-              <a:buFont typeface="+mj-lt"/>
-              <a:buAutoNum type="arabicPeriod"/>
-            </a:pPr>
-            <a:endParaRPr lang="en-US" dirty="0"/>
-          </a:p>
-        </p:txBody>
-      </p:sp>
-    </p:spTree>
-    <p:extLst>
-      <p:ext uri="{BB962C8B-B14F-4D97-AF65-F5344CB8AC3E}">
-        <p14:creationId xmlns:p14="http://schemas.microsoft.com/office/powerpoint/2010/main" val="1153027685"/>
-      </p:ext>
-    </p:extLst>
-  </p:cSld>
-  <p:clrMapOvr>
-    <a:masterClrMapping/>
-  </p:clrMapOvr>
-</p:sld>
-</file>
-
 <file path=ppt/slides/slide17.xml><?xml version="1.0" encoding="utf-8"?>
 <p:sld xmlns:a="http://schemas.openxmlformats.org/drawingml/2006/main" xmlns:r="http://schemas.openxmlformats.org/officeDocument/2006/relationships" xmlns:p="http://schemas.openxmlformats.org/presentationml/2006/main">
   <p:cSld>
@@ -18844,7 +18960,7 @@
           <a:p>
             <a:r>
               <a:rPr lang="en-US" dirty="0"/>
-              <a:t>Add a Slide Title - 1</a:t>
+              <a:t>WIP, Future features / improvements</a:t>
             </a:r>
             <a:endParaRPr dirty="0"/>
           </a:p>
@@ -18852,12 +18968,18 @@
       </p:sp>
       <p:sp>
         <p:nvSpPr>
-          <p:cNvPr id="3" name="Text Placeholder 2"/>
+          <p:cNvPr id="4" name="Content Placeholder 3">
+            <a:extLst>
+              <a:ext uri="{FF2B5EF4-FFF2-40B4-BE49-F238E27FC236}">
+                <a16:creationId xmlns:a16="http://schemas.microsoft.com/office/drawing/2014/main" id="{EF49BA9A-B574-A112-8B33-7056735E53D0}"/>
+              </a:ext>
+            </a:extLst>
+          </p:cNvPr>
           <p:cNvSpPr>
             <a:spLocks noGrp="1"/>
           </p:cNvSpPr>
           <p:nvPr>
-            <p:ph type="body" idx="1"/>
+            <p:ph idx="1"/>
           </p:nvPr>
         </p:nvSpPr>
         <p:spPr/>
@@ -18865,14 +18987,28 @@
           <a:bodyPr/>
           <a:lstStyle/>
           <a:p>
-            <a:endParaRPr/>
+            <a:pPr marL="457200" indent="-457200">
+              <a:buFont typeface="+mj-lt"/>
+              <a:buAutoNum type="arabicPeriod"/>
+            </a:pPr>
+            <a:r>
+              <a:rPr lang="en-US" dirty="0"/>
+              <a:t>DSP utilize..</a:t>
+            </a:r>
+          </a:p>
+          <a:p>
+            <a:pPr marL="457200" indent="-457200">
+              <a:buFont typeface="+mj-lt"/>
+              <a:buAutoNum type="arabicPeriod"/>
+            </a:pPr>
+            <a:endParaRPr lang="en-US" dirty="0"/>
           </a:p>
         </p:txBody>
       </p:sp>
     </p:spTree>
     <p:extLst>
       <p:ext uri="{BB962C8B-B14F-4D97-AF65-F5344CB8AC3E}">
-        <p14:creationId xmlns:p14="http://schemas.microsoft.com/office/powerpoint/2010/main" val="3444435236"/>
+        <p14:creationId xmlns:p14="http://schemas.microsoft.com/office/powerpoint/2010/main" val="1153027685"/>
       </p:ext>
     </p:extLst>
   </p:cSld>
@@ -18916,7 +19052,7 @@
           <a:p>
             <a:r>
               <a:rPr lang="en-US" dirty="0"/>
-              <a:t>Add a Slide Title - 2</a:t>
+              <a:t>Add a Slide Title - 1</a:t>
             </a:r>
             <a:endParaRPr dirty="0"/>
           </a:p>
@@ -18941,67 +19077,10 @@
           </a:p>
         </p:txBody>
       </p:sp>
-      <p:sp>
-        <p:nvSpPr>
-          <p:cNvPr id="4" name="Content Placeholder 3"/>
-          <p:cNvSpPr>
-            <a:spLocks noGrp="1"/>
-          </p:cNvSpPr>
-          <p:nvPr>
-            <p:ph sz="half" idx="2"/>
-          </p:nvPr>
-        </p:nvSpPr>
-        <p:spPr/>
-        <p:txBody>
-          <a:bodyPr/>
-          <a:lstStyle/>
-          <a:p>
-            <a:endParaRPr/>
-          </a:p>
-        </p:txBody>
-      </p:sp>
-      <p:sp>
-        <p:nvSpPr>
-          <p:cNvPr id="5" name="Text Placeholder 4"/>
-          <p:cNvSpPr>
-            <a:spLocks noGrp="1"/>
-          </p:cNvSpPr>
-          <p:nvPr>
-            <p:ph type="body" sz="quarter" idx="3"/>
-          </p:nvPr>
-        </p:nvSpPr>
-        <p:spPr/>
-        <p:txBody>
-          <a:bodyPr/>
-          <a:lstStyle/>
-          <a:p>
-            <a:endParaRPr/>
-          </a:p>
-        </p:txBody>
-      </p:sp>
-      <p:sp>
-        <p:nvSpPr>
-          <p:cNvPr id="6" name="Content Placeholder 5"/>
-          <p:cNvSpPr>
-            <a:spLocks noGrp="1"/>
-          </p:cNvSpPr>
-          <p:nvPr>
-            <p:ph sz="quarter" idx="4"/>
-          </p:nvPr>
-        </p:nvSpPr>
-        <p:spPr/>
-        <p:txBody>
-          <a:bodyPr/>
-          <a:lstStyle/>
-          <a:p>
-            <a:endParaRPr/>
-          </a:p>
-        </p:txBody>
-      </p:sp>
     </p:spTree>
     <p:extLst>
       <p:ext uri="{BB962C8B-B14F-4D97-AF65-F5344CB8AC3E}">
-        <p14:creationId xmlns:p14="http://schemas.microsoft.com/office/powerpoint/2010/main" val="1475842300"/>
+        <p14:creationId xmlns:p14="http://schemas.microsoft.com/office/powerpoint/2010/main" val="3444435236"/>
       </p:ext>
     </p:extLst>
   </p:cSld>
@@ -19045,16 +19124,92 @@
           <a:p>
             <a:r>
               <a:rPr lang="en-US" dirty="0"/>
-              <a:t>Add a Slide Title - 3</a:t>
+              <a:t>Add a Slide Title - 2</a:t>
             </a:r>
             <a:endParaRPr dirty="0"/>
+          </a:p>
+        </p:txBody>
+      </p:sp>
+      <p:sp>
+        <p:nvSpPr>
+          <p:cNvPr id="3" name="Text Placeholder 2"/>
+          <p:cNvSpPr>
+            <a:spLocks noGrp="1"/>
+          </p:cNvSpPr>
+          <p:nvPr>
+            <p:ph type="body" idx="1"/>
+          </p:nvPr>
+        </p:nvSpPr>
+        <p:spPr/>
+        <p:txBody>
+          <a:bodyPr/>
+          <a:lstStyle/>
+          <a:p>
+            <a:endParaRPr/>
+          </a:p>
+        </p:txBody>
+      </p:sp>
+      <p:sp>
+        <p:nvSpPr>
+          <p:cNvPr id="4" name="Content Placeholder 3"/>
+          <p:cNvSpPr>
+            <a:spLocks noGrp="1"/>
+          </p:cNvSpPr>
+          <p:nvPr>
+            <p:ph sz="half" idx="2"/>
+          </p:nvPr>
+        </p:nvSpPr>
+        <p:spPr/>
+        <p:txBody>
+          <a:bodyPr/>
+          <a:lstStyle/>
+          <a:p>
+            <a:endParaRPr/>
+          </a:p>
+        </p:txBody>
+      </p:sp>
+      <p:sp>
+        <p:nvSpPr>
+          <p:cNvPr id="5" name="Text Placeholder 4"/>
+          <p:cNvSpPr>
+            <a:spLocks noGrp="1"/>
+          </p:cNvSpPr>
+          <p:nvPr>
+            <p:ph type="body" sz="quarter" idx="3"/>
+          </p:nvPr>
+        </p:nvSpPr>
+        <p:spPr/>
+        <p:txBody>
+          <a:bodyPr/>
+          <a:lstStyle/>
+          <a:p>
+            <a:endParaRPr/>
+          </a:p>
+        </p:txBody>
+      </p:sp>
+      <p:sp>
+        <p:nvSpPr>
+          <p:cNvPr id="6" name="Content Placeholder 5"/>
+          <p:cNvSpPr>
+            <a:spLocks noGrp="1"/>
+          </p:cNvSpPr>
+          <p:nvPr>
+            <p:ph sz="quarter" idx="4"/>
+          </p:nvPr>
+        </p:nvSpPr>
+        <p:spPr/>
+        <p:txBody>
+          <a:bodyPr/>
+          <a:lstStyle/>
+          <a:p>
+            <a:endParaRPr/>
           </a:p>
         </p:txBody>
       </p:sp>
     </p:spTree>
     <p:extLst>
       <p:ext uri="{BB962C8B-B14F-4D97-AF65-F5344CB8AC3E}">
-        <p14:creationId xmlns:p14="http://schemas.microsoft.com/office/powerpoint/2010/main" val="215988672"/>
+        <p14:creationId xmlns:p14="http://schemas.microsoft.com/office/powerpoint/2010/main" val="1475842300"/>
       </p:ext>
     </p:extLst>
   </p:cSld>
@@ -19127,7 +19282,36 @@
               <a:rPr lang="en-US" dirty="0"/>
               <a:t>System Overview</a:t>
             </a:r>
-            <a:endParaRPr dirty="0"/>
+          </a:p>
+          <a:p>
+            <a:pPr marL="457200" indent="-457200">
+              <a:buFont typeface="+mj-lt"/>
+              <a:buAutoNum type="arabicPeriod"/>
+            </a:pPr>
+            <a:r>
+              <a:rPr lang="en-US" dirty="0"/>
+              <a:t>Project’s steps</a:t>
+            </a:r>
+          </a:p>
+          <a:p>
+            <a:pPr marL="457200" indent="-457200">
+              <a:buFont typeface="+mj-lt"/>
+              <a:buAutoNum type="arabicPeriod"/>
+            </a:pPr>
+            <a:r>
+              <a:rPr lang="en-US" dirty="0"/>
+              <a:t>User interface</a:t>
+            </a:r>
+          </a:p>
+          <a:p>
+            <a:pPr marL="457200" indent="-457200">
+              <a:buFont typeface="+mj-lt"/>
+              <a:buAutoNum type="arabicPeriod"/>
+            </a:pPr>
+            <a:r>
+              <a:rPr lang="en-US" dirty="0"/>
+              <a:t>Architectures</a:t>
+            </a:r>
           </a:p>
         </p:txBody>
       </p:sp>
@@ -19161,6 +19345,59 @@
           <a:chExt cx="0" cy="0"/>
         </a:xfrm>
       </p:grpSpPr>
+      <p:sp>
+        <p:nvSpPr>
+          <p:cNvPr id="2" name="Title 1"/>
+          <p:cNvSpPr>
+            <a:spLocks noGrp="1"/>
+          </p:cNvSpPr>
+          <p:nvPr>
+            <p:ph type="title"/>
+          </p:nvPr>
+        </p:nvSpPr>
+        <p:spPr/>
+        <p:txBody>
+          <a:bodyPr/>
+          <a:lstStyle/>
+          <a:p>
+            <a:r>
+              <a:rPr lang="en-US" dirty="0"/>
+              <a:t>Add a Slide Title - 3</a:t>
+            </a:r>
+            <a:endParaRPr dirty="0"/>
+          </a:p>
+        </p:txBody>
+      </p:sp>
+    </p:spTree>
+    <p:extLst>
+      <p:ext uri="{BB962C8B-B14F-4D97-AF65-F5344CB8AC3E}">
+        <p14:creationId xmlns:p14="http://schemas.microsoft.com/office/powerpoint/2010/main" val="215988672"/>
+      </p:ext>
+    </p:extLst>
+  </p:cSld>
+  <p:clrMapOvr>
+    <a:masterClrMapping/>
+  </p:clrMapOvr>
+</p:sld>
+</file>
+
+<file path=ppt/slides/slide21.xml><?xml version="1.0" encoding="utf-8"?>
+<p:sld xmlns:a="http://schemas.openxmlformats.org/drawingml/2006/main" xmlns:r="http://schemas.openxmlformats.org/officeDocument/2006/relationships" xmlns:p="http://schemas.openxmlformats.org/presentationml/2006/main">
+  <p:cSld>
+    <p:spTree>
+      <p:nvGrpSpPr>
+        <p:cNvPr id="1" name=""/>
+        <p:cNvGrpSpPr/>
+        <p:nvPr/>
+      </p:nvGrpSpPr>
+      <p:grpSpPr>
+        <a:xfrm>
+          <a:off x="0" y="0"/>
+          <a:ext cx="0" cy="0"/>
+          <a:chOff x="0" y="0"/>
+          <a:chExt cx="0" cy="0"/>
+        </a:xfrm>
+      </p:grpSpPr>
     </p:spTree>
     <p:extLst>
       <p:ext uri="{BB962C8B-B14F-4D97-AF65-F5344CB8AC3E}">
@@ -19174,7 +19411,7 @@
 </p:sld>
 </file>
 
-<file path=ppt/slides/slide21.xml><?xml version="1.0" encoding="utf-8"?>
+<file path=ppt/slides/slide22.xml><?xml version="1.0" encoding="utf-8"?>
 <p:sld xmlns:a="http://schemas.openxmlformats.org/drawingml/2006/main" xmlns:r="http://schemas.openxmlformats.org/officeDocument/2006/relationships" xmlns:p="http://schemas.openxmlformats.org/presentationml/2006/main">
   <p:cSld>
     <p:spTree>
@@ -19265,7 +19502,7 @@
 </p:sld>
 </file>
 
-<file path=ppt/slides/slide22.xml><?xml version="1.0" encoding="utf-8"?>
+<file path=ppt/slides/slide23.xml><?xml version="1.0" encoding="utf-8"?>
 <p:sld xmlns:a="http://schemas.openxmlformats.org/drawingml/2006/main" xmlns:r="http://schemas.openxmlformats.org/officeDocument/2006/relationships" xmlns:p="http://schemas.openxmlformats.org/presentationml/2006/main">
   <p:cSld>
     <p:spTree>
@@ -19501,36 +19738,403 @@
           </a:p>
         </p:txBody>
       </p:sp>
-      <p:pic>
-        <p:nvPicPr>
-          <p:cNvPr id="3" name="Picture 2">
+      <p:grpSp>
+        <p:nvGrpSpPr>
+          <p:cNvPr id="10" name="Group 9">
             <a:extLst>
               <a:ext uri="{FF2B5EF4-FFF2-40B4-BE49-F238E27FC236}">
-                <a16:creationId xmlns:a16="http://schemas.microsoft.com/office/drawing/2014/main" id="{2918F484-533B-7CD8-5D99-D641C3EB2CB5}"/>
+                <a16:creationId xmlns:a16="http://schemas.microsoft.com/office/drawing/2014/main" id="{81E2FB34-6381-0205-C4DF-08AC97370415}"/>
               </a:ext>
             </a:extLst>
           </p:cNvPr>
-          <p:cNvPicPr>
-            <a:picLocks noChangeAspect="1"/>
-          </p:cNvPicPr>
+          <p:cNvGrpSpPr/>
           <p:nvPr/>
-        </p:nvPicPr>
-        <p:blipFill>
-          <a:blip r:embed="rId3"/>
-          <a:stretch>
-            <a:fillRect/>
-          </a:stretch>
-        </p:blipFill>
-        <p:spPr>
+        </p:nvGrpSpPr>
+        <p:grpSpPr>
           <a:xfrm>
-            <a:off x="1905000" y="4459834"/>
-            <a:ext cx="1828800" cy="1641305"/>
+            <a:off x="6400800" y="2133600"/>
+            <a:ext cx="5245415" cy="4343400"/>
+            <a:chOff x="2047025" y="-122464"/>
+            <a:chExt cx="9294390" cy="6980464"/>
           </a:xfrm>
-          <a:prstGeom prst="rect">
-            <a:avLst/>
-          </a:prstGeom>
-        </p:spPr>
-      </p:pic>
+        </p:grpSpPr>
+        <p:pic>
+          <p:nvPicPr>
+            <p:cNvPr id="2" name="Content Placeholder 7">
+              <a:extLst>
+                <a:ext uri="{FF2B5EF4-FFF2-40B4-BE49-F238E27FC236}">
+                  <a16:creationId xmlns:a16="http://schemas.microsoft.com/office/drawing/2014/main" id="{B3AFCDE3-EB07-C8D4-9460-07B7254D6D82}"/>
+                </a:ext>
+              </a:extLst>
+            </p:cNvPr>
+            <p:cNvPicPr>
+              <a:picLocks noChangeAspect="1"/>
+            </p:cNvPicPr>
+            <p:nvPr/>
+          </p:nvPicPr>
+          <p:blipFill>
+            <a:blip r:embed="rId3"/>
+            <a:stretch>
+              <a:fillRect/>
+            </a:stretch>
+          </p:blipFill>
+          <p:spPr>
+            <a:xfrm>
+              <a:off x="2047025" y="4353560"/>
+              <a:ext cx="1686775" cy="1513840"/>
+            </a:xfrm>
+            <a:prstGeom prst="rect">
+              <a:avLst/>
+            </a:prstGeom>
+          </p:spPr>
+        </p:pic>
+        <p:pic>
+          <p:nvPicPr>
+            <p:cNvPr id="4" name="Picture 4" descr="Digilent Nexys A7">
+              <a:extLst>
+                <a:ext uri="{FF2B5EF4-FFF2-40B4-BE49-F238E27FC236}">
+                  <a16:creationId xmlns:a16="http://schemas.microsoft.com/office/drawing/2014/main" id="{DE04FBD6-EB0C-3A88-ACC0-6D030F11AC67}"/>
+                </a:ext>
+              </a:extLst>
+            </p:cNvPr>
+            <p:cNvPicPr>
+              <a:picLocks noChangeAspect="1" noChangeArrowheads="1"/>
+            </p:cNvPicPr>
+            <p:nvPr/>
+          </p:nvPicPr>
+          <p:blipFill rotWithShape="1">
+            <a:blip r:embed="rId4" cstate="print">
+              <a:extLst>
+                <a:ext uri="{28A0092B-C50C-407E-A947-70E740481C1C}">
+                  <a14:useLocalDpi xmlns:a14="http://schemas.microsoft.com/office/drawing/2010/main" val="0"/>
+                </a:ext>
+              </a:extLst>
+            </a:blip>
+            <a:srcRect l="6062" t="6060" r="9091" b="15152"/>
+            <a:stretch/>
+          </p:blipFill>
+          <p:spPr bwMode="auto">
+            <a:xfrm>
+              <a:off x="6663907" y="2514600"/>
+              <a:ext cx="4677508" cy="4343400"/>
+            </a:xfrm>
+            <a:prstGeom prst="rect">
+              <a:avLst/>
+            </a:prstGeom>
+            <a:noFill/>
+            <a:extLst>
+              <a:ext uri="{909E8E84-426E-40DD-AFC4-6F175D3DCCD1}">
+                <a14:hiddenFill xmlns:a14="http://schemas.microsoft.com/office/drawing/2010/main">
+                  <a:solidFill>
+                    <a:srgbClr val="FFFFFF"/>
+                  </a:solidFill>
+                </a14:hiddenFill>
+              </a:ext>
+            </a:extLst>
+          </p:spPr>
+        </p:pic>
+        <p:sp>
+          <p:nvSpPr>
+            <p:cNvPr id="5" name="Arrow: Right 4">
+              <a:extLst>
+                <a:ext uri="{FF2B5EF4-FFF2-40B4-BE49-F238E27FC236}">
+                  <a16:creationId xmlns:a16="http://schemas.microsoft.com/office/drawing/2014/main" id="{7328CD1D-59C4-D27B-1589-A246B064D6BF}"/>
+                </a:ext>
+              </a:extLst>
+            </p:cNvPr>
+            <p:cNvSpPr/>
+            <p:nvPr/>
+          </p:nvSpPr>
+          <p:spPr>
+            <a:xfrm>
+              <a:off x="3702481" y="4572000"/>
+              <a:ext cx="3231719" cy="457200"/>
+            </a:xfrm>
+            <a:prstGeom prst="rightArrow">
+              <a:avLst/>
+            </a:prstGeom>
+          </p:spPr>
+          <p:style>
+            <a:lnRef idx="2">
+              <a:schemeClr val="accent1">
+                <a:shade val="15000"/>
+              </a:schemeClr>
+            </a:lnRef>
+            <a:fillRef idx="1">
+              <a:schemeClr val="accent1"/>
+            </a:fillRef>
+            <a:effectRef idx="0">
+              <a:schemeClr val="accent1"/>
+            </a:effectRef>
+            <a:fontRef idx="minor">
+              <a:schemeClr val="lt1"/>
+            </a:fontRef>
+          </p:style>
+          <p:txBody>
+            <a:bodyPr rtlCol="0" anchor="ctr"/>
+            <a:lstStyle/>
+            <a:p>
+              <a:pPr algn="ctr"/>
+              <a:r>
+                <a:rPr lang="en-US" sz="1050" dirty="0">
+                  <a:solidFill>
+                    <a:schemeClr val="bg1"/>
+                  </a:solidFill>
+                </a:rPr>
+                <a:t>Pixel data, </a:t>
+              </a:r>
+              <a:r>
+                <a:rPr lang="en-US" sz="1050" dirty="0" err="1">
+                  <a:solidFill>
+                    <a:schemeClr val="bg1"/>
+                  </a:solidFill>
+                </a:rPr>
+                <a:t>clk</a:t>
+              </a:r>
+              <a:r>
+                <a:rPr lang="en-US" sz="1050" dirty="0">
+                  <a:solidFill>
+                    <a:schemeClr val="bg1"/>
+                  </a:solidFill>
+                </a:rPr>
+                <a:t>, sync signals</a:t>
+              </a:r>
+            </a:p>
+          </p:txBody>
+        </p:sp>
+        <p:sp>
+          <p:nvSpPr>
+            <p:cNvPr id="6" name="Arrow: Right 5">
+              <a:extLst>
+                <a:ext uri="{FF2B5EF4-FFF2-40B4-BE49-F238E27FC236}">
+                  <a16:creationId xmlns:a16="http://schemas.microsoft.com/office/drawing/2014/main" id="{8DE8CA77-9EC3-15ED-4CA3-CE93C86BAE4F}"/>
+                </a:ext>
+              </a:extLst>
+            </p:cNvPr>
+            <p:cNvSpPr/>
+            <p:nvPr/>
+          </p:nvSpPr>
+          <p:spPr>
+            <a:xfrm rot="10800000" flipV="1">
+              <a:off x="3744174" y="5333999"/>
+              <a:ext cx="3190026" cy="457200"/>
+            </a:xfrm>
+            <a:prstGeom prst="rightArrow">
+              <a:avLst>
+                <a:gd name="adj1" fmla="val 50000"/>
+                <a:gd name="adj2" fmla="val 86227"/>
+              </a:avLst>
+            </a:prstGeom>
+          </p:spPr>
+          <p:style>
+            <a:lnRef idx="2">
+              <a:schemeClr val="accent1">
+                <a:shade val="15000"/>
+              </a:schemeClr>
+            </a:lnRef>
+            <a:fillRef idx="1">
+              <a:schemeClr val="accent1"/>
+            </a:fillRef>
+            <a:effectRef idx="0">
+              <a:schemeClr val="accent1"/>
+            </a:effectRef>
+            <a:fontRef idx="minor">
+              <a:schemeClr val="lt1"/>
+            </a:fontRef>
+          </p:style>
+          <p:txBody>
+            <a:bodyPr rtlCol="0" anchor="ctr"/>
+            <a:lstStyle/>
+            <a:p>
+              <a:pPr algn="ctr"/>
+              <a:r>
+                <a:rPr lang="en-US" sz="1050" dirty="0">
+                  <a:solidFill>
+                    <a:schemeClr val="bg1"/>
+                  </a:solidFill>
+                </a:rPr>
+                <a:t>SCCB Config, </a:t>
+              </a:r>
+              <a:r>
+                <a:rPr lang="en-US" sz="1050" dirty="0" err="1">
+                  <a:solidFill>
+                    <a:schemeClr val="bg1"/>
+                  </a:solidFill>
+                </a:rPr>
+                <a:t>clk</a:t>
+              </a:r>
+              <a:r>
+                <a:rPr lang="en-US" sz="1050" dirty="0">
+                  <a:solidFill>
+                    <a:schemeClr val="bg1"/>
+                  </a:solidFill>
+                </a:rPr>
+                <a:t>, reset</a:t>
+              </a:r>
+            </a:p>
+          </p:txBody>
+        </p:sp>
+        <p:pic>
+          <p:nvPicPr>
+            <p:cNvPr id="7" name="Picture 6" descr="Vga Monitor 7 Inch 1024*600 Hd Mini Portable Monitor With Av Vga Input">
+              <a:extLst>
+                <a:ext uri="{FF2B5EF4-FFF2-40B4-BE49-F238E27FC236}">
+                  <a16:creationId xmlns:a16="http://schemas.microsoft.com/office/drawing/2014/main" id="{584C2B83-B9E1-A5CF-2B09-FA225822BF5D}"/>
+                </a:ext>
+              </a:extLst>
+            </p:cNvPr>
+            <p:cNvPicPr>
+              <a:picLocks noChangeAspect="1" noChangeArrowheads="1"/>
+            </p:cNvPicPr>
+            <p:nvPr/>
+          </p:nvPicPr>
+          <p:blipFill>
+            <a:blip r:embed="rId5" cstate="print">
+              <a:extLst>
+                <a:ext uri="{28A0092B-C50C-407E-A947-70E740481C1C}">
+                  <a14:useLocalDpi xmlns:a14="http://schemas.microsoft.com/office/drawing/2010/main" val="0"/>
+                </a:ext>
+              </a:extLst>
+            </a:blip>
+            <a:srcRect/>
+            <a:stretch>
+              <a:fillRect/>
+            </a:stretch>
+          </p:blipFill>
+          <p:spPr bwMode="auto">
+            <a:xfrm>
+              <a:off x="9067801" y="-122464"/>
+              <a:ext cx="1828800" cy="1828800"/>
+            </a:xfrm>
+            <a:prstGeom prst="rect">
+              <a:avLst/>
+            </a:prstGeom>
+            <a:noFill/>
+            <a:extLst>
+              <a:ext uri="{909E8E84-426E-40DD-AFC4-6F175D3DCCD1}">
+                <a14:hiddenFill xmlns:a14="http://schemas.microsoft.com/office/drawing/2010/main">
+                  <a:solidFill>
+                    <a:srgbClr val="FFFFFF"/>
+                  </a:solidFill>
+                </a14:hiddenFill>
+              </a:ext>
+            </a:extLst>
+          </p:spPr>
+        </p:pic>
+        <p:sp>
+          <p:nvSpPr>
+            <p:cNvPr id="8" name="Arrow: Up 7">
+              <a:extLst>
+                <a:ext uri="{FF2B5EF4-FFF2-40B4-BE49-F238E27FC236}">
+                  <a16:creationId xmlns:a16="http://schemas.microsoft.com/office/drawing/2014/main" id="{41D0016D-1008-52DD-053E-2FD9D74BA07C}"/>
+                </a:ext>
+              </a:extLst>
+            </p:cNvPr>
+            <p:cNvSpPr/>
+            <p:nvPr/>
+          </p:nvSpPr>
+          <p:spPr>
+            <a:xfrm>
+              <a:off x="9608109" y="1592036"/>
+              <a:ext cx="644246" cy="917121"/>
+            </a:xfrm>
+            <a:prstGeom prst="upArrow">
+              <a:avLst/>
+            </a:prstGeom>
+            <a:solidFill>
+              <a:srgbClr val="FFFF00"/>
+            </a:solidFill>
+          </p:spPr>
+          <p:style>
+            <a:lnRef idx="2">
+              <a:schemeClr val="accent1">
+                <a:shade val="15000"/>
+              </a:schemeClr>
+            </a:lnRef>
+            <a:fillRef idx="1">
+              <a:schemeClr val="accent1"/>
+            </a:fillRef>
+            <a:effectRef idx="0">
+              <a:schemeClr val="accent1"/>
+            </a:effectRef>
+            <a:fontRef idx="minor">
+              <a:schemeClr val="lt1"/>
+            </a:fontRef>
+          </p:style>
+          <p:txBody>
+            <a:bodyPr rot="0" spcFirstLastPara="0" vertOverflow="overflow" horzOverflow="overflow" vert="horz" wrap="square" lIns="91440" tIns="45720" rIns="91440" bIns="45720" numCol="1" spcCol="0" rtlCol="0" fromWordArt="0" anchor="ctr" anchorCtr="0" forceAA="0" compatLnSpc="1">
+              <a:prstTxWarp prst="textNoShape">
+                <a:avLst/>
+              </a:prstTxWarp>
+              <a:noAutofit/>
+            </a:bodyPr>
+            <a:lstStyle/>
+            <a:p>
+              <a:pPr algn="ctr"/>
+              <a:r>
+                <a:rPr lang="en-US" sz="1000" dirty="0">
+                  <a:solidFill>
+                    <a:schemeClr val="bg1"/>
+                  </a:solidFill>
+                </a:rPr>
+                <a:t>VGA</a:t>
+              </a:r>
+            </a:p>
+          </p:txBody>
+        </p:sp>
+        <p:sp>
+          <p:nvSpPr>
+            <p:cNvPr id="9" name="Rectangle 8">
+              <a:extLst>
+                <a:ext uri="{FF2B5EF4-FFF2-40B4-BE49-F238E27FC236}">
+                  <a16:creationId xmlns:a16="http://schemas.microsoft.com/office/drawing/2014/main" id="{6EEEB6E4-84DB-4500-1E17-8D69A02BB2A6}"/>
+                </a:ext>
+              </a:extLst>
+            </p:cNvPr>
+            <p:cNvSpPr/>
+            <p:nvPr/>
+          </p:nvSpPr>
+          <p:spPr>
+            <a:xfrm>
+              <a:off x="7239000" y="6019800"/>
+              <a:ext cx="1143000" cy="685800"/>
+            </a:xfrm>
+            <a:prstGeom prst="rect">
+              <a:avLst/>
+            </a:prstGeom>
+            <a:noFill/>
+            <a:ln w="76200">
+              <a:solidFill>
+                <a:srgbClr val="7030A0"/>
+              </a:solidFill>
+            </a:ln>
+          </p:spPr>
+          <p:style>
+            <a:lnRef idx="2">
+              <a:schemeClr val="accent1">
+                <a:shade val="15000"/>
+              </a:schemeClr>
+            </a:lnRef>
+            <a:fillRef idx="1">
+              <a:schemeClr val="accent1"/>
+            </a:fillRef>
+            <a:effectRef idx="0">
+              <a:schemeClr val="accent1"/>
+            </a:effectRef>
+            <a:fontRef idx="minor">
+              <a:schemeClr val="lt1"/>
+            </a:fontRef>
+          </p:style>
+          <p:txBody>
+            <a:bodyPr rtlCol="0" anchor="ctr"/>
+            <a:lstStyle/>
+            <a:p>
+              <a:pPr algn="ctr"/>
+              <a:endParaRPr lang="en-US" sz="1050"/>
+            </a:p>
+          </p:txBody>
+        </p:sp>
+      </p:grpSp>
     </p:spTree>
     <p:extLst>
       <p:ext uri="{BB962C8B-B14F-4D97-AF65-F5344CB8AC3E}">
@@ -19720,14 +20324,19 @@
             <p:ph type="title"/>
           </p:nvPr>
         </p:nvSpPr>
-        <p:spPr/>
+        <p:spPr>
+          <a:xfrm>
+            <a:off x="1219200" y="457200"/>
+            <a:ext cx="9448800" cy="1143000"/>
+          </a:xfrm>
+        </p:spPr>
         <p:txBody>
           <a:bodyPr/>
           <a:lstStyle/>
           <a:p>
             <a:r>
               <a:rPr lang="en-US" dirty="0"/>
-              <a:t>Architecture – Key FPGA Modules.</a:t>
+              <a:t>Architecture V1.0 – Key FPGA Modules.</a:t>
             </a:r>
           </a:p>
         </p:txBody>
@@ -19899,67 +20508,6 @@
           <a:p>
             <a:pPr algn="ctr"/>
             <a:endParaRPr lang="en-US"/>
-          </a:p>
-        </p:txBody>
-      </p:sp>
-      <p:sp>
-        <p:nvSpPr>
-          <p:cNvPr id="10" name="TextBox 9">
-            <a:extLst>
-              <a:ext uri="{FF2B5EF4-FFF2-40B4-BE49-F238E27FC236}">
-                <a16:creationId xmlns:a16="http://schemas.microsoft.com/office/drawing/2014/main" id="{1A92247E-E20E-06D9-4F7E-E85032172934}"/>
-              </a:ext>
-            </a:extLst>
-          </p:cNvPr>
-          <p:cNvSpPr txBox="1"/>
-          <p:nvPr/>
-        </p:nvSpPr>
-        <p:spPr>
-          <a:xfrm>
-            <a:off x="2209800" y="295870"/>
-            <a:ext cx="6094562" cy="923330"/>
-          </a:xfrm>
-          <a:prstGeom prst="rect">
-            <a:avLst/>
-          </a:prstGeom>
-          <a:noFill/>
-        </p:spPr>
-        <p:txBody>
-          <a:bodyPr wrap="square">
-            <a:spAutoFit/>
-          </a:bodyPr>
-          <a:lstStyle/>
-          <a:p>
-            <a:pPr marL="0" lvl="0" indent="0" algn="ctr" fontAlgn="base">
-              <a:spcAft>
-                <a:spcPct val="0"/>
-              </a:spcAft>
-              <a:buNone/>
-            </a:pPr>
-            <a:r>
-              <a:rPr lang="en-US" sz="1800" dirty="0"/>
-              <a:t>Capture → BRAM →  VGA</a:t>
-            </a:r>
-          </a:p>
-          <a:p>
-            <a:pPr algn="ctr" fontAlgn="base">
-              <a:spcAft>
-                <a:spcPct val="0"/>
-              </a:spcAft>
-            </a:pPr>
-            <a:r>
-              <a:rPr lang="en-US" sz="1800" dirty="0"/>
-              <a:t>Capture → Zoom → BRAM / 4 →  VGA</a:t>
-            </a:r>
-          </a:p>
-          <a:p>
-            <a:pPr marL="0" lvl="0" indent="0" algn="ctr" fontAlgn="base">
-              <a:spcAft>
-                <a:spcPct val="0"/>
-              </a:spcAft>
-              <a:buNone/>
-            </a:pPr>
-            <a:endParaRPr lang="en-US" sz="1800" dirty="0"/>
           </a:p>
         </p:txBody>
       </p:sp>
@@ -20374,6 +20922,973 @@
   <p:cSld>
     <p:spTree>
       <p:nvGrpSpPr>
+        <p:cNvPr id="1" name=""/>
+        <p:cNvGrpSpPr/>
+        <p:nvPr/>
+      </p:nvGrpSpPr>
+      <p:grpSpPr>
+        <a:xfrm>
+          <a:off x="0" y="0"/>
+          <a:ext cx="0" cy="0"/>
+          <a:chOff x="0" y="0"/>
+          <a:chExt cx="0" cy="0"/>
+        </a:xfrm>
+      </p:grpSpPr>
+      <p:sp>
+        <p:nvSpPr>
+          <p:cNvPr id="5" name="Rectangle: Rounded Corners 4">
+            <a:extLst>
+              <a:ext uri="{FF2B5EF4-FFF2-40B4-BE49-F238E27FC236}">
+                <a16:creationId xmlns:a16="http://schemas.microsoft.com/office/drawing/2014/main" id="{53BF9BD8-3035-878F-9986-5549548C2733}"/>
+              </a:ext>
+            </a:extLst>
+          </p:cNvPr>
+          <p:cNvSpPr/>
+          <p:nvPr/>
+        </p:nvSpPr>
+        <p:spPr>
+          <a:xfrm>
+            <a:off x="914400" y="2514600"/>
+            <a:ext cx="2057400" cy="1219200"/>
+          </a:xfrm>
+          <a:prstGeom prst="roundRect">
+            <a:avLst/>
+          </a:prstGeom>
+          <a:ln>
+            <a:noFill/>
+          </a:ln>
+          <a:effectLst>
+            <a:outerShdw blurRad="184150" dist="241300" dir="11520000" sx="110000" sy="110000" algn="ctr">
+              <a:srgbClr val="000000">
+                <a:alpha val="18000"/>
+              </a:srgbClr>
+            </a:outerShdw>
+            <a:reflection blurRad="6350" stA="50000" endA="300" endPos="38500" dist="50800" dir="5400000" sy="-100000" algn="bl" rotWithShape="0"/>
+          </a:effectLst>
+          <a:scene3d>
+            <a:camera prst="orthographicFront"/>
+            <a:lightRig rig="flood" dir="t">
+              <a:rot lat="0" lon="0" rev="13800000"/>
+            </a:lightRig>
+          </a:scene3d>
+          <a:sp3d extrusionH="107950" prstMaterial="plastic">
+            <a:bevelT w="82550" h="63500" prst="divot"/>
+            <a:bevelB/>
+          </a:sp3d>
+        </p:spPr>
+        <p:style>
+          <a:lnRef idx="2">
+            <a:schemeClr val="accent1">
+              <a:shade val="15000"/>
+            </a:schemeClr>
+          </a:lnRef>
+          <a:fillRef idx="1">
+            <a:schemeClr val="accent1"/>
+          </a:fillRef>
+          <a:effectRef idx="0">
+            <a:schemeClr val="accent1"/>
+          </a:effectRef>
+          <a:fontRef idx="minor">
+            <a:schemeClr val="lt1"/>
+          </a:fontRef>
+        </p:style>
+        <p:txBody>
+          <a:bodyPr rtlCol="1" anchor="ctr"/>
+          <a:lstStyle/>
+          <a:p>
+            <a:pPr algn="ctr"/>
+            <a:r>
+              <a:rPr lang="en-US" dirty="0"/>
+              <a:t>Capture</a:t>
+            </a:r>
+          </a:p>
+        </p:txBody>
+      </p:sp>
+      <p:sp>
+        <p:nvSpPr>
+          <p:cNvPr id="6" name="Rectangle: Rounded Corners 5">
+            <a:extLst>
+              <a:ext uri="{FF2B5EF4-FFF2-40B4-BE49-F238E27FC236}">
+                <a16:creationId xmlns:a16="http://schemas.microsoft.com/office/drawing/2014/main" id="{4BE9EA95-BCBD-6966-5CBE-934760BDD646}"/>
+              </a:ext>
+            </a:extLst>
+          </p:cNvPr>
+          <p:cNvSpPr/>
+          <p:nvPr/>
+        </p:nvSpPr>
+        <p:spPr>
+          <a:xfrm>
+            <a:off x="6096000" y="3886200"/>
+            <a:ext cx="2057400" cy="1219200"/>
+          </a:xfrm>
+          <a:prstGeom prst="roundRect">
+            <a:avLst/>
+          </a:prstGeom>
+          <a:ln>
+            <a:noFill/>
+          </a:ln>
+          <a:effectLst>
+            <a:outerShdw blurRad="184150" dist="241300" dir="11520000" sx="110000" sy="110000" algn="ctr">
+              <a:srgbClr val="000000">
+                <a:alpha val="18000"/>
+              </a:srgbClr>
+            </a:outerShdw>
+            <a:reflection blurRad="6350" stA="50000" endA="300" endPos="38500" dist="50800" dir="5400000" sy="-100000" algn="bl" rotWithShape="0"/>
+          </a:effectLst>
+          <a:scene3d>
+            <a:camera prst="orthographicFront"/>
+            <a:lightRig rig="flood" dir="t">
+              <a:rot lat="0" lon="0" rev="13800000"/>
+            </a:lightRig>
+          </a:scene3d>
+          <a:sp3d extrusionH="107950" prstMaterial="plastic">
+            <a:bevelT w="82550" h="63500" prst="divot"/>
+            <a:bevelB/>
+          </a:sp3d>
+        </p:spPr>
+        <p:style>
+          <a:lnRef idx="2">
+            <a:schemeClr val="accent1">
+              <a:shade val="15000"/>
+            </a:schemeClr>
+          </a:lnRef>
+          <a:fillRef idx="1">
+            <a:schemeClr val="accent1"/>
+          </a:fillRef>
+          <a:effectRef idx="0">
+            <a:schemeClr val="accent1"/>
+          </a:effectRef>
+          <a:fontRef idx="minor">
+            <a:schemeClr val="lt1"/>
+          </a:fontRef>
+        </p:style>
+        <p:txBody>
+          <a:bodyPr rtlCol="1" anchor="ctr"/>
+          <a:lstStyle/>
+          <a:p>
+            <a:pPr algn="ctr"/>
+            <a:r>
+              <a:rPr lang="en-US" dirty="0"/>
+              <a:t>Zoom x2</a:t>
+            </a:r>
+          </a:p>
+          <a:p>
+            <a:pPr algn="ctr"/>
+            <a:r>
+              <a:rPr lang="en-US" dirty="0"/>
+              <a:t>Pixel render</a:t>
+            </a:r>
+          </a:p>
+        </p:txBody>
+      </p:sp>
+      <p:sp>
+        <p:nvSpPr>
+          <p:cNvPr id="7" name="Rectangle: Rounded Corners 6">
+            <a:extLst>
+              <a:ext uri="{FF2B5EF4-FFF2-40B4-BE49-F238E27FC236}">
+                <a16:creationId xmlns:a16="http://schemas.microsoft.com/office/drawing/2014/main" id="{7522C5A2-3E31-D8BF-0028-D00BC66F4867}"/>
+              </a:ext>
+            </a:extLst>
+          </p:cNvPr>
+          <p:cNvSpPr/>
+          <p:nvPr/>
+        </p:nvSpPr>
+        <p:spPr>
+          <a:xfrm>
+            <a:off x="8686800" y="2514600"/>
+            <a:ext cx="2057400" cy="1219200"/>
+          </a:xfrm>
+          <a:prstGeom prst="roundRect">
+            <a:avLst/>
+          </a:prstGeom>
+          <a:ln>
+            <a:noFill/>
+          </a:ln>
+          <a:effectLst>
+            <a:outerShdw blurRad="184150" dist="241300" dir="11520000" sx="110000" sy="110000" algn="ctr">
+              <a:srgbClr val="000000">
+                <a:alpha val="18000"/>
+              </a:srgbClr>
+            </a:outerShdw>
+            <a:reflection blurRad="6350" stA="50000" endA="300" endPos="38500" dist="50800" dir="5400000" sy="-100000" algn="bl" rotWithShape="0"/>
+          </a:effectLst>
+          <a:scene3d>
+            <a:camera prst="orthographicFront"/>
+            <a:lightRig rig="flood" dir="t">
+              <a:rot lat="0" lon="0" rev="13800000"/>
+            </a:lightRig>
+          </a:scene3d>
+          <a:sp3d extrusionH="107950" prstMaterial="plastic">
+            <a:bevelT w="82550" h="63500" prst="divot"/>
+            <a:bevelB/>
+          </a:sp3d>
+        </p:spPr>
+        <p:style>
+          <a:lnRef idx="2">
+            <a:schemeClr val="accent1">
+              <a:shade val="15000"/>
+            </a:schemeClr>
+          </a:lnRef>
+          <a:fillRef idx="1">
+            <a:schemeClr val="accent1"/>
+          </a:fillRef>
+          <a:effectRef idx="0">
+            <a:schemeClr val="accent1"/>
+          </a:effectRef>
+          <a:fontRef idx="minor">
+            <a:schemeClr val="lt1"/>
+          </a:fontRef>
+        </p:style>
+        <p:txBody>
+          <a:bodyPr rtlCol="1" anchor="ctr"/>
+          <a:lstStyle/>
+          <a:p>
+            <a:pPr algn="ctr"/>
+            <a:r>
+              <a:rPr lang="en-US" dirty="0"/>
+              <a:t>VGA</a:t>
+            </a:r>
+          </a:p>
+        </p:txBody>
+      </p:sp>
+      <p:sp>
+        <p:nvSpPr>
+          <p:cNvPr id="11" name="Rectangle: Rounded Corners 10">
+            <a:extLst>
+              <a:ext uri="{FF2B5EF4-FFF2-40B4-BE49-F238E27FC236}">
+                <a16:creationId xmlns:a16="http://schemas.microsoft.com/office/drawing/2014/main" id="{FCED641C-AC96-E830-F45A-CB03C7E06983}"/>
+              </a:ext>
+            </a:extLst>
+          </p:cNvPr>
+          <p:cNvSpPr/>
+          <p:nvPr/>
+        </p:nvSpPr>
+        <p:spPr>
+          <a:xfrm>
+            <a:off x="3505200" y="2514600"/>
+            <a:ext cx="2057400" cy="1219200"/>
+          </a:xfrm>
+          <a:prstGeom prst="roundRect">
+            <a:avLst/>
+          </a:prstGeom>
+          <a:ln>
+            <a:noFill/>
+          </a:ln>
+          <a:effectLst>
+            <a:outerShdw blurRad="184150" dist="241300" dir="11520000" sx="110000" sy="110000" algn="ctr">
+              <a:srgbClr val="000000">
+                <a:alpha val="18000"/>
+              </a:srgbClr>
+            </a:outerShdw>
+            <a:reflection blurRad="6350" stA="50000" endA="300" endPos="38500" dist="50800" dir="5400000" sy="-100000" algn="bl" rotWithShape="0"/>
+          </a:effectLst>
+          <a:scene3d>
+            <a:camera prst="orthographicFront"/>
+            <a:lightRig rig="flood" dir="t">
+              <a:rot lat="0" lon="0" rev="13800000"/>
+            </a:lightRig>
+          </a:scene3d>
+          <a:sp3d extrusionH="107950" prstMaterial="plastic">
+            <a:bevelT w="82550" h="63500" prst="divot"/>
+            <a:bevelB/>
+          </a:sp3d>
+        </p:spPr>
+        <p:style>
+          <a:lnRef idx="2">
+            <a:schemeClr val="accent1">
+              <a:shade val="15000"/>
+            </a:schemeClr>
+          </a:lnRef>
+          <a:fillRef idx="1">
+            <a:schemeClr val="accent1"/>
+          </a:fillRef>
+          <a:effectRef idx="0">
+            <a:schemeClr val="accent1"/>
+          </a:effectRef>
+          <a:fontRef idx="minor">
+            <a:schemeClr val="lt1"/>
+          </a:fontRef>
+        </p:style>
+        <p:txBody>
+          <a:bodyPr rtlCol="1" anchor="ctr"/>
+          <a:lstStyle/>
+          <a:p>
+            <a:pPr algn="ctr"/>
+            <a:r>
+              <a:rPr lang="en-US" dirty="0"/>
+              <a:t>BRAM</a:t>
+            </a:r>
+          </a:p>
+          <a:p>
+            <a:pPr algn="ctr"/>
+            <a:r>
+              <a:rPr lang="en-US" dirty="0"/>
+              <a:t>(640 x 480 x 12)</a:t>
+            </a:r>
+          </a:p>
+        </p:txBody>
+      </p:sp>
+      <p:cxnSp>
+        <p:nvCxnSpPr>
+          <p:cNvPr id="13" name="Straight Arrow Connector 12">
+            <a:extLst>
+              <a:ext uri="{FF2B5EF4-FFF2-40B4-BE49-F238E27FC236}">
+                <a16:creationId xmlns:a16="http://schemas.microsoft.com/office/drawing/2014/main" id="{FFECE7BC-62B9-1651-C430-3AB8482C4A00}"/>
+              </a:ext>
+            </a:extLst>
+          </p:cNvPr>
+          <p:cNvCxnSpPr>
+            <a:stCxn id="5" idx="3"/>
+            <a:endCxn id="11" idx="1"/>
+          </p:cNvCxnSpPr>
+          <p:nvPr/>
+        </p:nvCxnSpPr>
+        <p:spPr>
+          <a:xfrm>
+            <a:off x="2971800" y="3124200"/>
+            <a:ext cx="533400" cy="0"/>
+          </a:xfrm>
+          <a:prstGeom prst="straightConnector1">
+            <a:avLst/>
+          </a:prstGeom>
+          <a:ln w="38100">
+            <a:solidFill>
+              <a:schemeClr val="tx1"/>
+            </a:solidFill>
+            <a:tailEnd type="triangle"/>
+          </a:ln>
+        </p:spPr>
+        <p:style>
+          <a:lnRef idx="1">
+            <a:schemeClr val="accent1"/>
+          </a:lnRef>
+          <a:fillRef idx="0">
+            <a:schemeClr val="accent1"/>
+          </a:fillRef>
+          <a:effectRef idx="0">
+            <a:schemeClr val="accent1"/>
+          </a:effectRef>
+          <a:fontRef idx="minor">
+            <a:schemeClr val="tx1"/>
+          </a:fontRef>
+        </p:style>
+      </p:cxnSp>
+      <p:cxnSp>
+        <p:nvCxnSpPr>
+          <p:cNvPr id="14" name="Straight Arrow Connector 13">
+            <a:extLst>
+              <a:ext uri="{FF2B5EF4-FFF2-40B4-BE49-F238E27FC236}">
+                <a16:creationId xmlns:a16="http://schemas.microsoft.com/office/drawing/2014/main" id="{45ED17D7-7C14-C87C-CB63-DF4D51DA5A5D}"/>
+              </a:ext>
+            </a:extLst>
+          </p:cNvPr>
+          <p:cNvCxnSpPr>
+            <a:cxnSpLocks/>
+          </p:cNvCxnSpPr>
+          <p:nvPr/>
+        </p:nvCxnSpPr>
+        <p:spPr>
+          <a:xfrm>
+            <a:off x="5562600" y="4495800"/>
+            <a:ext cx="533400" cy="0"/>
+          </a:xfrm>
+          <a:prstGeom prst="straightConnector1">
+            <a:avLst/>
+          </a:prstGeom>
+          <a:ln w="38100">
+            <a:solidFill>
+              <a:schemeClr val="tx1"/>
+            </a:solidFill>
+            <a:tailEnd type="triangle"/>
+          </a:ln>
+        </p:spPr>
+        <p:style>
+          <a:lnRef idx="1">
+            <a:schemeClr val="accent1"/>
+          </a:lnRef>
+          <a:fillRef idx="0">
+            <a:schemeClr val="accent1"/>
+          </a:fillRef>
+          <a:effectRef idx="0">
+            <a:schemeClr val="accent1"/>
+          </a:effectRef>
+          <a:fontRef idx="minor">
+            <a:schemeClr val="tx1"/>
+          </a:fontRef>
+        </p:style>
+      </p:cxnSp>
+      <p:cxnSp>
+        <p:nvCxnSpPr>
+          <p:cNvPr id="15" name="Straight Arrow Connector 14">
+            <a:extLst>
+              <a:ext uri="{FF2B5EF4-FFF2-40B4-BE49-F238E27FC236}">
+                <a16:creationId xmlns:a16="http://schemas.microsoft.com/office/drawing/2014/main" id="{3E57A641-8186-A7BB-359C-CC92232A88B6}"/>
+              </a:ext>
+            </a:extLst>
+          </p:cNvPr>
+          <p:cNvCxnSpPr>
+            <a:cxnSpLocks/>
+          </p:cNvCxnSpPr>
+          <p:nvPr/>
+        </p:nvCxnSpPr>
+        <p:spPr>
+          <a:xfrm>
+            <a:off x="8458200" y="3124200"/>
+            <a:ext cx="228600" cy="0"/>
+          </a:xfrm>
+          <a:prstGeom prst="straightConnector1">
+            <a:avLst/>
+          </a:prstGeom>
+          <a:ln w="38100">
+            <a:solidFill>
+              <a:schemeClr val="tx1"/>
+            </a:solidFill>
+            <a:tailEnd type="triangle"/>
+          </a:ln>
+        </p:spPr>
+        <p:style>
+          <a:lnRef idx="1">
+            <a:schemeClr val="accent1"/>
+          </a:lnRef>
+          <a:fillRef idx="0">
+            <a:schemeClr val="accent1"/>
+          </a:fillRef>
+          <a:effectRef idx="0">
+            <a:schemeClr val="accent1"/>
+          </a:effectRef>
+          <a:fontRef idx="minor">
+            <a:schemeClr val="tx1"/>
+          </a:fontRef>
+        </p:style>
+      </p:cxnSp>
+      <p:cxnSp>
+        <p:nvCxnSpPr>
+          <p:cNvPr id="16" name="Straight Arrow Connector 15">
+            <a:extLst>
+              <a:ext uri="{FF2B5EF4-FFF2-40B4-BE49-F238E27FC236}">
+                <a16:creationId xmlns:a16="http://schemas.microsoft.com/office/drawing/2014/main" id="{AC5F52EB-B7A6-B759-35B9-E6B94704ADB4}"/>
+              </a:ext>
+            </a:extLst>
+          </p:cNvPr>
+          <p:cNvCxnSpPr>
+            <a:cxnSpLocks/>
+          </p:cNvCxnSpPr>
+          <p:nvPr/>
+        </p:nvCxnSpPr>
+        <p:spPr>
+          <a:xfrm>
+            <a:off x="9715500" y="1828800"/>
+            <a:ext cx="0" cy="704850"/>
+          </a:xfrm>
+          <a:prstGeom prst="straightConnector1">
+            <a:avLst/>
+          </a:prstGeom>
+          <a:ln w="38100">
+            <a:solidFill>
+              <a:schemeClr val="tx1"/>
+            </a:solidFill>
+            <a:tailEnd type="triangle"/>
+          </a:ln>
+        </p:spPr>
+        <p:style>
+          <a:lnRef idx="1">
+            <a:schemeClr val="accent1"/>
+          </a:lnRef>
+          <a:fillRef idx="0">
+            <a:schemeClr val="accent1"/>
+          </a:fillRef>
+          <a:effectRef idx="0">
+            <a:schemeClr val="accent1"/>
+          </a:effectRef>
+          <a:fontRef idx="minor">
+            <a:schemeClr val="tx1"/>
+          </a:fontRef>
+        </p:style>
+      </p:cxnSp>
+      <p:cxnSp>
+        <p:nvCxnSpPr>
+          <p:cNvPr id="19" name="Straight Connector 18">
+            <a:extLst>
+              <a:ext uri="{FF2B5EF4-FFF2-40B4-BE49-F238E27FC236}">
+                <a16:creationId xmlns:a16="http://schemas.microsoft.com/office/drawing/2014/main" id="{F3B8D80B-CB0B-80C3-A1F2-7E0E10FB5CDB}"/>
+              </a:ext>
+            </a:extLst>
+          </p:cNvPr>
+          <p:cNvCxnSpPr/>
+          <p:nvPr/>
+        </p:nvCxnSpPr>
+        <p:spPr>
+          <a:xfrm flipH="1">
+            <a:off x="4533900" y="1828800"/>
+            <a:ext cx="5181600" cy="0"/>
+          </a:xfrm>
+          <a:prstGeom prst="line">
+            <a:avLst/>
+          </a:prstGeom>
+          <a:ln w="38100">
+            <a:solidFill>
+              <a:schemeClr val="tx1"/>
+            </a:solidFill>
+          </a:ln>
+        </p:spPr>
+        <p:style>
+          <a:lnRef idx="1">
+            <a:schemeClr val="accent1"/>
+          </a:lnRef>
+          <a:fillRef idx="0">
+            <a:schemeClr val="accent1"/>
+          </a:fillRef>
+          <a:effectRef idx="0">
+            <a:schemeClr val="accent1"/>
+          </a:effectRef>
+          <a:fontRef idx="minor">
+            <a:schemeClr val="tx1"/>
+          </a:fontRef>
+        </p:style>
+      </p:cxnSp>
+      <p:cxnSp>
+        <p:nvCxnSpPr>
+          <p:cNvPr id="21" name="Straight Connector 20">
+            <a:extLst>
+              <a:ext uri="{FF2B5EF4-FFF2-40B4-BE49-F238E27FC236}">
+                <a16:creationId xmlns:a16="http://schemas.microsoft.com/office/drawing/2014/main" id="{60E05E86-40B5-AF3C-1261-B39F1FCE09B8}"/>
+              </a:ext>
+            </a:extLst>
+          </p:cNvPr>
+          <p:cNvCxnSpPr>
+            <a:cxnSpLocks/>
+            <a:endCxn id="11" idx="0"/>
+          </p:cNvCxnSpPr>
+          <p:nvPr/>
+        </p:nvCxnSpPr>
+        <p:spPr>
+          <a:xfrm>
+            <a:off x="4533900" y="1828800"/>
+            <a:ext cx="0" cy="685800"/>
+          </a:xfrm>
+          <a:prstGeom prst="line">
+            <a:avLst/>
+          </a:prstGeom>
+          <a:ln w="38100">
+            <a:solidFill>
+              <a:schemeClr val="tx1"/>
+            </a:solidFill>
+          </a:ln>
+        </p:spPr>
+        <p:style>
+          <a:lnRef idx="1">
+            <a:schemeClr val="accent1"/>
+          </a:lnRef>
+          <a:fillRef idx="0">
+            <a:schemeClr val="accent1"/>
+          </a:fillRef>
+          <a:effectRef idx="0">
+            <a:schemeClr val="accent1"/>
+          </a:effectRef>
+          <a:fontRef idx="minor">
+            <a:schemeClr val="tx1"/>
+          </a:fontRef>
+        </p:style>
+      </p:cxnSp>
+      <p:sp>
+        <p:nvSpPr>
+          <p:cNvPr id="24" name="TextBox 23">
+            <a:extLst>
+              <a:ext uri="{FF2B5EF4-FFF2-40B4-BE49-F238E27FC236}">
+                <a16:creationId xmlns:a16="http://schemas.microsoft.com/office/drawing/2014/main" id="{71FC952C-A804-2760-F505-BE5086A74593}"/>
+              </a:ext>
+            </a:extLst>
+          </p:cNvPr>
+          <p:cNvSpPr txBox="1"/>
+          <p:nvPr/>
+        </p:nvSpPr>
+        <p:spPr>
+          <a:xfrm>
+            <a:off x="3886200" y="1447800"/>
+            <a:ext cx="6094562" cy="646331"/>
+          </a:xfrm>
+          <a:prstGeom prst="rect">
+            <a:avLst/>
+          </a:prstGeom>
+          <a:noFill/>
+        </p:spPr>
+        <p:txBody>
+          <a:bodyPr wrap="square">
+            <a:spAutoFit/>
+          </a:bodyPr>
+          <a:lstStyle/>
+          <a:p>
+            <a:pPr algn="ctr" fontAlgn="base">
+              <a:spcAft>
+                <a:spcPct val="0"/>
+              </a:spcAft>
+            </a:pPr>
+            <a:r>
+              <a:rPr lang="en-US" sz="1800" dirty="0"/>
+              <a:t>Zoom disabled</a:t>
+            </a:r>
+          </a:p>
+          <a:p>
+            <a:pPr marL="0" lvl="0" indent="0" algn="ctr" fontAlgn="base">
+              <a:spcAft>
+                <a:spcPct val="0"/>
+              </a:spcAft>
+              <a:buNone/>
+            </a:pPr>
+            <a:endParaRPr lang="en-US" sz="1800" dirty="0"/>
+          </a:p>
+        </p:txBody>
+      </p:sp>
+      <p:sp>
+        <p:nvSpPr>
+          <p:cNvPr id="25" name="Rectangle: Rounded Corners 24">
+            <a:extLst>
+              <a:ext uri="{FF2B5EF4-FFF2-40B4-BE49-F238E27FC236}">
+                <a16:creationId xmlns:a16="http://schemas.microsoft.com/office/drawing/2014/main" id="{81FA479D-2C2D-ADDE-5ED9-D7B89736F164}"/>
+              </a:ext>
+            </a:extLst>
+          </p:cNvPr>
+          <p:cNvSpPr/>
+          <p:nvPr/>
+        </p:nvSpPr>
+        <p:spPr>
+          <a:xfrm>
+            <a:off x="3505200" y="3886200"/>
+            <a:ext cx="2057400" cy="1219200"/>
+          </a:xfrm>
+          <a:prstGeom prst="roundRect">
+            <a:avLst/>
+          </a:prstGeom>
+          <a:ln>
+            <a:noFill/>
+          </a:ln>
+          <a:effectLst>
+            <a:outerShdw blurRad="184150" dist="241300" dir="11520000" sx="110000" sy="110000" algn="ctr">
+              <a:srgbClr val="000000">
+                <a:alpha val="18000"/>
+              </a:srgbClr>
+            </a:outerShdw>
+            <a:reflection blurRad="6350" stA="50000" endA="300" endPos="38500" dist="50800" dir="5400000" sy="-100000" algn="bl" rotWithShape="0"/>
+          </a:effectLst>
+          <a:scene3d>
+            <a:camera prst="orthographicFront"/>
+            <a:lightRig rig="flood" dir="t">
+              <a:rot lat="0" lon="0" rev="13800000"/>
+            </a:lightRig>
+          </a:scene3d>
+          <a:sp3d extrusionH="107950" prstMaterial="plastic">
+            <a:bevelT w="82550" h="63500" prst="divot"/>
+            <a:bevelB/>
+          </a:sp3d>
+        </p:spPr>
+        <p:style>
+          <a:lnRef idx="2">
+            <a:schemeClr val="accent1">
+              <a:shade val="15000"/>
+            </a:schemeClr>
+          </a:lnRef>
+          <a:fillRef idx="1">
+            <a:schemeClr val="accent1"/>
+          </a:fillRef>
+          <a:effectRef idx="0">
+            <a:schemeClr val="accent1"/>
+          </a:effectRef>
+          <a:fontRef idx="minor">
+            <a:schemeClr val="lt1"/>
+          </a:fontRef>
+        </p:style>
+        <p:txBody>
+          <a:bodyPr rtlCol="1" anchor="ctr"/>
+          <a:lstStyle/>
+          <a:p>
+            <a:pPr algn="ctr"/>
+            <a:r>
+              <a:rPr lang="en-US" dirty="0"/>
+              <a:t>¼ BRAM</a:t>
+            </a:r>
+          </a:p>
+          <a:p>
+            <a:pPr algn="ctr"/>
+            <a:r>
+              <a:rPr lang="en-US" dirty="0"/>
+              <a:t>(640 x 480 x 12)</a:t>
+            </a:r>
+          </a:p>
+        </p:txBody>
+      </p:sp>
+      <p:cxnSp>
+        <p:nvCxnSpPr>
+          <p:cNvPr id="27" name="Straight Arrow Connector 26">
+            <a:extLst>
+              <a:ext uri="{FF2B5EF4-FFF2-40B4-BE49-F238E27FC236}">
+                <a16:creationId xmlns:a16="http://schemas.microsoft.com/office/drawing/2014/main" id="{CE3D477E-A4DD-E090-F243-906BD8320A53}"/>
+              </a:ext>
+            </a:extLst>
+          </p:cNvPr>
+          <p:cNvCxnSpPr>
+            <a:cxnSpLocks/>
+          </p:cNvCxnSpPr>
+          <p:nvPr/>
+        </p:nvCxnSpPr>
+        <p:spPr>
+          <a:xfrm flipV="1">
+            <a:off x="1943100" y="4486275"/>
+            <a:ext cx="1609725" cy="9525"/>
+          </a:xfrm>
+          <a:prstGeom prst="straightConnector1">
+            <a:avLst/>
+          </a:prstGeom>
+          <a:ln w="38100">
+            <a:solidFill>
+              <a:schemeClr val="tx1"/>
+            </a:solidFill>
+            <a:tailEnd type="triangle"/>
+          </a:ln>
+        </p:spPr>
+        <p:style>
+          <a:lnRef idx="1">
+            <a:schemeClr val="accent1"/>
+          </a:lnRef>
+          <a:fillRef idx="0">
+            <a:schemeClr val="accent1"/>
+          </a:fillRef>
+          <a:effectRef idx="0">
+            <a:schemeClr val="accent1"/>
+          </a:effectRef>
+          <a:fontRef idx="minor">
+            <a:schemeClr val="tx1"/>
+          </a:fontRef>
+        </p:style>
+      </p:cxnSp>
+      <p:cxnSp>
+        <p:nvCxnSpPr>
+          <p:cNvPr id="28" name="Straight Connector 27">
+            <a:extLst>
+              <a:ext uri="{FF2B5EF4-FFF2-40B4-BE49-F238E27FC236}">
+                <a16:creationId xmlns:a16="http://schemas.microsoft.com/office/drawing/2014/main" id="{3176AB47-5353-9B19-12B5-6041DF0EC6F6}"/>
+              </a:ext>
+            </a:extLst>
+          </p:cNvPr>
+          <p:cNvCxnSpPr>
+            <a:cxnSpLocks/>
+          </p:cNvCxnSpPr>
+          <p:nvPr/>
+        </p:nvCxnSpPr>
+        <p:spPr>
+          <a:xfrm>
+            <a:off x="1943100" y="3733800"/>
+            <a:ext cx="0" cy="752475"/>
+          </a:xfrm>
+          <a:prstGeom prst="line">
+            <a:avLst/>
+          </a:prstGeom>
+          <a:ln w="38100">
+            <a:solidFill>
+              <a:schemeClr val="tx1"/>
+            </a:solidFill>
+          </a:ln>
+        </p:spPr>
+        <p:style>
+          <a:lnRef idx="1">
+            <a:schemeClr val="accent1"/>
+          </a:lnRef>
+          <a:fillRef idx="0">
+            <a:schemeClr val="accent1"/>
+          </a:fillRef>
+          <a:effectRef idx="0">
+            <a:schemeClr val="accent1"/>
+          </a:effectRef>
+          <a:fontRef idx="minor">
+            <a:schemeClr val="tx1"/>
+          </a:fontRef>
+        </p:style>
+      </p:cxnSp>
+      <p:cxnSp>
+        <p:nvCxnSpPr>
+          <p:cNvPr id="31" name="Straight Connector 30">
+            <a:extLst>
+              <a:ext uri="{FF2B5EF4-FFF2-40B4-BE49-F238E27FC236}">
+                <a16:creationId xmlns:a16="http://schemas.microsoft.com/office/drawing/2014/main" id="{43BA5BA9-4BB1-2323-0C66-7DD1480997F6}"/>
+              </a:ext>
+            </a:extLst>
+          </p:cNvPr>
+          <p:cNvCxnSpPr>
+            <a:cxnSpLocks/>
+          </p:cNvCxnSpPr>
+          <p:nvPr/>
+        </p:nvCxnSpPr>
+        <p:spPr>
+          <a:xfrm>
+            <a:off x="8458200" y="3133725"/>
+            <a:ext cx="0" cy="1362075"/>
+          </a:xfrm>
+          <a:prstGeom prst="line">
+            <a:avLst/>
+          </a:prstGeom>
+          <a:ln w="38100">
+            <a:solidFill>
+              <a:schemeClr val="tx1"/>
+            </a:solidFill>
+          </a:ln>
+        </p:spPr>
+        <p:style>
+          <a:lnRef idx="1">
+            <a:schemeClr val="accent1"/>
+          </a:lnRef>
+          <a:fillRef idx="0">
+            <a:schemeClr val="accent1"/>
+          </a:fillRef>
+          <a:effectRef idx="0">
+            <a:schemeClr val="accent1"/>
+          </a:effectRef>
+          <a:fontRef idx="minor">
+            <a:schemeClr val="tx1"/>
+          </a:fontRef>
+        </p:style>
+      </p:cxnSp>
+      <p:cxnSp>
+        <p:nvCxnSpPr>
+          <p:cNvPr id="33" name="Straight Connector 32">
+            <a:extLst>
+              <a:ext uri="{FF2B5EF4-FFF2-40B4-BE49-F238E27FC236}">
+                <a16:creationId xmlns:a16="http://schemas.microsoft.com/office/drawing/2014/main" id="{D434A3A1-EF27-5958-A6FF-D81A03FA1D7E}"/>
+              </a:ext>
+            </a:extLst>
+          </p:cNvPr>
+          <p:cNvCxnSpPr>
+            <a:cxnSpLocks/>
+          </p:cNvCxnSpPr>
+          <p:nvPr/>
+        </p:nvCxnSpPr>
+        <p:spPr>
+          <a:xfrm flipH="1">
+            <a:off x="8153400" y="4486275"/>
+            <a:ext cx="304800" cy="0"/>
+          </a:xfrm>
+          <a:prstGeom prst="line">
+            <a:avLst/>
+          </a:prstGeom>
+          <a:ln w="38100">
+            <a:solidFill>
+              <a:schemeClr val="tx1"/>
+            </a:solidFill>
+          </a:ln>
+        </p:spPr>
+        <p:style>
+          <a:lnRef idx="1">
+            <a:schemeClr val="accent1"/>
+          </a:lnRef>
+          <a:fillRef idx="0">
+            <a:schemeClr val="accent1"/>
+          </a:fillRef>
+          <a:effectRef idx="0">
+            <a:schemeClr val="accent1"/>
+          </a:effectRef>
+          <a:fontRef idx="minor">
+            <a:schemeClr val="tx1"/>
+          </a:fontRef>
+        </p:style>
+      </p:cxnSp>
+      <p:sp>
+        <p:nvSpPr>
+          <p:cNvPr id="36" name="TextBox 35">
+            <a:extLst>
+              <a:ext uri="{FF2B5EF4-FFF2-40B4-BE49-F238E27FC236}">
+                <a16:creationId xmlns:a16="http://schemas.microsoft.com/office/drawing/2014/main" id="{9E7AA244-6670-7A7F-9DDD-B73CDD94C154}"/>
+              </a:ext>
+            </a:extLst>
+          </p:cNvPr>
+          <p:cNvSpPr txBox="1"/>
+          <p:nvPr/>
+        </p:nvSpPr>
+        <p:spPr>
+          <a:xfrm>
+            <a:off x="-303362" y="4840069"/>
+            <a:ext cx="6094562" cy="646331"/>
+          </a:xfrm>
+          <a:prstGeom prst="rect">
+            <a:avLst/>
+          </a:prstGeom>
+          <a:noFill/>
+        </p:spPr>
+        <p:txBody>
+          <a:bodyPr wrap="square">
+            <a:spAutoFit/>
+          </a:bodyPr>
+          <a:lstStyle/>
+          <a:p>
+            <a:pPr algn="ctr" fontAlgn="base">
+              <a:spcAft>
+                <a:spcPct val="0"/>
+              </a:spcAft>
+            </a:pPr>
+            <a:r>
+              <a:rPr lang="en-US" sz="1800" dirty="0"/>
+              <a:t>Zoom enabled</a:t>
+            </a:r>
+          </a:p>
+          <a:p>
+            <a:pPr marL="0" lvl="0" indent="0" algn="ctr" fontAlgn="base">
+              <a:spcAft>
+                <a:spcPct val="0"/>
+              </a:spcAft>
+              <a:buNone/>
+            </a:pPr>
+            <a:endParaRPr lang="en-US" sz="1800" dirty="0"/>
+          </a:p>
+        </p:txBody>
+      </p:sp>
+      <p:sp>
+        <p:nvSpPr>
+          <p:cNvPr id="37" name="Title 1">
+            <a:extLst>
+              <a:ext uri="{FF2B5EF4-FFF2-40B4-BE49-F238E27FC236}">
+                <a16:creationId xmlns:a16="http://schemas.microsoft.com/office/drawing/2014/main" id="{6184887E-F413-227A-DB79-BFAFD434FF49}"/>
+              </a:ext>
+            </a:extLst>
+          </p:cNvPr>
+          <p:cNvSpPr>
+            <a:spLocks noGrp="1"/>
+          </p:cNvSpPr>
+          <p:nvPr>
+            <p:ph type="title"/>
+          </p:nvPr>
+        </p:nvSpPr>
+        <p:spPr>
+          <a:xfrm>
+            <a:off x="1219200" y="381000"/>
+            <a:ext cx="9448800" cy="1143000"/>
+          </a:xfrm>
+        </p:spPr>
+        <p:txBody>
+          <a:bodyPr/>
+          <a:lstStyle/>
+          <a:p>
+            <a:r>
+              <a:rPr lang="en-US" dirty="0"/>
+              <a:t>Architecture V1.0 – Data Flow.</a:t>
+            </a:r>
+          </a:p>
+        </p:txBody>
+      </p:sp>
+    </p:spTree>
+    <p:extLst>
+      <p:ext uri="{BB962C8B-B14F-4D97-AF65-F5344CB8AC3E}">
+        <p14:creationId xmlns:p14="http://schemas.microsoft.com/office/powerpoint/2010/main" val="2124551211"/>
+      </p:ext>
+    </p:extLst>
+  </p:cSld>
+  <p:clrMapOvr>
+    <a:masterClrMapping/>
+  </p:clrMapOvr>
+</p:sld>
+</file>
+
+<file path=ppt/slides/slide7.xml><?xml version="1.0" encoding="utf-8"?>
+<p:sld xmlns:a="http://schemas.openxmlformats.org/drawingml/2006/main" xmlns:r="http://schemas.openxmlformats.org/officeDocument/2006/relationships" xmlns:p="http://schemas.openxmlformats.org/presentationml/2006/main">
+  <p:cSld>
+    <p:spTree>
+      <p:nvGrpSpPr>
         <p:cNvPr id="1" name="">
           <a:extLst>
             <a:ext uri="{FF2B5EF4-FFF2-40B4-BE49-F238E27FC236}">
@@ -20408,14 +21923,19 @@
             <p:ph type="title"/>
           </p:nvPr>
         </p:nvSpPr>
-        <p:spPr/>
+        <p:spPr>
+          <a:xfrm>
+            <a:off x="1524000" y="457200"/>
+            <a:ext cx="9525000" cy="1143000"/>
+          </a:xfrm>
+        </p:spPr>
         <p:txBody>
           <a:bodyPr/>
           <a:lstStyle/>
           <a:p>
             <a:r>
               <a:rPr lang="en-US" dirty="0"/>
-              <a:t>Architecture – Key FPGA Modules.</a:t>
+              <a:t>Architecture V2.0 – Key FPGA Modules.</a:t>
             </a:r>
           </a:p>
         </p:txBody>
@@ -20750,86 +22270,6 @@
           <a:p>
             <a:pPr algn="ctr"/>
             <a:endParaRPr lang="en-US"/>
-          </a:p>
-        </p:txBody>
-      </p:sp>
-      <p:sp>
-        <p:nvSpPr>
-          <p:cNvPr id="15" name="TextBox 14">
-            <a:extLst>
-              <a:ext uri="{FF2B5EF4-FFF2-40B4-BE49-F238E27FC236}">
-                <a16:creationId xmlns:a16="http://schemas.microsoft.com/office/drawing/2014/main" id="{12E1C263-BEC3-F0EE-9EE2-2D5820FB0DC8}"/>
-              </a:ext>
-            </a:extLst>
-          </p:cNvPr>
-          <p:cNvSpPr txBox="1"/>
-          <p:nvPr/>
-        </p:nvSpPr>
-        <p:spPr>
-          <a:xfrm>
-            <a:off x="1676400" y="272534"/>
-            <a:ext cx="6934200" cy="1477328"/>
-          </a:xfrm>
-          <a:prstGeom prst="rect">
-            <a:avLst/>
-          </a:prstGeom>
-          <a:noFill/>
-        </p:spPr>
-        <p:txBody>
-          <a:bodyPr wrap="square">
-            <a:spAutoFit/>
-          </a:bodyPr>
-          <a:lstStyle/>
-          <a:p>
-            <a:pPr marL="0" lvl="0" indent="0" algn="ctr" fontAlgn="base">
-              <a:spcAft>
-                <a:spcPct val="0"/>
-              </a:spcAft>
-              <a:buNone/>
-            </a:pPr>
-            <a:r>
-              <a:rPr lang="en-US" sz="1800" dirty="0"/>
-              <a:t>Capture →  Zoom → BRAM2 → Bili → BRAM1 → VGA</a:t>
-            </a:r>
-          </a:p>
-          <a:p>
-            <a:pPr algn="ctr" fontAlgn="base">
-              <a:spcAft>
-                <a:spcPct val="0"/>
-              </a:spcAft>
-            </a:pPr>
-            <a:r>
-              <a:rPr lang="en-US" sz="1800" dirty="0"/>
-              <a:t>Capture →  Zoom → BRAM2 → VGA</a:t>
-            </a:r>
-          </a:p>
-          <a:p>
-            <a:pPr algn="ctr" fontAlgn="base">
-              <a:spcAft>
-                <a:spcPct val="0"/>
-              </a:spcAft>
-            </a:pPr>
-            <a:r>
-              <a:rPr lang="en-US" sz="1800" dirty="0"/>
-              <a:t>Capture → BRAM1 → VGA</a:t>
-            </a:r>
-          </a:p>
-          <a:p>
-            <a:pPr algn="ctr" fontAlgn="base">
-              <a:spcAft>
-                <a:spcPct val="0"/>
-              </a:spcAft>
-            </a:pPr>
-            <a:endParaRPr lang="en-US" sz="1800" dirty="0"/>
-          </a:p>
-          <a:p>
-            <a:pPr marL="0" lvl="0" indent="0" algn="ctr" fontAlgn="base">
-              <a:spcAft>
-                <a:spcPct val="0"/>
-              </a:spcAft>
-              <a:buNone/>
-            </a:pPr>
-            <a:endParaRPr lang="en-US" sz="1800" dirty="0"/>
           </a:p>
         </p:txBody>
       </p:sp>
@@ -21308,7 +22748,7 @@
 </p:sld>
 </file>
 
-<file path=ppt/slides/slide7.xml><?xml version="1.0" encoding="utf-8"?>
+<file path=ppt/slides/slide8.xml><?xml version="1.0" encoding="utf-8"?>
 <p:sld xmlns:a="http://schemas.openxmlformats.org/drawingml/2006/main" xmlns:r="http://schemas.openxmlformats.org/officeDocument/2006/relationships" xmlns:p="http://schemas.openxmlformats.org/presentationml/2006/main">
   <p:cSld>
     <p:spTree>
@@ -21316,7 +22756,7 @@
         <p:cNvPr id="1" name="">
           <a:extLst>
             <a:ext uri="{FF2B5EF4-FFF2-40B4-BE49-F238E27FC236}">
-              <a16:creationId xmlns:a16="http://schemas.microsoft.com/office/drawing/2014/main" id="{F9D4EDFF-1EFD-0551-7B74-C76229F9F633}"/>
+              <a16:creationId xmlns:a16="http://schemas.microsoft.com/office/drawing/2014/main" id="{4CECB949-1DD2-F25A-BB8D-4834D595940F}"/>
             </a:ext>
           </a:extLst>
         </p:cNvPr>
@@ -21333,116 +22773,10 @@
       </p:grpSpPr>
       <p:sp>
         <p:nvSpPr>
-          <p:cNvPr id="2" name="Title 1">
+          <p:cNvPr id="5" name="Rectangle: Rounded Corners 4">
             <a:extLst>
               <a:ext uri="{FF2B5EF4-FFF2-40B4-BE49-F238E27FC236}">
-                <a16:creationId xmlns:a16="http://schemas.microsoft.com/office/drawing/2014/main" id="{3F062729-EDBD-BE8A-5DD0-8465E02F846D}"/>
-              </a:ext>
-            </a:extLst>
-          </p:cNvPr>
-          <p:cNvSpPr>
-            <a:spLocks noGrp="1"/>
-          </p:cNvSpPr>
-          <p:nvPr>
-            <p:ph type="title"/>
-          </p:nvPr>
-        </p:nvSpPr>
-        <p:spPr/>
-        <p:txBody>
-          <a:bodyPr/>
-          <a:lstStyle/>
-          <a:p>
-            <a:pPr algn="ctr"/>
-            <a:r>
-              <a:rPr lang="en-US" dirty="0"/>
-              <a:t>MOCKUP</a:t>
-            </a:r>
-          </a:p>
-        </p:txBody>
-      </p:sp>
-      <p:pic>
-        <p:nvPicPr>
-          <p:cNvPr id="8" name="Content Placeholder 7">
-            <a:extLst>
-              <a:ext uri="{FF2B5EF4-FFF2-40B4-BE49-F238E27FC236}">
-                <a16:creationId xmlns:a16="http://schemas.microsoft.com/office/drawing/2014/main" id="{67E4C2B4-477A-BA7A-0C96-E9B96ED32081}"/>
-              </a:ext>
-            </a:extLst>
-          </p:cNvPr>
-          <p:cNvPicPr>
-            <a:picLocks noGrp="1" noChangeAspect="1"/>
-          </p:cNvPicPr>
-          <p:nvPr>
-            <p:ph idx="1"/>
-          </p:nvPr>
-        </p:nvPicPr>
-        <p:blipFill>
-          <a:blip r:embed="rId3"/>
-          <a:stretch>
-            <a:fillRect/>
-          </a:stretch>
-        </p:blipFill>
-        <p:spPr>
-          <a:xfrm>
-            <a:off x="2047025" y="4353560"/>
-            <a:ext cx="1686775" cy="1513840"/>
-          </a:xfrm>
-          <a:prstGeom prst="rect">
-            <a:avLst/>
-          </a:prstGeom>
-        </p:spPr>
-      </p:pic>
-      <p:pic>
-        <p:nvPicPr>
-          <p:cNvPr id="1028" name="Picture 4" descr="Digilent Nexys A7">
-            <a:extLst>
-              <a:ext uri="{FF2B5EF4-FFF2-40B4-BE49-F238E27FC236}">
-                <a16:creationId xmlns:a16="http://schemas.microsoft.com/office/drawing/2014/main" id="{4D769ACA-ACF4-DADD-47E6-040129E5F1C4}"/>
-              </a:ext>
-            </a:extLst>
-          </p:cNvPr>
-          <p:cNvPicPr>
-            <a:picLocks noChangeAspect="1" noChangeArrowheads="1"/>
-          </p:cNvPicPr>
-          <p:nvPr/>
-        </p:nvPicPr>
-        <p:blipFill rotWithShape="1">
-          <a:blip r:embed="rId4" cstate="print">
-            <a:extLst>
-              <a:ext uri="{28A0092B-C50C-407E-A947-70E740481C1C}">
-                <a14:useLocalDpi xmlns:a14="http://schemas.microsoft.com/office/drawing/2010/main" val="0"/>
-              </a:ext>
-            </a:extLst>
-          </a:blip>
-          <a:srcRect l="6062" t="6060" r="9091" b="15152"/>
-          <a:stretch/>
-        </p:blipFill>
-        <p:spPr bwMode="auto">
-          <a:xfrm>
-            <a:off x="6663907" y="2514600"/>
-            <a:ext cx="4677508" cy="4343400"/>
-          </a:xfrm>
-          <a:prstGeom prst="rect">
-            <a:avLst/>
-          </a:prstGeom>
-          <a:noFill/>
-          <a:extLst>
-            <a:ext uri="{909E8E84-426E-40DD-AFC4-6F175D3DCCD1}">
-              <a14:hiddenFill xmlns:a14="http://schemas.microsoft.com/office/drawing/2010/main">
-                <a:solidFill>
-                  <a:srgbClr val="FFFFFF"/>
-                </a:solidFill>
-              </a14:hiddenFill>
-            </a:ext>
-          </a:extLst>
-        </p:spPr>
-      </p:pic>
-      <p:sp>
-        <p:nvSpPr>
-          <p:cNvPr id="16" name="Arrow: Right 15">
-            <a:extLst>
-              <a:ext uri="{FF2B5EF4-FFF2-40B4-BE49-F238E27FC236}">
-                <a16:creationId xmlns:a16="http://schemas.microsoft.com/office/drawing/2014/main" id="{0EA5E127-E925-3F51-28DB-55A91F006908}"/>
+                <a16:creationId xmlns:a16="http://schemas.microsoft.com/office/drawing/2014/main" id="{9229F390-B5AE-133D-C2A9-17B9A904E1D7}"/>
               </a:ext>
             </a:extLst>
           </p:cNvPr>
@@ -21451,12 +22785,33 @@
         </p:nvSpPr>
         <p:spPr>
           <a:xfrm>
-            <a:off x="3702481" y="4572000"/>
-            <a:ext cx="3231719" cy="457200"/>
+            <a:off x="914400" y="2302736"/>
+            <a:ext cx="2057400" cy="1219200"/>
           </a:xfrm>
-          <a:prstGeom prst="rightArrow">
+          <a:prstGeom prst="roundRect">
             <a:avLst/>
           </a:prstGeom>
+          <a:ln>
+            <a:noFill/>
+          </a:ln>
+          <a:effectLst>
+            <a:outerShdw blurRad="184150" dist="241300" dir="11520000" sx="110000" sy="110000" algn="ctr">
+              <a:srgbClr val="000000">
+                <a:alpha val="18000"/>
+              </a:srgbClr>
+            </a:outerShdw>
+            <a:reflection blurRad="6350" stA="50000" endA="300" endPos="38500" dist="50800" dir="5400000" sy="-100000" algn="bl" rotWithShape="0"/>
+          </a:effectLst>
+          <a:scene3d>
+            <a:camera prst="orthographicFront"/>
+            <a:lightRig rig="flood" dir="t">
+              <a:rot lat="0" lon="0" rev="13800000"/>
+            </a:lightRig>
+          </a:scene3d>
+          <a:sp3d extrusionH="107950" prstMaterial="plastic">
+            <a:bevelT w="82550" h="63500" prst="divot"/>
+            <a:bevelB/>
+          </a:sp3d>
         </p:spPr>
         <p:style>
           <a:lnRef idx="2">
@@ -21475,43 +22830,23 @@
           </a:fontRef>
         </p:style>
         <p:txBody>
-          <a:bodyPr rtlCol="0" anchor="ctr"/>
+          <a:bodyPr rtlCol="1" anchor="ctr"/>
           <a:lstStyle/>
           <a:p>
             <a:pPr algn="ctr"/>
             <a:r>
-              <a:rPr lang="en-US" dirty="0">
-                <a:solidFill>
-                  <a:schemeClr val="bg1"/>
-                </a:solidFill>
-              </a:rPr>
-              <a:t>Pixel data, </a:t>
-            </a:r>
-            <a:r>
-              <a:rPr lang="en-US" dirty="0" err="1">
-                <a:solidFill>
-                  <a:schemeClr val="bg1"/>
-                </a:solidFill>
-              </a:rPr>
-              <a:t>clk</a:t>
-            </a:r>
-            <a:r>
-              <a:rPr lang="en-US" dirty="0">
-                <a:solidFill>
-                  <a:schemeClr val="bg1"/>
-                </a:solidFill>
-              </a:rPr>
-              <a:t>, sync signals</a:t>
+              <a:rPr lang="en-US" dirty="0"/>
+              <a:t>Capture</a:t>
             </a:r>
           </a:p>
         </p:txBody>
       </p:sp>
       <p:sp>
         <p:nvSpPr>
-          <p:cNvPr id="17" name="Arrow: Right 16">
+          <p:cNvPr id="6" name="Rectangle: Rounded Corners 5">
             <a:extLst>
               <a:ext uri="{FF2B5EF4-FFF2-40B4-BE49-F238E27FC236}">
-                <a16:creationId xmlns:a16="http://schemas.microsoft.com/office/drawing/2014/main" id="{FCAFF8C1-DAF2-7554-A27B-A82628615D06}"/>
+                <a16:creationId xmlns:a16="http://schemas.microsoft.com/office/drawing/2014/main" id="{6280C3E5-B477-2A83-08D5-B1B8876D2A27}"/>
               </a:ext>
             </a:extLst>
           </p:cNvPr>
@@ -21519,16 +22854,34 @@
           <p:nvPr/>
         </p:nvSpPr>
         <p:spPr>
-          <a:xfrm rot="10800000" flipV="1">
-            <a:off x="3744174" y="5333999"/>
-            <a:ext cx="3190026" cy="457200"/>
+          <a:xfrm>
+            <a:off x="6096000" y="3886200"/>
+            <a:ext cx="2057400" cy="1219200"/>
           </a:xfrm>
-          <a:prstGeom prst="rightArrow">
-            <a:avLst>
-              <a:gd name="adj1" fmla="val 50000"/>
-              <a:gd name="adj2" fmla="val 86227"/>
-            </a:avLst>
+          <a:prstGeom prst="roundRect">
+            <a:avLst/>
           </a:prstGeom>
+          <a:ln>
+            <a:noFill/>
+          </a:ln>
+          <a:effectLst>
+            <a:outerShdw blurRad="184150" dist="241300" dir="11520000" sx="110000" sy="110000" algn="ctr">
+              <a:srgbClr val="000000">
+                <a:alpha val="18000"/>
+              </a:srgbClr>
+            </a:outerShdw>
+            <a:reflection blurRad="6350" stA="50000" endA="300" endPos="38500" dist="50800" dir="5400000" sy="-100000" algn="bl" rotWithShape="0"/>
+          </a:effectLst>
+          <a:scene3d>
+            <a:camera prst="orthographicFront"/>
+            <a:lightRig rig="flood" dir="t">
+              <a:rot lat="0" lon="0" rev="13800000"/>
+            </a:lightRig>
+          </a:scene3d>
+          <a:sp3d extrusionH="107950" prstMaterial="plastic">
+            <a:bevelT w="82550" h="63500" prst="divot"/>
+            <a:bevelB/>
+          </a:sp3d>
         </p:spPr>
         <p:style>
           <a:lnRef idx="2">
@@ -21547,90 +22900,23 @@
           </a:fontRef>
         </p:style>
         <p:txBody>
-          <a:bodyPr rtlCol="0" anchor="ctr"/>
+          <a:bodyPr rtlCol="1" anchor="ctr"/>
           <a:lstStyle/>
           <a:p>
             <a:pPr algn="ctr"/>
             <a:r>
-              <a:rPr lang="en-US" dirty="0">
-                <a:solidFill>
-                  <a:schemeClr val="bg1"/>
-                </a:solidFill>
-              </a:rPr>
-              <a:t>SCCB Config, </a:t>
-            </a:r>
-            <a:r>
-              <a:rPr lang="en-US" dirty="0" err="1">
-                <a:solidFill>
-                  <a:schemeClr val="bg1"/>
-                </a:solidFill>
-              </a:rPr>
-              <a:t>clk</a:t>
-            </a:r>
-            <a:r>
-              <a:rPr lang="en-US" dirty="0">
-                <a:solidFill>
-                  <a:schemeClr val="bg1"/>
-                </a:solidFill>
-              </a:rPr>
-              <a:t>, reset</a:t>
+              <a:rPr lang="en-US" dirty="0"/>
+              <a:t>Bi-linear interpolation</a:t>
             </a:r>
           </a:p>
         </p:txBody>
       </p:sp>
-      <p:pic>
-        <p:nvPicPr>
-          <p:cNvPr id="1030" name="Picture 6" descr="Vga Monitor 7 Inch 1024*600 Hd Mini Portable Monitor With Av Vga Input">
+      <p:sp>
+        <p:nvSpPr>
+          <p:cNvPr id="7" name="Rectangle: Rounded Corners 6">
             <a:extLst>
               <a:ext uri="{FF2B5EF4-FFF2-40B4-BE49-F238E27FC236}">
-                <a16:creationId xmlns:a16="http://schemas.microsoft.com/office/drawing/2014/main" id="{E0777190-B3D4-1BE3-231B-0DF2C8F53BA5}"/>
-              </a:ext>
-            </a:extLst>
-          </p:cNvPr>
-          <p:cNvPicPr>
-            <a:picLocks noChangeAspect="1" noChangeArrowheads="1"/>
-          </p:cNvPicPr>
-          <p:nvPr/>
-        </p:nvPicPr>
-        <p:blipFill>
-          <a:blip r:embed="rId5" cstate="print">
-            <a:extLst>
-              <a:ext uri="{28A0092B-C50C-407E-A947-70E740481C1C}">
-                <a14:useLocalDpi xmlns:a14="http://schemas.microsoft.com/office/drawing/2010/main" val="0"/>
-              </a:ext>
-            </a:extLst>
-          </a:blip>
-          <a:srcRect/>
-          <a:stretch>
-            <a:fillRect/>
-          </a:stretch>
-        </p:blipFill>
-        <p:spPr bwMode="auto">
-          <a:xfrm>
-            <a:off x="9067800" y="0"/>
-            <a:ext cx="1828800" cy="1828800"/>
-          </a:xfrm>
-          <a:prstGeom prst="rect">
-            <a:avLst/>
-          </a:prstGeom>
-          <a:noFill/>
-          <a:extLst>
-            <a:ext uri="{909E8E84-426E-40DD-AFC4-6F175D3DCCD1}">
-              <a14:hiddenFill xmlns:a14="http://schemas.microsoft.com/office/drawing/2010/main">
-                <a:solidFill>
-                  <a:srgbClr val="FFFFFF"/>
-                </a:solidFill>
-              </a14:hiddenFill>
-            </a:ext>
-          </a:extLst>
-        </p:spPr>
-      </p:pic>
-      <p:sp>
-        <p:nvSpPr>
-          <p:cNvPr id="26" name="Arrow: Up 25">
-            <a:extLst>
-              <a:ext uri="{FF2B5EF4-FFF2-40B4-BE49-F238E27FC236}">
-                <a16:creationId xmlns:a16="http://schemas.microsoft.com/office/drawing/2014/main" id="{15594713-C298-8021-2201-82E2A6B9B591}"/>
+                <a16:creationId xmlns:a16="http://schemas.microsoft.com/office/drawing/2014/main" id="{00E0BE10-93B0-4606-9120-53494DF08A51}"/>
               </a:ext>
             </a:extLst>
           </p:cNvPr>
@@ -21639,15 +22925,33 @@
         </p:nvSpPr>
         <p:spPr>
           <a:xfrm>
-            <a:off x="9067800" y="1524000"/>
-            <a:ext cx="1828800" cy="1066800"/>
+            <a:off x="8686800" y="2302736"/>
+            <a:ext cx="2057400" cy="1219200"/>
           </a:xfrm>
-          <a:prstGeom prst="upArrow">
+          <a:prstGeom prst="roundRect">
             <a:avLst/>
           </a:prstGeom>
-          <a:solidFill>
-            <a:srgbClr val="FFFF00"/>
-          </a:solidFill>
+          <a:ln>
+            <a:noFill/>
+          </a:ln>
+          <a:effectLst>
+            <a:outerShdw blurRad="184150" dist="241300" dir="11520000" sx="110000" sy="110000" algn="ctr">
+              <a:srgbClr val="000000">
+                <a:alpha val="18000"/>
+              </a:srgbClr>
+            </a:outerShdw>
+            <a:reflection blurRad="6350" stA="50000" endA="300" endPos="38500" dist="50800" dir="5400000" sy="-100000" algn="bl" rotWithShape="0"/>
+          </a:effectLst>
+          <a:scene3d>
+            <a:camera prst="orthographicFront"/>
+            <a:lightRig rig="flood" dir="t">
+              <a:rot lat="0" lon="0" rev="13800000"/>
+            </a:lightRig>
+          </a:scene3d>
+          <a:sp3d extrusionH="107950" prstMaterial="plastic">
+            <a:bevelT w="82550" h="63500" prst="divot"/>
+            <a:bevelB/>
+          </a:sp3d>
         </p:spPr>
         <p:style>
           <a:lnRef idx="2">
@@ -21666,32 +22970,23 @@
           </a:fontRef>
         </p:style>
         <p:txBody>
-          <a:bodyPr rot="0" spcFirstLastPara="0" vertOverflow="overflow" horzOverflow="overflow" vert="horz" wrap="square" lIns="91440" tIns="45720" rIns="91440" bIns="45720" numCol="1" spcCol="0" rtlCol="0" fromWordArt="0" anchor="ctr" anchorCtr="0" forceAA="0" compatLnSpc="1">
-            <a:prstTxWarp prst="textNoShape">
-              <a:avLst/>
-            </a:prstTxWarp>
-            <a:noAutofit/>
-          </a:bodyPr>
+          <a:bodyPr rtlCol="1" anchor="ctr"/>
           <a:lstStyle/>
           <a:p>
             <a:pPr algn="ctr"/>
             <a:r>
-              <a:rPr lang="en-US" sz="1600" dirty="0">
-                <a:solidFill>
-                  <a:schemeClr val="bg1"/>
-                </a:solidFill>
-              </a:rPr>
-              <a:t>Sync signals, pixels</a:t>
+              <a:rPr lang="en-US" dirty="0"/>
+              <a:t>VGA</a:t>
             </a:r>
           </a:p>
         </p:txBody>
       </p:sp>
       <p:sp>
         <p:nvSpPr>
-          <p:cNvPr id="27" name="Rectangle 26">
+          <p:cNvPr id="11" name="Rectangle: Rounded Corners 10">
             <a:extLst>
               <a:ext uri="{FF2B5EF4-FFF2-40B4-BE49-F238E27FC236}">
-                <a16:creationId xmlns:a16="http://schemas.microsoft.com/office/drawing/2014/main" id="{E539E701-80EB-7814-23F2-BF8EF20C3248}"/>
+                <a16:creationId xmlns:a16="http://schemas.microsoft.com/office/drawing/2014/main" id="{662E417A-BB43-9365-080C-C02BF187D761}"/>
               </a:ext>
             </a:extLst>
           </p:cNvPr>
@@ -21700,18 +22995,33 @@
         </p:nvSpPr>
         <p:spPr>
           <a:xfrm>
-            <a:off x="7239000" y="6019800"/>
-            <a:ext cx="1143000" cy="685800"/>
+            <a:off x="3505200" y="2302736"/>
+            <a:ext cx="2057400" cy="1219200"/>
           </a:xfrm>
-          <a:prstGeom prst="rect">
+          <a:prstGeom prst="roundRect">
             <a:avLst/>
           </a:prstGeom>
-          <a:noFill/>
-          <a:ln w="76200">
-            <a:solidFill>
-              <a:srgbClr val="7030A0"/>
-            </a:solidFill>
+          <a:ln>
+            <a:noFill/>
           </a:ln>
+          <a:effectLst>
+            <a:outerShdw blurRad="184150" dist="241300" dir="11520000" sx="110000" sy="110000" algn="ctr">
+              <a:srgbClr val="000000">
+                <a:alpha val="18000"/>
+              </a:srgbClr>
+            </a:outerShdw>
+            <a:reflection blurRad="6350" stA="50000" endA="300" endPos="38500" dist="50800" dir="5400000" sy="-100000" algn="bl" rotWithShape="0"/>
+          </a:effectLst>
+          <a:scene3d>
+            <a:camera prst="orthographicFront"/>
+            <a:lightRig rig="flood" dir="t">
+              <a:rot lat="0" lon="0" rev="13800000"/>
+            </a:lightRig>
+          </a:scene3d>
+          <a:sp3d extrusionH="107950" prstMaterial="plastic">
+            <a:bevelT w="82550" h="63500" prst="divot"/>
+            <a:bevelB/>
+          </a:sp3d>
         </p:spPr>
         <p:style>
           <a:lnRef idx="2">
@@ -21730,18 +23040,932 @@
           </a:fontRef>
         </p:style>
         <p:txBody>
-          <a:bodyPr rtlCol="0" anchor="ctr"/>
+          <a:bodyPr rtlCol="1" anchor="ctr"/>
           <a:lstStyle/>
           <a:p>
             <a:pPr algn="ctr"/>
-            <a:endParaRPr lang="en-US"/>
+            <a:r>
+              <a:rPr lang="en-US" dirty="0"/>
+              <a:t>BRAM</a:t>
+            </a:r>
           </a:p>
         </p:txBody>
       </p:sp>
+      <p:cxnSp>
+        <p:nvCxnSpPr>
+          <p:cNvPr id="13" name="Straight Arrow Connector 12">
+            <a:extLst>
+              <a:ext uri="{FF2B5EF4-FFF2-40B4-BE49-F238E27FC236}">
+                <a16:creationId xmlns:a16="http://schemas.microsoft.com/office/drawing/2014/main" id="{456B108C-5539-5941-0DAA-31B49E234C86}"/>
+              </a:ext>
+            </a:extLst>
+          </p:cNvPr>
+          <p:cNvCxnSpPr>
+            <a:stCxn id="5" idx="3"/>
+            <a:endCxn id="11" idx="1"/>
+          </p:cNvCxnSpPr>
+          <p:nvPr/>
+        </p:nvCxnSpPr>
+        <p:spPr>
+          <a:xfrm>
+            <a:off x="2971800" y="2912336"/>
+            <a:ext cx="533400" cy="0"/>
+          </a:xfrm>
+          <a:prstGeom prst="straightConnector1">
+            <a:avLst/>
+          </a:prstGeom>
+          <a:ln w="38100">
+            <a:solidFill>
+              <a:schemeClr val="tx1"/>
+            </a:solidFill>
+            <a:tailEnd type="triangle"/>
+          </a:ln>
+        </p:spPr>
+        <p:style>
+          <a:lnRef idx="1">
+            <a:schemeClr val="accent1"/>
+          </a:lnRef>
+          <a:fillRef idx="0">
+            <a:schemeClr val="accent1"/>
+          </a:fillRef>
+          <a:effectRef idx="0">
+            <a:schemeClr val="accent1"/>
+          </a:effectRef>
+          <a:fontRef idx="minor">
+            <a:schemeClr val="tx1"/>
+          </a:fontRef>
+        </p:style>
+      </p:cxnSp>
+      <p:cxnSp>
+        <p:nvCxnSpPr>
+          <p:cNvPr id="14" name="Straight Arrow Connector 13">
+            <a:extLst>
+              <a:ext uri="{FF2B5EF4-FFF2-40B4-BE49-F238E27FC236}">
+                <a16:creationId xmlns:a16="http://schemas.microsoft.com/office/drawing/2014/main" id="{4FEC7B29-FA56-77AC-EAF1-58440F2B4AF7}"/>
+              </a:ext>
+            </a:extLst>
+          </p:cNvPr>
+          <p:cNvCxnSpPr>
+            <a:cxnSpLocks/>
+          </p:cNvCxnSpPr>
+          <p:nvPr/>
+        </p:nvCxnSpPr>
+        <p:spPr>
+          <a:xfrm>
+            <a:off x="5562600" y="4495800"/>
+            <a:ext cx="533400" cy="0"/>
+          </a:xfrm>
+          <a:prstGeom prst="straightConnector1">
+            <a:avLst/>
+          </a:prstGeom>
+          <a:ln w="38100">
+            <a:solidFill>
+              <a:schemeClr val="tx1"/>
+            </a:solidFill>
+            <a:tailEnd type="triangle"/>
+          </a:ln>
+        </p:spPr>
+        <p:style>
+          <a:lnRef idx="1">
+            <a:schemeClr val="accent1"/>
+          </a:lnRef>
+          <a:fillRef idx="0">
+            <a:schemeClr val="accent1"/>
+          </a:fillRef>
+          <a:effectRef idx="0">
+            <a:schemeClr val="accent1"/>
+          </a:effectRef>
+          <a:fontRef idx="minor">
+            <a:schemeClr val="tx1"/>
+          </a:fontRef>
+        </p:style>
+      </p:cxnSp>
+      <p:sp>
+        <p:nvSpPr>
+          <p:cNvPr id="24" name="TextBox 23">
+            <a:extLst>
+              <a:ext uri="{FF2B5EF4-FFF2-40B4-BE49-F238E27FC236}">
+                <a16:creationId xmlns:a16="http://schemas.microsoft.com/office/drawing/2014/main" id="{DD0770C1-5B2F-01F5-E7C6-4AFA59F18A40}"/>
+              </a:ext>
+            </a:extLst>
+          </p:cNvPr>
+          <p:cNvSpPr txBox="1"/>
+          <p:nvPr/>
+        </p:nvSpPr>
+        <p:spPr>
+          <a:xfrm>
+            <a:off x="4076700" y="2514629"/>
+            <a:ext cx="6094562" cy="646331"/>
+          </a:xfrm>
+          <a:prstGeom prst="rect">
+            <a:avLst/>
+          </a:prstGeom>
+          <a:noFill/>
+        </p:spPr>
+        <p:txBody>
+          <a:bodyPr wrap="square">
+            <a:spAutoFit/>
+          </a:bodyPr>
+          <a:lstStyle/>
+          <a:p>
+            <a:pPr algn="ctr" fontAlgn="base">
+              <a:spcAft>
+                <a:spcPct val="0"/>
+              </a:spcAft>
+            </a:pPr>
+            <a:r>
+              <a:rPr lang="en-US" sz="1800" dirty="0"/>
+              <a:t>Zoom disabled</a:t>
+            </a:r>
+          </a:p>
+          <a:p>
+            <a:pPr marL="0" lvl="0" indent="0" algn="ctr" fontAlgn="base">
+              <a:spcAft>
+                <a:spcPct val="0"/>
+              </a:spcAft>
+              <a:buNone/>
+            </a:pPr>
+            <a:endParaRPr lang="en-US" sz="1800" dirty="0"/>
+          </a:p>
+        </p:txBody>
+      </p:sp>
+      <p:sp>
+        <p:nvSpPr>
+          <p:cNvPr id="25" name="Rectangle: Rounded Corners 24">
+            <a:extLst>
+              <a:ext uri="{FF2B5EF4-FFF2-40B4-BE49-F238E27FC236}">
+                <a16:creationId xmlns:a16="http://schemas.microsoft.com/office/drawing/2014/main" id="{1374CDCF-E602-92B4-1EC9-FFBC17A88783}"/>
+              </a:ext>
+            </a:extLst>
+          </p:cNvPr>
+          <p:cNvSpPr/>
+          <p:nvPr/>
+        </p:nvSpPr>
+        <p:spPr>
+          <a:xfrm>
+            <a:off x="3505200" y="3886200"/>
+            <a:ext cx="2057400" cy="1219200"/>
+          </a:xfrm>
+          <a:prstGeom prst="roundRect">
+            <a:avLst/>
+          </a:prstGeom>
+          <a:ln>
+            <a:noFill/>
+          </a:ln>
+          <a:effectLst>
+            <a:outerShdw blurRad="184150" dist="241300" dir="11520000" sx="110000" sy="110000" algn="ctr">
+              <a:srgbClr val="000000">
+                <a:alpha val="18000"/>
+              </a:srgbClr>
+            </a:outerShdw>
+            <a:reflection blurRad="6350" stA="50000" endA="300" endPos="38500" dist="50800" dir="5400000" sy="-100000" algn="bl" rotWithShape="0"/>
+          </a:effectLst>
+          <a:scene3d>
+            <a:camera prst="orthographicFront"/>
+            <a:lightRig rig="flood" dir="t">
+              <a:rot lat="0" lon="0" rev="13800000"/>
+            </a:lightRig>
+          </a:scene3d>
+          <a:sp3d extrusionH="107950" prstMaterial="plastic">
+            <a:bevelT w="82550" h="63500" prst="divot"/>
+            <a:bevelB/>
+          </a:sp3d>
+        </p:spPr>
+        <p:style>
+          <a:lnRef idx="2">
+            <a:schemeClr val="accent1">
+              <a:shade val="15000"/>
+            </a:schemeClr>
+          </a:lnRef>
+          <a:fillRef idx="1">
+            <a:schemeClr val="accent1"/>
+          </a:fillRef>
+          <a:effectRef idx="0">
+            <a:schemeClr val="accent1"/>
+          </a:effectRef>
+          <a:fontRef idx="minor">
+            <a:schemeClr val="lt1"/>
+          </a:fontRef>
+        </p:style>
+        <p:txBody>
+          <a:bodyPr rtlCol="1" anchor="ctr"/>
+          <a:lstStyle/>
+          <a:p>
+            <a:pPr algn="ctr"/>
+            <a:r>
+              <a:rPr lang="en-US" dirty="0"/>
+              <a:t>BRAM</a:t>
+            </a:r>
+          </a:p>
+          <a:p>
+            <a:pPr algn="ctr"/>
+            <a:r>
+              <a:rPr lang="en-US" dirty="0"/>
+              <a:t>(320 x 240 x 12)</a:t>
+            </a:r>
+          </a:p>
+        </p:txBody>
+      </p:sp>
+      <p:cxnSp>
+        <p:nvCxnSpPr>
+          <p:cNvPr id="27" name="Straight Arrow Connector 26">
+            <a:extLst>
+              <a:ext uri="{FF2B5EF4-FFF2-40B4-BE49-F238E27FC236}">
+                <a16:creationId xmlns:a16="http://schemas.microsoft.com/office/drawing/2014/main" id="{362B3FD8-3051-BD10-EC39-F092BDCE5E47}"/>
+              </a:ext>
+            </a:extLst>
+          </p:cNvPr>
+          <p:cNvCxnSpPr>
+            <a:cxnSpLocks/>
+          </p:cNvCxnSpPr>
+          <p:nvPr/>
+        </p:nvCxnSpPr>
+        <p:spPr>
+          <a:xfrm flipV="1">
+            <a:off x="1943100" y="4486275"/>
+            <a:ext cx="1609725" cy="9525"/>
+          </a:xfrm>
+          <a:prstGeom prst="straightConnector1">
+            <a:avLst/>
+          </a:prstGeom>
+          <a:ln w="38100">
+            <a:solidFill>
+              <a:schemeClr val="tx1"/>
+            </a:solidFill>
+            <a:tailEnd type="triangle"/>
+          </a:ln>
+        </p:spPr>
+        <p:style>
+          <a:lnRef idx="1">
+            <a:schemeClr val="accent1"/>
+          </a:lnRef>
+          <a:fillRef idx="0">
+            <a:schemeClr val="accent1"/>
+          </a:fillRef>
+          <a:effectRef idx="0">
+            <a:schemeClr val="accent1"/>
+          </a:effectRef>
+          <a:fontRef idx="minor">
+            <a:schemeClr val="tx1"/>
+          </a:fontRef>
+        </p:style>
+      </p:cxnSp>
+      <p:cxnSp>
+        <p:nvCxnSpPr>
+          <p:cNvPr id="28" name="Straight Connector 27">
+            <a:extLst>
+              <a:ext uri="{FF2B5EF4-FFF2-40B4-BE49-F238E27FC236}">
+                <a16:creationId xmlns:a16="http://schemas.microsoft.com/office/drawing/2014/main" id="{93312084-3A4E-3047-08F7-296BEC8CBE4B}"/>
+              </a:ext>
+            </a:extLst>
+          </p:cNvPr>
+          <p:cNvCxnSpPr>
+            <a:cxnSpLocks/>
+          </p:cNvCxnSpPr>
+          <p:nvPr/>
+        </p:nvCxnSpPr>
+        <p:spPr>
+          <a:xfrm>
+            <a:off x="1943100" y="3581400"/>
+            <a:ext cx="0" cy="904875"/>
+          </a:xfrm>
+          <a:prstGeom prst="line">
+            <a:avLst/>
+          </a:prstGeom>
+          <a:ln w="38100">
+            <a:solidFill>
+              <a:schemeClr val="tx1"/>
+            </a:solidFill>
+          </a:ln>
+        </p:spPr>
+        <p:style>
+          <a:lnRef idx="1">
+            <a:schemeClr val="accent1"/>
+          </a:lnRef>
+          <a:fillRef idx="0">
+            <a:schemeClr val="accent1"/>
+          </a:fillRef>
+          <a:effectRef idx="0">
+            <a:schemeClr val="accent1"/>
+          </a:effectRef>
+          <a:fontRef idx="minor">
+            <a:schemeClr val="tx1"/>
+          </a:fontRef>
+        </p:style>
+      </p:cxnSp>
+      <p:sp>
+        <p:nvSpPr>
+          <p:cNvPr id="36" name="TextBox 35">
+            <a:extLst>
+              <a:ext uri="{FF2B5EF4-FFF2-40B4-BE49-F238E27FC236}">
+                <a16:creationId xmlns:a16="http://schemas.microsoft.com/office/drawing/2014/main" id="{B3C0E562-C3EE-1CBE-A6A5-0264BA01C3B8}"/>
+              </a:ext>
+            </a:extLst>
+          </p:cNvPr>
+          <p:cNvSpPr txBox="1"/>
+          <p:nvPr/>
+        </p:nvSpPr>
+        <p:spPr>
+          <a:xfrm>
+            <a:off x="1143000" y="4078069"/>
+            <a:ext cx="3122762" cy="646331"/>
+          </a:xfrm>
+          <a:prstGeom prst="rect">
+            <a:avLst/>
+          </a:prstGeom>
+          <a:noFill/>
+        </p:spPr>
+        <p:txBody>
+          <a:bodyPr wrap="square">
+            <a:spAutoFit/>
+          </a:bodyPr>
+          <a:lstStyle/>
+          <a:p>
+            <a:pPr algn="ctr" fontAlgn="base">
+              <a:spcAft>
+                <a:spcPct val="0"/>
+              </a:spcAft>
+            </a:pPr>
+            <a:r>
+              <a:rPr lang="en-US" sz="1800" dirty="0"/>
+              <a:t>Zoom enabled</a:t>
+            </a:r>
+          </a:p>
+          <a:p>
+            <a:pPr marL="0" lvl="0" indent="0" algn="ctr" fontAlgn="base">
+              <a:spcAft>
+                <a:spcPct val="0"/>
+              </a:spcAft>
+              <a:buNone/>
+            </a:pPr>
+            <a:endParaRPr lang="en-US" sz="1800" dirty="0"/>
+          </a:p>
+        </p:txBody>
+      </p:sp>
+      <p:sp>
+        <p:nvSpPr>
+          <p:cNvPr id="37" name="Title 1">
+            <a:extLst>
+              <a:ext uri="{FF2B5EF4-FFF2-40B4-BE49-F238E27FC236}">
+                <a16:creationId xmlns:a16="http://schemas.microsoft.com/office/drawing/2014/main" id="{0EC5949A-6C5A-6921-011C-535D12FC8C41}"/>
+              </a:ext>
+            </a:extLst>
+          </p:cNvPr>
+          <p:cNvSpPr>
+            <a:spLocks noGrp="1"/>
+          </p:cNvSpPr>
+          <p:nvPr>
+            <p:ph type="title"/>
+          </p:nvPr>
+        </p:nvSpPr>
+        <p:spPr>
+          <a:xfrm>
+            <a:off x="1219200" y="457200"/>
+            <a:ext cx="9448800" cy="1143000"/>
+          </a:xfrm>
+        </p:spPr>
+        <p:txBody>
+          <a:bodyPr/>
+          <a:lstStyle/>
+          <a:p>
+            <a:r>
+              <a:rPr lang="en-US" dirty="0"/>
+              <a:t>Architecture V2.0 – Data Flow.</a:t>
+            </a:r>
+          </a:p>
+        </p:txBody>
+      </p:sp>
+      <p:sp>
+        <p:nvSpPr>
+          <p:cNvPr id="4" name="Rectangle: Rounded Corners 3">
+            <a:extLst>
+              <a:ext uri="{FF2B5EF4-FFF2-40B4-BE49-F238E27FC236}">
+                <a16:creationId xmlns:a16="http://schemas.microsoft.com/office/drawing/2014/main" id="{6F7BECAA-2849-36F8-79D2-D654EFC5F25A}"/>
+              </a:ext>
+            </a:extLst>
+          </p:cNvPr>
+          <p:cNvSpPr/>
+          <p:nvPr/>
+        </p:nvSpPr>
+        <p:spPr>
+          <a:xfrm>
+            <a:off x="8686800" y="3835255"/>
+            <a:ext cx="2057400" cy="1219200"/>
+          </a:xfrm>
+          <a:prstGeom prst="roundRect">
+            <a:avLst/>
+          </a:prstGeom>
+          <a:ln>
+            <a:noFill/>
+          </a:ln>
+          <a:effectLst>
+            <a:outerShdw blurRad="184150" dist="241300" dir="11520000" sx="110000" sy="110000" algn="ctr">
+              <a:srgbClr val="000000">
+                <a:alpha val="18000"/>
+              </a:srgbClr>
+            </a:outerShdw>
+            <a:reflection blurRad="6350" stA="50000" endA="300" endPos="38500" dist="50800" dir="5400000" sy="-100000" algn="bl" rotWithShape="0"/>
+          </a:effectLst>
+          <a:scene3d>
+            <a:camera prst="orthographicFront"/>
+            <a:lightRig rig="flood" dir="t">
+              <a:rot lat="0" lon="0" rev="13800000"/>
+            </a:lightRig>
+          </a:scene3d>
+          <a:sp3d extrusionH="107950" prstMaterial="plastic">
+            <a:bevelT w="82550" h="63500" prst="divot"/>
+            <a:bevelB/>
+          </a:sp3d>
+        </p:spPr>
+        <p:style>
+          <a:lnRef idx="2">
+            <a:schemeClr val="accent1">
+              <a:shade val="15000"/>
+            </a:schemeClr>
+          </a:lnRef>
+          <a:fillRef idx="1">
+            <a:schemeClr val="accent1"/>
+          </a:fillRef>
+          <a:effectRef idx="0">
+            <a:schemeClr val="accent1"/>
+          </a:effectRef>
+          <a:fontRef idx="minor">
+            <a:schemeClr val="lt1"/>
+          </a:fontRef>
+        </p:style>
+        <p:txBody>
+          <a:bodyPr rtlCol="1" anchor="ctr"/>
+          <a:lstStyle/>
+          <a:p>
+            <a:pPr algn="ctr"/>
+            <a:r>
+              <a:rPr lang="en-US" dirty="0"/>
+              <a:t>BRAM</a:t>
+            </a:r>
+          </a:p>
+          <a:p>
+            <a:pPr algn="ctr"/>
+            <a:r>
+              <a:rPr lang="en-US" dirty="0"/>
+              <a:t>(640 x 480 x 12)</a:t>
+            </a:r>
+          </a:p>
+        </p:txBody>
+      </p:sp>
+      <p:sp>
+        <p:nvSpPr>
+          <p:cNvPr id="18" name="TextBox 17">
+            <a:extLst>
+              <a:ext uri="{FF2B5EF4-FFF2-40B4-BE49-F238E27FC236}">
+                <a16:creationId xmlns:a16="http://schemas.microsoft.com/office/drawing/2014/main" id="{C3192D27-8B32-AE8A-DB12-D39491E1A648}"/>
+              </a:ext>
+            </a:extLst>
+          </p:cNvPr>
+          <p:cNvSpPr txBox="1"/>
+          <p:nvPr/>
+        </p:nvSpPr>
+        <p:spPr>
+          <a:xfrm>
+            <a:off x="6934200" y="5900668"/>
+            <a:ext cx="1961042" cy="646331"/>
+          </a:xfrm>
+          <a:prstGeom prst="rect">
+            <a:avLst/>
+          </a:prstGeom>
+          <a:noFill/>
+        </p:spPr>
+        <p:txBody>
+          <a:bodyPr wrap="square">
+            <a:spAutoFit/>
+          </a:bodyPr>
+          <a:lstStyle/>
+          <a:p>
+            <a:pPr algn="ctr" fontAlgn="base">
+              <a:spcAft>
+                <a:spcPct val="0"/>
+              </a:spcAft>
+            </a:pPr>
+            <a:r>
+              <a:rPr lang="en-US" dirty="0"/>
+              <a:t>filter</a:t>
+            </a:r>
+            <a:r>
+              <a:rPr lang="en-US" sz="1800" dirty="0"/>
+              <a:t> disabled</a:t>
+            </a:r>
+          </a:p>
+          <a:p>
+            <a:pPr marL="0" lvl="0" indent="0" algn="ctr" fontAlgn="base">
+              <a:spcAft>
+                <a:spcPct val="0"/>
+              </a:spcAft>
+              <a:buNone/>
+            </a:pPr>
+            <a:endParaRPr lang="en-US" sz="1800" dirty="0"/>
+          </a:p>
+        </p:txBody>
+      </p:sp>
+      <p:cxnSp>
+        <p:nvCxnSpPr>
+          <p:cNvPr id="20" name="Straight Arrow Connector 19">
+            <a:extLst>
+              <a:ext uri="{FF2B5EF4-FFF2-40B4-BE49-F238E27FC236}">
+                <a16:creationId xmlns:a16="http://schemas.microsoft.com/office/drawing/2014/main" id="{F05A38C4-A845-E968-34F3-93D94D980A02}"/>
+              </a:ext>
+            </a:extLst>
+          </p:cNvPr>
+          <p:cNvCxnSpPr>
+            <a:cxnSpLocks/>
+          </p:cNvCxnSpPr>
+          <p:nvPr/>
+        </p:nvCxnSpPr>
+        <p:spPr>
+          <a:xfrm>
+            <a:off x="8153400" y="4486275"/>
+            <a:ext cx="533400" cy="0"/>
+          </a:xfrm>
+          <a:prstGeom prst="straightConnector1">
+            <a:avLst/>
+          </a:prstGeom>
+          <a:ln w="38100">
+            <a:solidFill>
+              <a:schemeClr val="tx1"/>
+            </a:solidFill>
+            <a:tailEnd type="triangle"/>
+          </a:ln>
+        </p:spPr>
+        <p:style>
+          <a:lnRef idx="1">
+            <a:schemeClr val="accent1"/>
+          </a:lnRef>
+          <a:fillRef idx="0">
+            <a:schemeClr val="accent1"/>
+          </a:fillRef>
+          <a:effectRef idx="0">
+            <a:schemeClr val="accent1"/>
+          </a:effectRef>
+          <a:fontRef idx="minor">
+            <a:schemeClr val="tx1"/>
+          </a:fontRef>
+        </p:style>
+      </p:cxnSp>
+      <p:cxnSp>
+        <p:nvCxnSpPr>
+          <p:cNvPr id="23" name="Straight Arrow Connector 22">
+            <a:extLst>
+              <a:ext uri="{FF2B5EF4-FFF2-40B4-BE49-F238E27FC236}">
+                <a16:creationId xmlns:a16="http://schemas.microsoft.com/office/drawing/2014/main" id="{AC1A6EC2-1500-0313-34AF-2A0D1E7C8385}"/>
+              </a:ext>
+            </a:extLst>
+          </p:cNvPr>
+          <p:cNvCxnSpPr>
+            <a:cxnSpLocks/>
+            <a:endCxn id="7" idx="2"/>
+          </p:cNvCxnSpPr>
+          <p:nvPr/>
+        </p:nvCxnSpPr>
+        <p:spPr>
+          <a:xfrm flipV="1">
+            <a:off x="9715500" y="3521936"/>
+            <a:ext cx="0" cy="346196"/>
+          </a:xfrm>
+          <a:prstGeom prst="straightConnector1">
+            <a:avLst/>
+          </a:prstGeom>
+          <a:ln w="38100">
+            <a:solidFill>
+              <a:schemeClr val="tx1"/>
+            </a:solidFill>
+            <a:tailEnd type="triangle"/>
+          </a:ln>
+        </p:spPr>
+        <p:style>
+          <a:lnRef idx="1">
+            <a:schemeClr val="accent1"/>
+          </a:lnRef>
+          <a:fillRef idx="0">
+            <a:schemeClr val="accent1"/>
+          </a:fillRef>
+          <a:effectRef idx="0">
+            <a:schemeClr val="accent1"/>
+          </a:effectRef>
+          <a:fontRef idx="minor">
+            <a:schemeClr val="tx1"/>
+          </a:fontRef>
+        </p:style>
+      </p:cxnSp>
+      <p:sp>
+        <p:nvSpPr>
+          <p:cNvPr id="29" name="TextBox 28">
+            <a:extLst>
+              <a:ext uri="{FF2B5EF4-FFF2-40B4-BE49-F238E27FC236}">
+                <a16:creationId xmlns:a16="http://schemas.microsoft.com/office/drawing/2014/main" id="{7F22A24E-61F6-9B11-044B-FABBD096E4C8}"/>
+              </a:ext>
+            </a:extLst>
+          </p:cNvPr>
+          <p:cNvSpPr txBox="1"/>
+          <p:nvPr/>
+        </p:nvSpPr>
+        <p:spPr>
+          <a:xfrm>
+            <a:off x="5562600" y="3563641"/>
+            <a:ext cx="3122762" cy="646331"/>
+          </a:xfrm>
+          <a:prstGeom prst="rect">
+            <a:avLst/>
+          </a:prstGeom>
+          <a:noFill/>
+        </p:spPr>
+        <p:txBody>
+          <a:bodyPr wrap="square">
+            <a:spAutoFit/>
+          </a:bodyPr>
+          <a:lstStyle/>
+          <a:p>
+            <a:pPr algn="ctr" fontAlgn="base">
+              <a:spcAft>
+                <a:spcPct val="0"/>
+              </a:spcAft>
+            </a:pPr>
+            <a:r>
+              <a:rPr lang="en-US" sz="1800" dirty="0"/>
+              <a:t>filter enabled</a:t>
+            </a:r>
+          </a:p>
+          <a:p>
+            <a:pPr marL="0" lvl="0" indent="0" algn="ctr" fontAlgn="base">
+              <a:spcAft>
+                <a:spcPct val="0"/>
+              </a:spcAft>
+              <a:buNone/>
+            </a:pPr>
+            <a:endParaRPr lang="en-US" sz="1800" dirty="0"/>
+          </a:p>
+        </p:txBody>
+      </p:sp>
+      <p:grpSp>
+        <p:nvGrpSpPr>
+          <p:cNvPr id="40" name="Group 39">
+            <a:extLst>
+              <a:ext uri="{FF2B5EF4-FFF2-40B4-BE49-F238E27FC236}">
+                <a16:creationId xmlns:a16="http://schemas.microsoft.com/office/drawing/2014/main" id="{8A8DE3DC-2D7F-5B5D-E310-85E75323BE0E}"/>
+              </a:ext>
+            </a:extLst>
+          </p:cNvPr>
+          <p:cNvGrpSpPr/>
+          <p:nvPr/>
+        </p:nvGrpSpPr>
+        <p:grpSpPr>
+          <a:xfrm>
+            <a:off x="4518974" y="2971800"/>
+            <a:ext cx="6758626" cy="2895599"/>
+            <a:chOff x="4518974" y="2971800"/>
+            <a:chExt cx="6758626" cy="2895599"/>
+          </a:xfrm>
+        </p:grpSpPr>
+        <p:grpSp>
+          <p:nvGrpSpPr>
+            <p:cNvPr id="9" name="Group 8">
+              <a:extLst>
+                <a:ext uri="{FF2B5EF4-FFF2-40B4-BE49-F238E27FC236}">
+                  <a16:creationId xmlns:a16="http://schemas.microsoft.com/office/drawing/2014/main" id="{A08F1330-E2FE-011F-5C5B-07581C2480A1}"/>
+                </a:ext>
+              </a:extLst>
+            </p:cNvPr>
+            <p:cNvGrpSpPr/>
+            <p:nvPr/>
+          </p:nvGrpSpPr>
+          <p:grpSpPr>
+            <a:xfrm flipV="1">
+              <a:off x="4518974" y="5108794"/>
+              <a:ext cx="6747081" cy="758605"/>
+              <a:chOff x="4533900" y="1828800"/>
+              <a:chExt cx="6747081" cy="685800"/>
+            </a:xfrm>
+          </p:grpSpPr>
+          <p:cxnSp>
+            <p:nvCxnSpPr>
+              <p:cNvPr id="12" name="Straight Connector 11">
+                <a:extLst>
+                  <a:ext uri="{FF2B5EF4-FFF2-40B4-BE49-F238E27FC236}">
+                    <a16:creationId xmlns:a16="http://schemas.microsoft.com/office/drawing/2014/main" id="{B16244C9-E517-C9B1-DED0-ED603AF33BE5}"/>
+                  </a:ext>
+                </a:extLst>
+              </p:cNvPr>
+              <p:cNvCxnSpPr>
+                <a:cxnSpLocks/>
+              </p:cNvCxnSpPr>
+              <p:nvPr/>
+            </p:nvCxnSpPr>
+            <p:spPr>
+              <a:xfrm flipH="1" flipV="1">
+                <a:off x="4533900" y="1828800"/>
+                <a:ext cx="6747081" cy="28307"/>
+              </a:xfrm>
+              <a:prstGeom prst="line">
+                <a:avLst/>
+              </a:prstGeom>
+              <a:ln w="38100">
+                <a:solidFill>
+                  <a:schemeClr val="tx1"/>
+                </a:solidFill>
+              </a:ln>
+            </p:spPr>
+            <p:style>
+              <a:lnRef idx="1">
+                <a:schemeClr val="accent1"/>
+              </a:lnRef>
+              <a:fillRef idx="0">
+                <a:schemeClr val="accent1"/>
+              </a:fillRef>
+              <a:effectRef idx="0">
+                <a:schemeClr val="accent1"/>
+              </a:effectRef>
+              <a:fontRef idx="minor">
+                <a:schemeClr val="tx1"/>
+              </a:fontRef>
+            </p:style>
+          </p:cxnSp>
+          <p:cxnSp>
+            <p:nvCxnSpPr>
+              <p:cNvPr id="17" name="Straight Connector 16">
+                <a:extLst>
+                  <a:ext uri="{FF2B5EF4-FFF2-40B4-BE49-F238E27FC236}">
+                    <a16:creationId xmlns:a16="http://schemas.microsoft.com/office/drawing/2014/main" id="{90978311-E3EB-6B16-7F6F-269749DF9963}"/>
+                  </a:ext>
+                </a:extLst>
+              </p:cNvPr>
+              <p:cNvCxnSpPr>
+                <a:cxnSpLocks/>
+              </p:cNvCxnSpPr>
+              <p:nvPr/>
+            </p:nvCxnSpPr>
+            <p:spPr>
+              <a:xfrm>
+                <a:off x="4533900" y="1828800"/>
+                <a:ext cx="0" cy="685800"/>
+              </a:xfrm>
+              <a:prstGeom prst="line">
+                <a:avLst/>
+              </a:prstGeom>
+              <a:ln w="38100">
+                <a:solidFill>
+                  <a:schemeClr val="tx1"/>
+                </a:solidFill>
+              </a:ln>
+            </p:spPr>
+            <p:style>
+              <a:lnRef idx="1">
+                <a:schemeClr val="accent1"/>
+              </a:lnRef>
+              <a:fillRef idx="0">
+                <a:schemeClr val="accent1"/>
+              </a:fillRef>
+              <a:effectRef idx="0">
+                <a:schemeClr val="accent1"/>
+              </a:effectRef>
+              <a:fontRef idx="minor">
+                <a:schemeClr val="tx1"/>
+              </a:fontRef>
+            </p:style>
+          </p:cxnSp>
+        </p:grpSp>
+        <p:cxnSp>
+          <p:nvCxnSpPr>
+            <p:cNvPr id="32" name="Straight Arrow Connector 31">
+              <a:extLst>
+                <a:ext uri="{FF2B5EF4-FFF2-40B4-BE49-F238E27FC236}">
+                  <a16:creationId xmlns:a16="http://schemas.microsoft.com/office/drawing/2014/main" id="{DCC85456-D074-7EF6-61F2-6CF3A54E6157}"/>
+                </a:ext>
+              </a:extLst>
+            </p:cNvPr>
+            <p:cNvCxnSpPr>
+              <a:cxnSpLocks/>
+            </p:cNvCxnSpPr>
+            <p:nvPr/>
+          </p:nvCxnSpPr>
+          <p:spPr>
+            <a:xfrm flipH="1">
+              <a:off x="10744200" y="2971800"/>
+              <a:ext cx="533400" cy="0"/>
+            </a:xfrm>
+            <a:prstGeom prst="straightConnector1">
+              <a:avLst/>
+            </a:prstGeom>
+            <a:ln w="38100">
+              <a:solidFill>
+                <a:schemeClr val="tx1"/>
+              </a:solidFill>
+              <a:tailEnd type="triangle"/>
+            </a:ln>
+          </p:spPr>
+          <p:style>
+            <a:lnRef idx="1">
+              <a:schemeClr val="accent1"/>
+            </a:lnRef>
+            <a:fillRef idx="0">
+              <a:schemeClr val="accent1"/>
+            </a:fillRef>
+            <a:effectRef idx="0">
+              <a:schemeClr val="accent1"/>
+            </a:effectRef>
+            <a:fontRef idx="minor">
+              <a:schemeClr val="tx1"/>
+            </a:fontRef>
+          </p:style>
+        </p:cxnSp>
+        <p:cxnSp>
+          <p:nvCxnSpPr>
+            <p:cNvPr id="35" name="Straight Connector 34">
+              <a:extLst>
+                <a:ext uri="{FF2B5EF4-FFF2-40B4-BE49-F238E27FC236}">
+                  <a16:creationId xmlns:a16="http://schemas.microsoft.com/office/drawing/2014/main" id="{9E03FDF2-0E64-51F2-35C7-31A10CE7C6ED}"/>
+                </a:ext>
+              </a:extLst>
+            </p:cNvPr>
+            <p:cNvCxnSpPr>
+              <a:cxnSpLocks/>
+            </p:cNvCxnSpPr>
+            <p:nvPr/>
+          </p:nvCxnSpPr>
+          <p:spPr>
+            <a:xfrm flipV="1">
+              <a:off x="11266055" y="2971800"/>
+              <a:ext cx="11545" cy="2864287"/>
+            </a:xfrm>
+            <a:prstGeom prst="line">
+              <a:avLst/>
+            </a:prstGeom>
+            <a:ln w="38100">
+              <a:solidFill>
+                <a:schemeClr val="tx1"/>
+              </a:solidFill>
+            </a:ln>
+          </p:spPr>
+          <p:style>
+            <a:lnRef idx="1">
+              <a:schemeClr val="accent1"/>
+            </a:lnRef>
+            <a:fillRef idx="0">
+              <a:schemeClr val="accent1"/>
+            </a:fillRef>
+            <a:effectRef idx="0">
+              <a:schemeClr val="accent1"/>
+            </a:effectRef>
+            <a:fontRef idx="minor">
+              <a:schemeClr val="tx1"/>
+            </a:fontRef>
+          </p:style>
+        </p:cxnSp>
+      </p:grpSp>
+      <p:cxnSp>
+        <p:nvCxnSpPr>
+          <p:cNvPr id="41" name="Straight Arrow Connector 40">
+            <a:extLst>
+              <a:ext uri="{FF2B5EF4-FFF2-40B4-BE49-F238E27FC236}">
+                <a16:creationId xmlns:a16="http://schemas.microsoft.com/office/drawing/2014/main" id="{A1910F71-A7B0-3059-5304-FC3B9DBACC40}"/>
+              </a:ext>
+            </a:extLst>
+          </p:cNvPr>
+          <p:cNvCxnSpPr>
+            <a:cxnSpLocks/>
+          </p:cNvCxnSpPr>
+          <p:nvPr/>
+        </p:nvCxnSpPr>
+        <p:spPr>
+          <a:xfrm>
+            <a:off x="5562600" y="2912336"/>
+            <a:ext cx="3122762" cy="0"/>
+          </a:xfrm>
+          <a:prstGeom prst="straightConnector1">
+            <a:avLst/>
+          </a:prstGeom>
+          <a:ln w="38100">
+            <a:solidFill>
+              <a:schemeClr val="tx1"/>
+            </a:solidFill>
+            <a:tailEnd type="triangle"/>
+          </a:ln>
+        </p:spPr>
+        <p:style>
+          <a:lnRef idx="1">
+            <a:schemeClr val="accent1"/>
+          </a:lnRef>
+          <a:fillRef idx="0">
+            <a:schemeClr val="accent1"/>
+          </a:fillRef>
+          <a:effectRef idx="0">
+            <a:schemeClr val="accent1"/>
+          </a:effectRef>
+          <a:fontRef idx="minor">
+            <a:schemeClr val="tx1"/>
+          </a:fontRef>
+        </p:style>
+      </p:cxnSp>
     </p:spTree>
     <p:extLst>
       <p:ext uri="{BB962C8B-B14F-4D97-AF65-F5344CB8AC3E}">
-        <p14:creationId xmlns:p14="http://schemas.microsoft.com/office/powerpoint/2010/main" val="3724325969"/>
+        <p14:creationId xmlns:p14="http://schemas.microsoft.com/office/powerpoint/2010/main" val="4217165284"/>
       </p:ext>
     </p:extLst>
   </p:cSld>
@@ -21751,8 +23975,8 @@
 </p:sld>
 </file>
 
-<file path=ppt/slides/slide8.xml><?xml version="1.0" encoding="utf-8"?>
-<p:sld xmlns:a="http://schemas.openxmlformats.org/drawingml/2006/main" xmlns:r="http://schemas.openxmlformats.org/officeDocument/2006/relationships" xmlns:p="http://schemas.openxmlformats.org/presentationml/2006/main">
+<file path=ppt/slides/slide9.xml><?xml version="1.0" encoding="utf-8"?>
+<p:sld xmlns:a="http://schemas.openxmlformats.org/drawingml/2006/main" xmlns:r="http://schemas.openxmlformats.org/officeDocument/2006/relationships" xmlns:p="http://schemas.openxmlformats.org/presentationml/2006/main" show="0">
   <p:cSld>
     <p:spTree>
       <p:nvGrpSpPr>
@@ -21774,35 +23998,6 @@
           <a:chExt cx="0" cy="0"/>
         </a:xfrm>
       </p:grpSpPr>
-      <p:sp>
-        <p:nvSpPr>
-          <p:cNvPr id="2" name="Title 1">
-            <a:extLst>
-              <a:ext uri="{FF2B5EF4-FFF2-40B4-BE49-F238E27FC236}">
-                <a16:creationId xmlns:a16="http://schemas.microsoft.com/office/drawing/2014/main" id="{3410BBFF-BA24-2034-6517-B152967A34C1}"/>
-              </a:ext>
-            </a:extLst>
-          </p:cNvPr>
-          <p:cNvSpPr>
-            <a:spLocks noGrp="1"/>
-          </p:cNvSpPr>
-          <p:nvPr>
-            <p:ph type="title"/>
-          </p:nvPr>
-        </p:nvSpPr>
-        <p:spPr/>
-        <p:txBody>
-          <a:bodyPr/>
-          <a:lstStyle/>
-          <a:p>
-            <a:pPr algn="ctr"/>
-            <a:r>
-              <a:rPr lang="en-US" dirty="0"/>
-              <a:t>Main State Machine</a:t>
-            </a:r>
-          </a:p>
-        </p:txBody>
-      </p:sp>
       <p:graphicFrame>
         <p:nvGraphicFramePr>
           <p:cNvPr id="7" name="Content Placeholder 6">
@@ -22569,48 +24764,12 @@
           </a:prstGeom>
         </p:spPr>
       </p:pic>
-    </p:spTree>
-    <p:extLst>
-      <p:ext uri="{BB962C8B-B14F-4D97-AF65-F5344CB8AC3E}">
-        <p14:creationId xmlns:p14="http://schemas.microsoft.com/office/powerpoint/2010/main" val="2404027986"/>
-      </p:ext>
-    </p:extLst>
-  </p:cSld>
-  <p:clrMapOvr>
-    <a:masterClrMapping/>
-  </p:clrMapOvr>
-</p:sld>
-</file>
-
-<file path=ppt/slides/slide9.xml><?xml version="1.0" encoding="utf-8"?>
-<p:sld xmlns:a="http://schemas.openxmlformats.org/drawingml/2006/main" xmlns:r="http://schemas.openxmlformats.org/officeDocument/2006/relationships" xmlns:p="http://schemas.openxmlformats.org/presentationml/2006/main">
-  <p:cSld>
-    <p:spTree>
-      <p:nvGrpSpPr>
-        <p:cNvPr id="1" name="">
-          <a:extLst>
-            <a:ext uri="{FF2B5EF4-FFF2-40B4-BE49-F238E27FC236}">
-              <a16:creationId xmlns:a16="http://schemas.microsoft.com/office/drawing/2014/main" id="{B852AF45-8B4E-EADA-A7B5-B3ABAFFA86B2}"/>
-            </a:ext>
-          </a:extLst>
-        </p:cNvPr>
-        <p:cNvGrpSpPr/>
-        <p:nvPr/>
-      </p:nvGrpSpPr>
-      <p:grpSpPr>
-        <a:xfrm>
-          <a:off x="0" y="0"/>
-          <a:ext cx="0" cy="0"/>
-          <a:chOff x="0" y="0"/>
-          <a:chExt cx="0" cy="0"/>
-        </a:xfrm>
-      </p:grpSpPr>
       <p:sp>
         <p:nvSpPr>
-          <p:cNvPr id="15" name="Title 1">
+          <p:cNvPr id="6" name="Title 1">
             <a:extLst>
               <a:ext uri="{FF2B5EF4-FFF2-40B4-BE49-F238E27FC236}">
-                <a16:creationId xmlns:a16="http://schemas.microsoft.com/office/drawing/2014/main" id="{D9475BD5-5683-C3D5-F4CD-914F055105FF}"/>
+                <a16:creationId xmlns:a16="http://schemas.microsoft.com/office/drawing/2014/main" id="{C6F67B96-6CA8-9CC7-08D8-6720F98266E3}"/>
               </a:ext>
             </a:extLst>
           </p:cNvPr>
@@ -22623,86 +24782,25 @@
         </p:nvSpPr>
         <p:spPr>
           <a:xfrm>
-            <a:off x="1524000" y="457200"/>
-            <a:ext cx="9144000" cy="1143000"/>
+            <a:off x="1219200" y="457200"/>
+            <a:ext cx="9448800" cy="1143000"/>
           </a:xfrm>
         </p:spPr>
         <p:txBody>
           <a:bodyPr/>
           <a:lstStyle/>
           <a:p>
-            <a:pPr algn="ctr"/>
             <a:r>
               <a:rPr lang="en-US" dirty="0"/>
-              <a:t>Main State Machine</a:t>
+              <a:t>User interface</a:t>
             </a:r>
           </a:p>
         </p:txBody>
       </p:sp>
-      <p:pic>
-        <p:nvPicPr>
-          <p:cNvPr id="27" name="Picture 26" descr="A screen with many colors&#10;&#10;AI-generated content may be incorrect.">
-            <a:extLst>
-              <a:ext uri="{FF2B5EF4-FFF2-40B4-BE49-F238E27FC236}">
-                <a16:creationId xmlns:a16="http://schemas.microsoft.com/office/drawing/2014/main" id="{35C4AAE8-28BD-9AFA-CECF-401852188E87}"/>
-              </a:ext>
-            </a:extLst>
-          </p:cNvPr>
-          <p:cNvPicPr>
-            <a:picLocks noChangeAspect="1"/>
-          </p:cNvPicPr>
-          <p:nvPr/>
-        </p:nvPicPr>
-        <p:blipFill>
-          <a:blip r:embed="rId3"/>
-          <a:stretch>
-            <a:fillRect/>
-          </a:stretch>
-        </p:blipFill>
-        <p:spPr>
-          <a:xfrm>
-            <a:off x="1371600" y="3505200"/>
-            <a:ext cx="1791883" cy="1066800"/>
-          </a:xfrm>
-          <a:prstGeom prst="rect">
-            <a:avLst/>
-          </a:prstGeom>
-        </p:spPr>
-      </p:pic>
-      <p:pic>
-        <p:nvPicPr>
-          <p:cNvPr id="29" name="Picture 28">
-            <a:extLst>
-              <a:ext uri="{FF2B5EF4-FFF2-40B4-BE49-F238E27FC236}">
-                <a16:creationId xmlns:a16="http://schemas.microsoft.com/office/drawing/2014/main" id="{6F245036-97D1-C14E-285C-580A8C743717}"/>
-              </a:ext>
-            </a:extLst>
-          </p:cNvPr>
-          <p:cNvPicPr>
-            <a:picLocks noChangeAspect="1"/>
-          </p:cNvPicPr>
-          <p:nvPr/>
-        </p:nvPicPr>
-        <p:blipFill>
-          <a:blip r:embed="rId4"/>
-          <a:stretch>
-            <a:fillRect/>
-          </a:stretch>
-        </p:blipFill>
-        <p:spPr>
-          <a:xfrm>
-            <a:off x="0" y="2368325"/>
-            <a:ext cx="12192000" cy="1136875"/>
-          </a:xfrm>
-          <a:prstGeom prst="rect">
-            <a:avLst/>
-          </a:prstGeom>
-        </p:spPr>
-      </p:pic>
     </p:spTree>
     <p:extLst>
       <p:ext uri="{BB962C8B-B14F-4D97-AF65-F5344CB8AC3E}">
-        <p14:creationId xmlns:p14="http://schemas.microsoft.com/office/powerpoint/2010/main" val="3500706204"/>
+        <p14:creationId xmlns:p14="http://schemas.microsoft.com/office/powerpoint/2010/main" val="2404027986"/>
       </p:ext>
     </p:extLst>
   </p:cSld>

</xml_diff>

<commit_message>
modifying .pptx - v7.0
Signed-off-by: idowein <ido.weinstock@gmail.com>
</commit_message>
<xml_diff>
--- a/datasheets/Digital Zoom presentation.pptx
+++ b/datasheets/Digital Zoom presentation.pptx
@@ -234,7 +234,7 @@
           <a:p>
             <a:fld id="{762B48F5-BACC-47D6-A0F7-82FBF9C6BC85}" type="datetimeFigureOut">
               <a:rPr lang="en-US"/>
-              <a:t>5/14/2025</a:t>
+              <a:t>5/15/2025</a:t>
             </a:fld>
             <a:endParaRPr/>
           </a:p>
@@ -431,7 +431,7 @@
           <a:p>
             <a:fld id="{0CB1CD00-5424-4675-AB18-2C419B060449}" type="datetimeFigureOut">
               <a:rPr lang="en-US"/>
-              <a:t>5/14/2025</a:t>
+              <a:t>5/15/2025</a:t>
             </a:fld>
             <a:endParaRPr/>
           </a:p>
@@ -3045,7 +3045,7 @@
           <a:p>
             <a:fld id="{37CC0096-1860-4642-9CD2-0079EA5E7CD1}" type="datetimeFigureOut">
               <a:rPr lang="en-US" smtClean="0"/>
-              <a:t>5/14/2025</a:t>
+              <a:t>5/15/2025</a:t>
             </a:fld>
             <a:endParaRPr lang="en-US"/>
           </a:p>
@@ -3229,7 +3229,7 @@
           <a:p>
             <a:fld id="{37CC0096-1860-4642-9CD2-0079EA5E7CD1}" type="datetimeFigureOut">
               <a:rPr lang="en-US" smtClean="0"/>
-              <a:t>5/14/2025</a:t>
+              <a:t>5/15/2025</a:t>
             </a:fld>
             <a:endParaRPr lang="en-US"/>
           </a:p>
@@ -3407,7 +3407,7 @@
           <a:p>
             <a:fld id="{37CC0096-1860-4642-9CD2-0079EA5E7CD1}" type="datetimeFigureOut">
               <a:rPr lang="en-US" smtClean="0"/>
-              <a:t>5/14/2025</a:t>
+              <a:t>5/15/2025</a:t>
             </a:fld>
             <a:endParaRPr lang="en-US"/>
           </a:p>
@@ -3850,7 +3850,7 @@
           <a:p>
             <a:fld id="{37CC0096-1860-4642-9CD2-0079EA5E7CD1}" type="datetimeFigureOut">
               <a:rPr lang="en-US" smtClean="0"/>
-              <a:t>5/14/2025</a:t>
+              <a:t>5/15/2025</a:t>
             </a:fld>
             <a:endParaRPr lang="en-US"/>
           </a:p>
@@ -4294,7 +4294,7 @@
           <a:p>
             <a:fld id="{37CC0096-1860-4642-9CD2-0079EA5E7CD1}" type="datetimeFigureOut">
               <a:rPr lang="en-US" smtClean="0"/>
-              <a:t>5/14/2025</a:t>
+              <a:t>5/15/2025</a:t>
             </a:fld>
             <a:endParaRPr lang="en-US"/>
           </a:p>
@@ -4416,7 +4416,7 @@
           <a:p>
             <a:fld id="{37CC0096-1860-4642-9CD2-0079EA5E7CD1}" type="datetimeFigureOut">
               <a:rPr lang="en-US" smtClean="0"/>
-              <a:t>5/14/2025</a:t>
+              <a:t>5/15/2025</a:t>
             </a:fld>
             <a:endParaRPr lang="en-US"/>
           </a:p>
@@ -4516,7 +4516,7 @@
           <a:p>
             <a:fld id="{37CC0096-1860-4642-9CD2-0079EA5E7CD1}" type="datetimeFigureOut">
               <a:rPr lang="en-US" smtClean="0"/>
-              <a:t>5/14/2025</a:t>
+              <a:t>5/15/2025</a:t>
             </a:fld>
             <a:endParaRPr lang="en-US"/>
           </a:p>
@@ -4805,7 +4805,7 @@
           <a:p>
             <a:fld id="{37CC0096-1860-4642-9CD2-0079EA5E7CD1}" type="datetimeFigureOut">
               <a:rPr lang="en-US" smtClean="0"/>
-              <a:t>5/14/2025</a:t>
+              <a:t>5/15/2025</a:t>
             </a:fld>
             <a:endParaRPr lang="en-US"/>
           </a:p>
@@ -5121,7 +5121,7 @@
           <a:p>
             <a:fld id="{37CC0096-1860-4642-9CD2-0079EA5E7CD1}" type="datetimeFigureOut">
               <a:rPr lang="en-US" smtClean="0"/>
-              <a:t>5/14/2025</a:t>
+              <a:t>5/15/2025</a:t>
             </a:fld>
             <a:endParaRPr lang="en-US"/>
           </a:p>
@@ -5353,7 +5353,7 @@
             <a:fld id="{37CC0096-1860-4642-9CD2-0079EA5E7CD1}" type="datetimeFigureOut">
               <a:rPr lang="en-US" smtClean="0"/>
               <a:pPr/>
-              <a:t>5/14/2025</a:t>
+              <a:t>5/15/2025</a:t>
             </a:fld>
             <a:endParaRPr lang="en-US"/>
           </a:p>
@@ -18966,7 +18966,7 @@
         </p:nvSpPr>
         <p:spPr>
           <a:xfrm>
-            <a:off x="1219200" y="457200"/>
+            <a:off x="-304800" y="76200"/>
             <a:ext cx="5410200" cy="1143000"/>
           </a:xfrm>
         </p:spPr>
@@ -22703,7 +22703,7 @@
         </p:nvSpPr>
         <p:spPr>
           <a:xfrm>
-            <a:off x="-303362" y="4840069"/>
+            <a:off x="4533900" y="2688104"/>
             <a:ext cx="6094562" cy="646331"/>
           </a:xfrm>
           <a:prstGeom prst="rect">
@@ -22724,7 +22724,15 @@
             </a:pPr>
             <a:r>
               <a:rPr lang="en-US" sz="1800" dirty="0"/>
-              <a:t>Zoom enabled</a:t>
+              <a:t>Zoom </a:t>
+            </a:r>
+            <a:r>
+              <a:rPr lang="en-US" dirty="0"/>
+              <a:t>dis</a:t>
+            </a:r>
+            <a:r>
+              <a:rPr lang="en-US" sz="1800" dirty="0"/>
+              <a:t>abled</a:t>
             </a:r>
           </a:p>
           <a:p>
@@ -22823,6 +22831,55 @@
           </a:fontRef>
         </p:style>
       </p:cxnSp>
+      <p:sp>
+        <p:nvSpPr>
+          <p:cNvPr id="3" name="TextBox 2">
+            <a:extLst>
+              <a:ext uri="{FF2B5EF4-FFF2-40B4-BE49-F238E27FC236}">
+                <a16:creationId xmlns:a16="http://schemas.microsoft.com/office/drawing/2014/main" id="{9E9EFE75-2FF5-EFD6-0797-ADE228E72F5C}"/>
+              </a:ext>
+            </a:extLst>
+          </p:cNvPr>
+          <p:cNvSpPr txBox="1"/>
+          <p:nvPr/>
+        </p:nvSpPr>
+        <p:spPr>
+          <a:xfrm>
+            <a:off x="-150962" y="4992469"/>
+            <a:ext cx="6094562" cy="646331"/>
+          </a:xfrm>
+          <a:prstGeom prst="rect">
+            <a:avLst/>
+          </a:prstGeom>
+          <a:noFill/>
+        </p:spPr>
+        <p:txBody>
+          <a:bodyPr wrap="square">
+            <a:spAutoFit/>
+          </a:bodyPr>
+          <a:lstStyle/>
+          <a:p>
+            <a:pPr algn="ctr" fontAlgn="base">
+              <a:spcAft>
+                <a:spcPct val="0"/>
+              </a:spcAft>
+            </a:pPr>
+            <a:r>
+              <a:rPr lang="en-US" sz="1800" dirty="0"/>
+              <a:t>Zoom enabled</a:t>
+            </a:r>
+          </a:p>
+          <a:p>
+            <a:pPr marL="0" lvl="0" indent="0" algn="ctr" fontAlgn="base">
+              <a:spcAft>
+                <a:spcPct val="0"/>
+              </a:spcAft>
+              <a:buNone/>
+            </a:pPr>
+            <a:endParaRPr lang="en-US" sz="1800" dirty="0"/>
+          </a:p>
+        </p:txBody>
+      </p:sp>
     </p:spTree>
     <p:extLst>
       <p:ext uri="{BB962C8B-B14F-4D97-AF65-F5344CB8AC3E}">
@@ -23933,6 +23990,79 @@
                                   </p:childTnLst>
                                 </p:cTn>
                               </p:par>
+                              <p:par>
+                                <p:cTn id="68" presetID="2" presetClass="entr" presetSubtype="4" fill="hold" grpId="0" nodeType="withEffect">
+                                  <p:stCondLst>
+                                    <p:cond delay="0"/>
+                                  </p:stCondLst>
+                                  <p:childTnLst>
+                                    <p:set>
+                                      <p:cBhvr>
+                                        <p:cTn id="69" dur="1" fill="hold">
+                                          <p:stCondLst>
+                                            <p:cond delay="0"/>
+                                          </p:stCondLst>
+                                        </p:cTn>
+                                        <p:tgtEl>
+                                          <p:spTgt spid="3"/>
+                                        </p:tgtEl>
+                                        <p:attrNameLst>
+                                          <p:attrName>style.visibility</p:attrName>
+                                        </p:attrNameLst>
+                                      </p:cBhvr>
+                                      <p:to>
+                                        <p:strVal val="visible"/>
+                                      </p:to>
+                                    </p:set>
+                                    <p:anim calcmode="lin" valueType="num">
+                                      <p:cBhvr additive="base">
+                                        <p:cTn id="70" dur="500" fill="hold"/>
+                                        <p:tgtEl>
+                                          <p:spTgt spid="3"/>
+                                        </p:tgtEl>
+                                        <p:attrNameLst>
+                                          <p:attrName>ppt_x</p:attrName>
+                                        </p:attrNameLst>
+                                      </p:cBhvr>
+                                      <p:tavLst>
+                                        <p:tav tm="0">
+                                          <p:val>
+                                            <p:strVal val="#ppt_x"/>
+                                          </p:val>
+                                        </p:tav>
+                                        <p:tav tm="100000">
+                                          <p:val>
+                                            <p:strVal val="#ppt_x"/>
+                                          </p:val>
+                                        </p:tav>
+                                      </p:tavLst>
+                                    </p:anim>
+                                    <p:anim calcmode="lin" valueType="num">
+                                      <p:cBhvr additive="base">
+                                        <p:cTn id="71" dur="500" fill="hold"/>
+                                        <p:tgtEl>
+                                          <p:spTgt spid="3"/>
+                                        </p:tgtEl>
+                                        <p:attrNameLst>
+                                          <p:attrName>ppt_y</p:attrName>
+                                        </p:attrNameLst>
+                                      </p:cBhvr>
+                                      <p:tavLst>
+                                        <p:tav tm="0">
+                                          <p:val>
+                                            <p:strVal val="1+#ppt_h/2"/>
+                                          </p:val>
+                                        </p:tav>
+                                        <p:tav tm="100000">
+                                          <p:val>
+                                            <p:strVal val="#ppt_y"/>
+                                          </p:val>
+                                        </p:tav>
+                                      </p:tavLst>
+                                    </p:anim>
+                                  </p:childTnLst>
+                                </p:cTn>
+                              </p:par>
                             </p:childTnLst>
                           </p:cTn>
                         </p:par>
@@ -23967,6 +24097,7 @@
       <p:bldP spid="11" grpId="0" animBg="1"/>
       <p:bldP spid="25" grpId="0" animBg="1"/>
       <p:bldP spid="36" grpId="0"/>
+      <p:bldP spid="3" grpId="0"/>
     </p:bldLst>
   </p:timing>
 </p:sld>
@@ -24023,7 +24154,15 @@
           <a:p>
             <a:r>
               <a:rPr lang="en-US" dirty="0"/>
-              <a:t>Architecture V2.0 – Key FPGA Modules.</a:t>
+              <a:t>Architecture V</a:t>
+            </a:r>
+            <a:r>
+              <a:rPr lang="en-US" u="sng" dirty="0"/>
+              <a:t>2.0</a:t>
+            </a:r>
+            <a:r>
+              <a:rPr lang="en-US" dirty="0"/>
+              <a:t> – Key FPGA Modules.</a:t>
             </a:r>
           </a:p>
         </p:txBody>

</xml_diff>